<commit_message>
progress in presentation. have to change it though :-(
</commit_message>
<xml_diff>
--- a/ppt/MA.pptx
+++ b/ppt/MA.pptx
@@ -5,21 +5,21 @@
     <p:sldMasterId id="2147483672" r:id="rId1"/>
   </p:sldMasterIdLst>
   <p:notesMasterIdLst>
-    <p:notesMasterId r:id="rId34"/>
+    <p:notesMasterId r:id="rId35"/>
   </p:notesMasterIdLst>
   <p:sldIdLst>
     <p:sldId id="256" r:id="rId2"/>
     <p:sldId id="257" r:id="rId3"/>
     <p:sldId id="260" r:id="rId4"/>
     <p:sldId id="258" r:id="rId5"/>
-    <p:sldId id="280" r:id="rId6"/>
-    <p:sldId id="259" r:id="rId7"/>
-    <p:sldId id="261" r:id="rId8"/>
-    <p:sldId id="263" r:id="rId9"/>
-    <p:sldId id="264" r:id="rId10"/>
-    <p:sldId id="265" r:id="rId11"/>
-    <p:sldId id="266" r:id="rId12"/>
-    <p:sldId id="278" r:id="rId13"/>
+    <p:sldId id="259" r:id="rId6"/>
+    <p:sldId id="261" r:id="rId7"/>
+    <p:sldId id="263" r:id="rId8"/>
+    <p:sldId id="264" r:id="rId9"/>
+    <p:sldId id="265" r:id="rId10"/>
+    <p:sldId id="266" r:id="rId11"/>
+    <p:sldId id="278" r:id="rId12"/>
+    <p:sldId id="292" r:id="rId13"/>
     <p:sldId id="267" r:id="rId14"/>
     <p:sldId id="279" r:id="rId15"/>
     <p:sldId id="272" r:id="rId16"/>
@@ -40,6 +40,7 @@
     <p:sldId id="290" r:id="rId31"/>
     <p:sldId id="291" r:id="rId32"/>
     <p:sldId id="286" r:id="rId33"/>
+    <p:sldId id="293" r:id="rId34"/>
   </p:sldIdLst>
   <p:sldSz cx="9144000" cy="6858000" type="screen4x3"/>
   <p:notesSz cx="6858000" cy="9144000"/>
@@ -223,7 +224,7 @@
           <a:p>
             <a:fld id="{665D384B-F853-4A9F-BF03-AA7E32D1363F}" type="datetimeFigureOut">
               <a:rPr lang="de-DE" smtClean="0"/>
-              <a:t>23.05.2016</a:t>
+              <a:t>25.05.2016</a:t>
             </a:fld>
             <a:endParaRPr lang="de-DE"/>
           </a:p>
@@ -564,7 +565,7 @@
           <a:p>
             <a:fld id="{D1A0C403-713C-49DD-A81D-B6A7496DC8D1}" type="slidenum">
               <a:rPr lang="de-DE" smtClean="0"/>
-              <a:t>12</a:t>
+              <a:t>11</a:t>
             </a:fld>
             <a:endParaRPr lang="de-DE"/>
           </a:p>
@@ -627,6 +628,139 @@
           <a:bodyPr/>
           <a:lstStyle/>
           <a:p>
+            <a:r>
+              <a:rPr lang="de-DE" dirty="0" smtClean="0"/>
+              <a:t>Damit eine Anweisung „verstanden“</a:t>
+            </a:r>
+            <a:r>
+              <a:rPr lang="de-DE" baseline="0" dirty="0" smtClean="0"/>
+              <a:t> werden kann, muss sie zerlegt und in eine Datenstruktur abgelegt werden.</a:t>
+            </a:r>
+          </a:p>
+          <a:p>
+            <a:r>
+              <a:rPr lang="de-DE" baseline="0" dirty="0" smtClean="0"/>
+              <a:t>Dabei müssen die Reihenfolge der Teile und ihre Beziehungen </a:t>
+            </a:r>
+            <a:r>
+              <a:rPr lang="de-DE" baseline="0" smtClean="0"/>
+              <a:t>erhalten bleiben.</a:t>
+            </a:r>
+            <a:endParaRPr lang="de-DE" dirty="0" smtClean="0"/>
+          </a:p>
+          <a:p>
+            <a:r>
+              <a:rPr lang="de-DE" dirty="0" err="1" smtClean="0"/>
+              <a:t>Tree-Builder</a:t>
+            </a:r>
+            <a:r>
+              <a:rPr lang="de-DE" dirty="0" smtClean="0"/>
+              <a:t> erstellt aus der Eingabe ein Parse-</a:t>
+            </a:r>
+            <a:r>
+              <a:rPr lang="de-DE" dirty="0" err="1" smtClean="0"/>
+              <a:t>Tree</a:t>
+            </a:r>
+            <a:r>
+              <a:rPr lang="de-DE" dirty="0" smtClean="0"/>
+              <a:t>-Objekt, welches</a:t>
+            </a:r>
+            <a:r>
+              <a:rPr lang="de-DE" baseline="0" dirty="0" smtClean="0"/>
+              <a:t> mit einem </a:t>
+            </a:r>
+            <a:r>
+              <a:rPr lang="de-DE" baseline="0" dirty="0" err="1" smtClean="0"/>
+              <a:t>Visitor</a:t>
+            </a:r>
+            <a:r>
+              <a:rPr lang="de-DE" baseline="0" dirty="0" smtClean="0"/>
+              <a:t> weiterverarbeitet werden kann.</a:t>
+            </a:r>
+            <a:endParaRPr lang="de-DE" dirty="0"/>
+          </a:p>
+        </p:txBody>
+      </p:sp>
+      <p:sp>
+        <p:nvSpPr>
+          <p:cNvPr id="4" name="Foliennummernplatzhalter 3"/>
+          <p:cNvSpPr>
+            <a:spLocks noGrp="1"/>
+          </p:cNvSpPr>
+          <p:nvPr>
+            <p:ph type="sldNum" sz="quarter" idx="10"/>
+          </p:nvPr>
+        </p:nvSpPr>
+        <p:spPr/>
+        <p:txBody>
+          <a:bodyPr/>
+          <a:lstStyle/>
+          <a:p>
+            <a:fld id="{D1A0C403-713C-49DD-A81D-B6A7496DC8D1}" type="slidenum">
+              <a:rPr lang="de-DE" smtClean="0"/>
+              <a:t>12</a:t>
+            </a:fld>
+            <a:endParaRPr lang="de-DE"/>
+          </a:p>
+        </p:txBody>
+      </p:sp>
+    </p:spTree>
+    <p:extLst>
+      <p:ext uri="{BB962C8B-B14F-4D97-AF65-F5344CB8AC3E}">
+        <p14:creationId xmlns:p14="http://schemas.microsoft.com/office/powerpoint/2010/main" val="59618826"/>
+      </p:ext>
+    </p:extLst>
+  </p:cSld>
+  <p:clrMapOvr>
+    <a:masterClrMapping/>
+  </p:clrMapOvr>
+</p:notes>
+</file>
+
+<file path=ppt/notesSlides/notesSlide3.xml><?xml version="1.0" encoding="utf-8"?>
+<p:notes xmlns:a="http://schemas.openxmlformats.org/drawingml/2006/main" xmlns:r="http://schemas.openxmlformats.org/officeDocument/2006/relationships" xmlns:p="http://schemas.openxmlformats.org/presentationml/2006/main">
+  <p:cSld>
+    <p:spTree>
+      <p:nvGrpSpPr>
+        <p:cNvPr id="1" name=""/>
+        <p:cNvGrpSpPr/>
+        <p:nvPr/>
+      </p:nvGrpSpPr>
+      <p:grpSpPr>
+        <a:xfrm>
+          <a:off x="0" y="0"/>
+          <a:ext cx="0" cy="0"/>
+          <a:chOff x="0" y="0"/>
+          <a:chExt cx="0" cy="0"/>
+        </a:xfrm>
+      </p:grpSpPr>
+      <p:sp>
+        <p:nvSpPr>
+          <p:cNvPr id="2" name="Folienbildplatzhalter 1"/>
+          <p:cNvSpPr>
+            <a:spLocks noGrp="1" noRot="1" noChangeAspect="1"/>
+          </p:cNvSpPr>
+          <p:nvPr>
+            <p:ph type="sldImg"/>
+          </p:nvPr>
+        </p:nvSpPr>
+        <p:spPr/>
+      </p:sp>
+      <p:sp>
+        <p:nvSpPr>
+          <p:cNvPr id="3" name="Notizenplatzhalter 2"/>
+          <p:cNvSpPr>
+            <a:spLocks noGrp="1"/>
+          </p:cNvSpPr>
+          <p:nvPr>
+            <p:ph type="body" idx="1"/>
+          </p:nvPr>
+        </p:nvSpPr>
+        <p:spPr/>
+        <p:txBody>
+          <a:bodyPr/>
+          <a:lstStyle/>
+          <a:p>
             <a:endParaRPr lang="de-DE" dirty="0"/>
           </a:p>
         </p:txBody>
@@ -667,7 +801,7 @@
 </p:notes>
 </file>
 
-<file path=ppt/notesSlides/notesSlide3.xml><?xml version="1.0" encoding="utf-8"?>
+<file path=ppt/notesSlides/notesSlide4.xml><?xml version="1.0" encoding="utf-8"?>
 <p:notes xmlns:a="http://schemas.openxmlformats.org/drawingml/2006/main" xmlns:r="http://schemas.openxmlformats.org/officeDocument/2006/relationships" xmlns:p="http://schemas.openxmlformats.org/presentationml/2006/main">
   <p:cSld>
     <p:spTree>
@@ -3790,7 +3924,7 @@
               <a:rPr lang="de-DE" smtClean="0"/>
               <a:t>10</a:t>
             </a:fld>
-            <a:endParaRPr lang="de-DE" dirty="0"/>
+            <a:endParaRPr lang="de-DE"/>
           </a:p>
         </p:txBody>
       </p:sp>
@@ -3888,7 +4022,7 @@
       </p:sp>
       <p:pic>
         <p:nvPicPr>
-          <p:cNvPr id="12" name="Grafik 11"/>
+          <p:cNvPr id="11" name="Grafik 10"/>
           <p:cNvPicPr>
             <a:picLocks noChangeAspect="1"/>
           </p:cNvPicPr>
@@ -4076,7 +4210,27 @@
               <a:t> </a:t>
             </a:r>
             <a:r>
+              <a:rPr lang="de-DE" dirty="0" err="1" smtClean="0">
+                <a:solidFill>
+                  <a:srgbClr val="FF0000"/>
+                </a:solidFill>
+                <a:latin typeface="Courier" pitchFamily="49" charset="0"/>
+                <a:cs typeface="Courier New" panose="02070309020205020404" pitchFamily="49" charset="0"/>
+              </a:rPr>
+              <a:t>extends</a:t>
+            </a:r>
+            <a:r>
               <a:rPr lang="de-DE" dirty="0" smtClean="0">
+                <a:solidFill>
+                  <a:srgbClr val="FF0000"/>
+                </a:solidFill>
+                <a:latin typeface="Courier" pitchFamily="49" charset="0"/>
+                <a:cs typeface="Courier New" panose="02070309020205020404" pitchFamily="49" charset="0"/>
+              </a:rPr>
+              <a:t> End</a:t>
+            </a:r>
+            <a:r>
+              <a:rPr lang="de-DE" dirty="0" smtClean="0">
                 <a:latin typeface="Courier" pitchFamily="49" charset="0"/>
                 <a:cs typeface="Courier New" panose="02070309020205020404" pitchFamily="49" charset="0"/>
               </a:rPr>
@@ -4087,20 +4241,44 @@
             <a:pPr lvl="1"/>
             <a:r>
               <a:rPr lang="de-DE" dirty="0" smtClean="0">
-                <a:solidFill>
-                  <a:srgbClr val="FF0000"/>
-                </a:solidFill>
-                <a:latin typeface="Courier" pitchFamily="49" charset="0"/>
-                <a:cs typeface="Courier New" panose="02070309020205020404" pitchFamily="49" charset="0"/>
-              </a:rPr>
-              <a:t>Operation</a:t>
+                <a:latin typeface="Courier" pitchFamily="49" charset="0"/>
+                <a:cs typeface="Courier New" panose="02070309020205020404" pitchFamily="49" charset="0"/>
+              </a:rPr>
+              <a:t>Operation plus(</a:t>
+            </a:r>
+            <a:r>
+              <a:rPr lang="de-DE" dirty="0" err="1" smtClean="0">
+                <a:latin typeface="Courier" pitchFamily="49" charset="0"/>
+                <a:cs typeface="Courier New" panose="02070309020205020404" pitchFamily="49" charset="0"/>
+              </a:rPr>
+              <a:t>int</a:t>
             </a:r>
             <a:r>
               <a:rPr lang="de-DE" dirty="0" smtClean="0">
                 <a:latin typeface="Courier" pitchFamily="49" charset="0"/>
                 <a:cs typeface="Courier New" panose="02070309020205020404" pitchFamily="49" charset="0"/>
               </a:rPr>
-              <a:t> plus(</a:t>
+              <a:t>);</a:t>
+            </a:r>
+          </a:p>
+          <a:p>
+            <a:pPr lvl="1"/>
+            <a:r>
+              <a:rPr lang="de-DE" dirty="0" smtClean="0">
+                <a:latin typeface="Courier" pitchFamily="49" charset="0"/>
+                <a:cs typeface="Courier New" panose="02070309020205020404" pitchFamily="49" charset="0"/>
+              </a:rPr>
+              <a:t>Operation plus(Expression);</a:t>
+            </a:r>
+          </a:p>
+          <a:p>
+            <a:pPr lvl="1"/>
+            <a:r>
+              <a:rPr lang="de-DE" dirty="0" smtClean="0">
+                <a:latin typeface="Courier" pitchFamily="49" charset="0"/>
+                <a:cs typeface="Courier New" panose="02070309020205020404" pitchFamily="49" charset="0"/>
+              </a:rPr>
+              <a:t>Operation minus(</a:t>
             </a:r>
             <a:r>
               <a:rPr lang="de-DE" dirty="0" err="1" smtClean="0">
@@ -4121,60 +4299,102 @@
             <a:pPr lvl="1"/>
             <a:r>
               <a:rPr lang="de-DE" dirty="0" smtClean="0">
-                <a:solidFill>
-                  <a:srgbClr val="FF0000"/>
-                </a:solidFill>
-                <a:latin typeface="Courier" pitchFamily="49" charset="0"/>
-                <a:cs typeface="Courier New" panose="02070309020205020404" pitchFamily="49" charset="0"/>
-              </a:rPr>
-              <a:t>Operation</a:t>
-            </a:r>
+                <a:latin typeface="Courier" pitchFamily="49" charset="0"/>
+                <a:cs typeface="Courier New" panose="02070309020205020404" pitchFamily="49" charset="0"/>
+              </a:rPr>
+              <a:t>Operation minus(Expression);</a:t>
+            </a:r>
+          </a:p>
+          <a:p>
+            <a:pPr lvl="1"/>
             <a:r>
               <a:rPr lang="de-DE" dirty="0" smtClean="0">
                 <a:latin typeface="Courier" pitchFamily="49" charset="0"/>
                 <a:cs typeface="Courier New" panose="02070309020205020404" pitchFamily="49" charset="0"/>
               </a:rPr>
-              <a:t> plus(Expression);</a:t>
-            </a:r>
-            <a:endParaRPr lang="de-DE" dirty="0" smtClean="0">
-              <a:solidFill>
-                <a:srgbClr val="FF0000"/>
-              </a:solidFill>
-              <a:latin typeface="Courier" pitchFamily="49" charset="0"/>
-              <a:cs typeface="Courier New" panose="02070309020205020404" pitchFamily="49" charset="0"/>
-            </a:endParaRPr>
+              <a:t>Operation </a:t>
+            </a:r>
+            <a:r>
+              <a:rPr lang="de-DE" dirty="0" err="1" smtClean="0">
+                <a:latin typeface="Courier" pitchFamily="49" charset="0"/>
+                <a:cs typeface="Courier New" panose="02070309020205020404" pitchFamily="49" charset="0"/>
+              </a:rPr>
+              <a:t>times</a:t>
+            </a:r>
+            <a:r>
+              <a:rPr lang="de-DE" dirty="0" smtClean="0">
+                <a:latin typeface="Courier" pitchFamily="49" charset="0"/>
+                <a:cs typeface="Courier New" panose="02070309020205020404" pitchFamily="49" charset="0"/>
+              </a:rPr>
+              <a:t>(</a:t>
+            </a:r>
+            <a:r>
+              <a:rPr lang="de-DE" dirty="0" err="1" smtClean="0">
+                <a:latin typeface="Courier" pitchFamily="49" charset="0"/>
+                <a:cs typeface="Courier New" panose="02070309020205020404" pitchFamily="49" charset="0"/>
+              </a:rPr>
+              <a:t>int</a:t>
+            </a:r>
+            <a:r>
+              <a:rPr lang="de-DE" dirty="0" smtClean="0">
+                <a:latin typeface="Courier" pitchFamily="49" charset="0"/>
+                <a:cs typeface="Courier New" panose="02070309020205020404" pitchFamily="49" charset="0"/>
+              </a:rPr>
+              <a:t>);</a:t>
+            </a:r>
           </a:p>
           <a:p>
             <a:pPr lvl="1"/>
             <a:r>
               <a:rPr lang="de-DE" dirty="0" smtClean="0">
-                <a:solidFill>
-                  <a:srgbClr val="FF0000"/>
-                </a:solidFill>
-                <a:latin typeface="Courier" pitchFamily="49" charset="0"/>
-                <a:cs typeface="Courier New" panose="02070309020205020404" pitchFamily="49" charset="0"/>
-              </a:rPr>
-              <a:t>Operation</a:t>
+                <a:latin typeface="Courier" pitchFamily="49" charset="0"/>
+                <a:cs typeface="Courier New" panose="02070309020205020404" pitchFamily="49" charset="0"/>
+              </a:rPr>
+              <a:t>Operation </a:t>
+            </a:r>
+            <a:r>
+              <a:rPr lang="de-DE" dirty="0" err="1" smtClean="0">
+                <a:latin typeface="Courier" pitchFamily="49" charset="0"/>
+                <a:cs typeface="Courier New" panose="02070309020205020404" pitchFamily="49" charset="0"/>
+              </a:rPr>
+              <a:t>times</a:t>
             </a:r>
             <a:r>
               <a:rPr lang="de-DE" dirty="0" smtClean="0">
                 <a:latin typeface="Courier" pitchFamily="49" charset="0"/>
                 <a:cs typeface="Courier New" panose="02070309020205020404" pitchFamily="49" charset="0"/>
               </a:rPr>
-              <a:t> </a:t>
-            </a:r>
+              <a:t>(Expression);</a:t>
+            </a:r>
+          </a:p>
+          <a:p>
+            <a:pPr lvl="1"/>
             <a:r>
               <a:rPr lang="de-DE" dirty="0" smtClean="0">
                 <a:latin typeface="Courier" pitchFamily="49" charset="0"/>
                 <a:cs typeface="Courier New" panose="02070309020205020404" pitchFamily="49" charset="0"/>
               </a:rPr>
-              <a:t>minus(</a:t>
+              <a:t>Operation </a:t>
             </a:r>
             <a:r>
               <a:rPr lang="de-DE" dirty="0" err="1" smtClean="0">
                 <a:latin typeface="Courier" pitchFamily="49" charset="0"/>
                 <a:cs typeface="Courier New" panose="02070309020205020404" pitchFamily="49" charset="0"/>
               </a:rPr>
+              <a:t>divided</a:t>
+            </a:r>
+            <a:r>
+              <a:rPr lang="de-DE" dirty="0" smtClean="0">
+                <a:latin typeface="Courier" pitchFamily="49" charset="0"/>
+                <a:cs typeface="Courier New" panose="02070309020205020404" pitchFamily="49" charset="0"/>
+              </a:rPr>
+              <a:t>(</a:t>
+            </a:r>
+            <a:r>
+              <a:rPr lang="de-DE" dirty="0" err="1" smtClean="0">
+                <a:latin typeface="Courier" pitchFamily="49" charset="0"/>
+                <a:cs typeface="Courier New" panose="02070309020205020404" pitchFamily="49" charset="0"/>
+              </a:rPr>
               <a:t>int</a:t>
             </a:r>
             <a:r>
@@ -4189,170 +4409,10 @@
             <a:pPr lvl="1"/>
             <a:r>
               <a:rPr lang="de-DE" dirty="0" smtClean="0">
-                <a:solidFill>
-                  <a:srgbClr val="FF0000"/>
-                </a:solidFill>
-                <a:latin typeface="Courier" pitchFamily="49" charset="0"/>
-                <a:cs typeface="Courier New" panose="02070309020205020404" pitchFamily="49" charset="0"/>
-              </a:rPr>
-              <a:t>Operation</a:t>
-            </a:r>
-            <a:r>
-              <a:rPr lang="de-DE" dirty="0" smtClean="0">
-                <a:latin typeface="Courier" pitchFamily="49" charset="0"/>
-                <a:cs typeface="Courier New" panose="02070309020205020404" pitchFamily="49" charset="0"/>
-              </a:rPr>
-              <a:t> minus(Expression);</a:t>
-            </a:r>
-          </a:p>
-          <a:p>
-            <a:pPr lvl="1"/>
-            <a:r>
-              <a:rPr lang="de-DE" dirty="0" smtClean="0">
-                <a:solidFill>
-                  <a:srgbClr val="FF0000"/>
-                </a:solidFill>
-                <a:latin typeface="Courier" pitchFamily="49" charset="0"/>
-                <a:cs typeface="Courier New" panose="02070309020205020404" pitchFamily="49" charset="0"/>
-              </a:rPr>
-              <a:t>Operation</a:t>
-            </a:r>
-            <a:r>
-              <a:rPr lang="de-DE" dirty="0" smtClean="0">
-                <a:latin typeface="Courier" pitchFamily="49" charset="0"/>
-                <a:cs typeface="Courier New" panose="02070309020205020404" pitchFamily="49" charset="0"/>
-              </a:rPr>
-              <a:t> </a:t>
-            </a:r>
-            <a:r>
-              <a:rPr lang="de-DE" dirty="0" err="1" smtClean="0">
-                <a:latin typeface="Courier" pitchFamily="49" charset="0"/>
-                <a:cs typeface="Courier New" panose="02070309020205020404" pitchFamily="49" charset="0"/>
-              </a:rPr>
-              <a:t>times</a:t>
-            </a:r>
-            <a:r>
-              <a:rPr lang="de-DE" dirty="0" smtClean="0">
-                <a:latin typeface="Courier" pitchFamily="49" charset="0"/>
-                <a:cs typeface="Courier New" panose="02070309020205020404" pitchFamily="49" charset="0"/>
-              </a:rPr>
-              <a:t>(</a:t>
-            </a:r>
-            <a:r>
-              <a:rPr lang="de-DE" dirty="0" err="1" smtClean="0">
-                <a:latin typeface="Courier" pitchFamily="49" charset="0"/>
-                <a:cs typeface="Courier New" panose="02070309020205020404" pitchFamily="49" charset="0"/>
-              </a:rPr>
-              <a:t>int</a:t>
-            </a:r>
-            <a:r>
-              <a:rPr lang="de-DE" dirty="0" smtClean="0">
-                <a:latin typeface="Courier" pitchFamily="49" charset="0"/>
-                <a:cs typeface="Courier New" panose="02070309020205020404" pitchFamily="49" charset="0"/>
-              </a:rPr>
-              <a:t>);</a:t>
-            </a:r>
-          </a:p>
-          <a:p>
-            <a:pPr lvl="1"/>
-            <a:r>
-              <a:rPr lang="de-DE" dirty="0" smtClean="0">
-                <a:solidFill>
-                  <a:srgbClr val="FF0000"/>
-                </a:solidFill>
-                <a:latin typeface="Courier" pitchFamily="49" charset="0"/>
-                <a:cs typeface="Courier New" panose="02070309020205020404" pitchFamily="49" charset="0"/>
-              </a:rPr>
-              <a:t>Operation</a:t>
-            </a:r>
-            <a:r>
-              <a:rPr lang="de-DE" dirty="0" smtClean="0">
-                <a:latin typeface="Courier" pitchFamily="49" charset="0"/>
-                <a:cs typeface="Courier New" panose="02070309020205020404" pitchFamily="49" charset="0"/>
-              </a:rPr>
-              <a:t> </a:t>
-            </a:r>
-            <a:r>
-              <a:rPr lang="de-DE" dirty="0" err="1" smtClean="0">
-                <a:latin typeface="Courier" pitchFamily="49" charset="0"/>
-                <a:cs typeface="Courier New" panose="02070309020205020404" pitchFamily="49" charset="0"/>
-              </a:rPr>
-              <a:t>times</a:t>
-            </a:r>
-            <a:r>
-              <a:rPr lang="de-DE" dirty="0" smtClean="0">
-                <a:latin typeface="Courier" pitchFamily="49" charset="0"/>
-                <a:cs typeface="Courier New" panose="02070309020205020404" pitchFamily="49" charset="0"/>
-              </a:rPr>
-              <a:t>(Expression);</a:t>
-            </a:r>
-          </a:p>
-          <a:p>
-            <a:pPr lvl="1"/>
-            <a:r>
-              <a:rPr lang="de-DE" dirty="0" smtClean="0">
-                <a:solidFill>
-                  <a:srgbClr val="FF0000"/>
-                </a:solidFill>
-                <a:latin typeface="Courier" pitchFamily="49" charset="0"/>
-                <a:cs typeface="Courier New" panose="02070309020205020404" pitchFamily="49" charset="0"/>
-              </a:rPr>
-              <a:t>Operation</a:t>
-            </a:r>
-            <a:r>
-              <a:rPr lang="de-DE" dirty="0" smtClean="0">
-                <a:latin typeface="Courier" pitchFamily="49" charset="0"/>
-                <a:cs typeface="Courier New" panose="02070309020205020404" pitchFamily="49" charset="0"/>
-              </a:rPr>
-              <a:t> </a:t>
-            </a:r>
-            <a:r>
-              <a:rPr lang="de-DE" dirty="0" err="1" smtClean="0">
-                <a:latin typeface="Courier" pitchFamily="49" charset="0"/>
-                <a:cs typeface="Courier New" panose="02070309020205020404" pitchFamily="49" charset="0"/>
-              </a:rPr>
-              <a:t>divided</a:t>
-            </a:r>
-            <a:r>
-              <a:rPr lang="de-DE" dirty="0" smtClean="0">
-                <a:latin typeface="Courier" pitchFamily="49" charset="0"/>
-                <a:cs typeface="Courier New" panose="02070309020205020404" pitchFamily="49" charset="0"/>
-              </a:rPr>
-              <a:t>(</a:t>
-            </a:r>
-            <a:r>
-              <a:rPr lang="de-DE" dirty="0" err="1" smtClean="0">
-                <a:latin typeface="Courier" pitchFamily="49" charset="0"/>
-                <a:cs typeface="Courier New" panose="02070309020205020404" pitchFamily="49" charset="0"/>
-              </a:rPr>
-              <a:t>int</a:t>
-            </a:r>
-            <a:r>
-              <a:rPr lang="de-DE" dirty="0" smtClean="0">
-                <a:latin typeface="Courier" pitchFamily="49" charset="0"/>
-                <a:cs typeface="Courier New" panose="02070309020205020404" pitchFamily="49" charset="0"/>
-              </a:rPr>
-              <a:t>);</a:t>
-            </a:r>
-          </a:p>
-          <a:p>
-            <a:pPr lvl="1"/>
-            <a:r>
-              <a:rPr lang="de-DE" dirty="0" smtClean="0">
-                <a:solidFill>
-                  <a:srgbClr val="FF0000"/>
-                </a:solidFill>
-                <a:latin typeface="Courier" pitchFamily="49" charset="0"/>
-                <a:cs typeface="Courier New" panose="02070309020205020404" pitchFamily="49" charset="0"/>
-              </a:rPr>
-              <a:t>Operation</a:t>
-            </a:r>
-            <a:r>
-              <a:rPr lang="de-DE" dirty="0" smtClean="0">
-                <a:latin typeface="Courier" pitchFamily="49" charset="0"/>
-                <a:cs typeface="Courier New" panose="02070309020205020404" pitchFamily="49" charset="0"/>
-              </a:rPr>
-              <a:t> </a:t>
+                <a:latin typeface="Courier" pitchFamily="49" charset="0"/>
+                <a:cs typeface="Courier New" panose="02070309020205020404" pitchFamily="49" charset="0"/>
+              </a:rPr>
+              <a:t>Operation </a:t>
             </a:r>
             <a:r>
               <a:rPr lang="de-DE" dirty="0" err="1" smtClean="0">
@@ -4388,8 +4448,8 @@
         </p:nvSpPr>
         <p:spPr>
           <a:xfrm>
-            <a:off x="5076056" y="836712"/>
-            <a:ext cx="2952328" cy="360040"/>
+            <a:off x="4898735" y="980728"/>
+            <a:ext cx="504056" cy="3384376"/>
           </a:xfrm>
           <a:prstGeom prst="rect">
             <a:avLst/>
@@ -4429,7 +4489,7 @@
     </p:spTree>
     <p:extLst>
       <p:ext uri="{BB962C8B-B14F-4D97-AF65-F5344CB8AC3E}">
-        <p14:creationId xmlns:p14="http://schemas.microsoft.com/office/powerpoint/2010/main" val="3078192101"/>
+        <p14:creationId xmlns:p14="http://schemas.microsoft.com/office/powerpoint/2010/main" val="2565030200"/>
       </p:ext>
     </p:extLst>
   </p:cSld>
@@ -4736,17 +4796,43 @@
               <a:rPr lang="de-DE" dirty="0" smtClean="0">
                 <a:latin typeface="Courier" pitchFamily="49" charset="0"/>
               </a:rPr>
-              <a:t>Interface End {</a:t>
+              <a:t>Interface End</a:t>
+            </a:r>
+            <a:r>
+              <a:rPr lang="de-DE" dirty="0" smtClean="0">
+                <a:solidFill>
+                  <a:srgbClr val="FF0000"/>
+                </a:solidFill>
+                <a:latin typeface="Courier" pitchFamily="49" charset="0"/>
+                <a:cs typeface="Courier New" panose="02070309020205020404" pitchFamily="49" charset="0"/>
+              </a:rPr>
+              <a:t>&lt;T&gt;</a:t>
+            </a:r>
+            <a:r>
+              <a:rPr lang="de-DE" dirty="0" smtClean="0">
+                <a:latin typeface="Courier" pitchFamily="49" charset="0"/>
+              </a:rPr>
+              <a:t> {</a:t>
             </a:r>
           </a:p>
           <a:p>
             <a:pPr lvl="1"/>
             <a:r>
               <a:rPr lang="de-DE" dirty="0" smtClean="0">
-                <a:latin typeface="Courier" pitchFamily="49" charset="0"/>
-                <a:cs typeface="Courier New" panose="02070309020205020404" pitchFamily="49" charset="0"/>
-              </a:rPr>
-              <a:t>Expression end();</a:t>
+                <a:solidFill>
+                  <a:srgbClr val="FF0000"/>
+                </a:solidFill>
+                <a:latin typeface="Courier" pitchFamily="49" charset="0"/>
+                <a:cs typeface="Courier New" panose="02070309020205020404" pitchFamily="49" charset="0"/>
+              </a:rPr>
+              <a:t>T </a:t>
+            </a:r>
+            <a:r>
+              <a:rPr lang="de-DE" dirty="0" smtClean="0">
+                <a:latin typeface="Courier" pitchFamily="49" charset="0"/>
+                <a:cs typeface="Courier New" panose="02070309020205020404" pitchFamily="49" charset="0"/>
+              </a:rPr>
+              <a:t>end();</a:t>
             </a:r>
             <a:r>
               <a:rPr lang="de-DE" dirty="0" smtClean="0">
@@ -4771,14 +4857,14 @@
       </p:sp>
       <p:pic>
         <p:nvPicPr>
-          <p:cNvPr id="11" name="Grafik 10"/>
+          <p:cNvPr id="9" name="Grafik 8"/>
           <p:cNvPicPr>
             <a:picLocks noChangeAspect="1"/>
           </p:cNvPicPr>
           <p:nvPr/>
         </p:nvPicPr>
         <p:blipFill>
-          <a:blip r:embed="rId2">
+          <a:blip r:embed="rId3">
             <a:extLst>
               <a:ext uri="{28A0092B-C50C-407E-A947-70E740481C1C}">
                 <a14:useLocalDpi xmlns:a14="http://schemas.microsoft.com/office/drawing/2010/main" val="0"/>
@@ -4807,8 +4893,8 @@
         </p:nvSpPr>
         <p:spPr>
           <a:xfrm>
-            <a:off x="398235" y="1942097"/>
-            <a:ext cx="4752528" cy="4247317"/>
+            <a:off x="107504" y="1942097"/>
+            <a:ext cx="5184575" cy="4247317"/>
           </a:xfrm>
           <a:prstGeom prst="rect">
             <a:avLst/>
@@ -4837,6 +4923,16 @@
             </a:r>
             <a:r>
               <a:rPr lang="de-DE" dirty="0" smtClean="0">
+                <a:solidFill>
+                  <a:srgbClr val="FF0000"/>
+                </a:solidFill>
+                <a:latin typeface="Courier" pitchFamily="49" charset="0"/>
+                <a:cs typeface="Courier New" panose="02070309020205020404" pitchFamily="49" charset="0"/>
+              </a:rPr>
+              <a:t>&lt;T&gt;</a:t>
+            </a:r>
+            <a:r>
+              <a:rPr lang="de-DE" dirty="0" smtClean="0">
                 <a:latin typeface="Courier" pitchFamily="49" charset="0"/>
                 <a:cs typeface="Courier New" panose="02070309020205020404" pitchFamily="49" charset="0"/>
               </a:rPr>
@@ -4902,7 +4998,24 @@
                 <a:latin typeface="Courier" pitchFamily="49" charset="0"/>
                 <a:cs typeface="Courier New" panose="02070309020205020404" pitchFamily="49" charset="0"/>
               </a:rPr>
-              <a:t>(Expression);</a:t>
+              <a:t>(</a:t>
+            </a:r>
+            <a:r>
+              <a:rPr lang="de-DE" dirty="0" smtClean="0">
+                <a:solidFill>
+                  <a:srgbClr val="FF0000"/>
+                </a:solidFill>
+                <a:latin typeface="Courier" pitchFamily="49" charset="0"/>
+                <a:cs typeface="Courier New" panose="02070309020205020404" pitchFamily="49" charset="0"/>
+              </a:rPr>
+              <a:t>T</a:t>
+            </a:r>
+            <a:r>
+              <a:rPr lang="de-DE" dirty="0" smtClean="0">
+                <a:latin typeface="Courier" pitchFamily="49" charset="0"/>
+                <a:cs typeface="Courier New" panose="02070309020205020404" pitchFamily="49" charset="0"/>
+              </a:rPr>
+              <a:t>);</a:t>
             </a:r>
           </a:p>
           <a:p>
@@ -4956,34 +5069,123 @@
                 <a:latin typeface="Courier" pitchFamily="49" charset="0"/>
                 <a:cs typeface="Courier New" panose="02070309020205020404" pitchFamily="49" charset="0"/>
               </a:rPr>
-              <a:t> </a:t>
+              <a:t>&lt;T&gt; </a:t>
             </a:r>
             <a:r>
               <a:rPr lang="de-DE" dirty="0" err="1" smtClean="0">
+                <a:latin typeface="Courier" pitchFamily="49" charset="0"/>
+                <a:cs typeface="Courier New" panose="02070309020205020404" pitchFamily="49" charset="0"/>
+              </a:rPr>
+              <a:t>extends</a:t>
+            </a:r>
+            <a:r>
+              <a:rPr lang="de-DE" dirty="0" smtClean="0">
+                <a:latin typeface="Courier" pitchFamily="49" charset="0"/>
+                <a:cs typeface="Courier New" panose="02070309020205020404" pitchFamily="49" charset="0"/>
+              </a:rPr>
+              <a:t> End{</a:t>
+            </a:r>
+          </a:p>
+          <a:p>
+            <a:pPr lvl="1"/>
+            <a:r>
+              <a:rPr lang="de-DE" dirty="0" smtClean="0">
+                <a:latin typeface="Courier" pitchFamily="49" charset="0"/>
+                <a:cs typeface="Courier New" panose="02070309020205020404" pitchFamily="49" charset="0"/>
+              </a:rPr>
+              <a:t>Operation plus(</a:t>
+            </a:r>
+            <a:r>
+              <a:rPr lang="de-DE" dirty="0" err="1" smtClean="0">
+                <a:latin typeface="Courier" pitchFamily="49" charset="0"/>
+                <a:cs typeface="Courier New" panose="02070309020205020404" pitchFamily="49" charset="0"/>
+              </a:rPr>
+              <a:t>int</a:t>
+            </a:r>
+            <a:r>
+              <a:rPr lang="de-DE" dirty="0" smtClean="0">
+                <a:latin typeface="Courier" pitchFamily="49" charset="0"/>
+                <a:cs typeface="Courier New" panose="02070309020205020404" pitchFamily="49" charset="0"/>
+              </a:rPr>
+              <a:t>);</a:t>
+            </a:r>
+          </a:p>
+          <a:p>
+            <a:pPr lvl="1"/>
+            <a:r>
+              <a:rPr lang="de-DE" dirty="0" smtClean="0">
+                <a:latin typeface="Courier" pitchFamily="49" charset="0"/>
+                <a:cs typeface="Courier New" panose="02070309020205020404" pitchFamily="49" charset="0"/>
+              </a:rPr>
+              <a:t>Operation plus(</a:t>
+            </a:r>
+            <a:r>
+              <a:rPr lang="de-DE" dirty="0" smtClean="0">
                 <a:solidFill>
                   <a:srgbClr val="FF0000"/>
                 </a:solidFill>
                 <a:latin typeface="Courier" pitchFamily="49" charset="0"/>
                 <a:cs typeface="Courier New" panose="02070309020205020404" pitchFamily="49" charset="0"/>
               </a:rPr>
-              <a:t>extends</a:t>
+              <a:t>T</a:t>
             </a:r>
             <a:r>
               <a:rPr lang="de-DE" dirty="0" smtClean="0">
+                <a:latin typeface="Courier" pitchFamily="49" charset="0"/>
+                <a:cs typeface="Courier New" panose="02070309020205020404" pitchFamily="49" charset="0"/>
+              </a:rPr>
+              <a:t>);</a:t>
+            </a:r>
+          </a:p>
+          <a:p>
+            <a:pPr lvl="1"/>
+            <a:r>
+              <a:rPr lang="de-DE" dirty="0" smtClean="0">
+                <a:latin typeface="Courier" pitchFamily="49" charset="0"/>
+                <a:cs typeface="Courier New" panose="02070309020205020404" pitchFamily="49" charset="0"/>
+              </a:rPr>
+              <a:t>Operation minus(</a:t>
+            </a:r>
+            <a:r>
+              <a:rPr lang="de-DE" dirty="0" err="1" smtClean="0">
+                <a:latin typeface="Courier" pitchFamily="49" charset="0"/>
+                <a:cs typeface="Courier New" panose="02070309020205020404" pitchFamily="49" charset="0"/>
+              </a:rPr>
+              <a:t>int</a:t>
+            </a:r>
+            <a:r>
+              <a:rPr lang="de-DE" dirty="0" smtClean="0">
+                <a:latin typeface="Courier" pitchFamily="49" charset="0"/>
+                <a:cs typeface="Courier New" panose="02070309020205020404" pitchFamily="49" charset="0"/>
+              </a:rPr>
+              <a:t>);</a:t>
+            </a:r>
+          </a:p>
+          <a:p>
+            <a:pPr lvl="1"/>
+            <a:r>
+              <a:rPr lang="de-DE" dirty="0" smtClean="0">
+                <a:latin typeface="Courier" pitchFamily="49" charset="0"/>
+                <a:cs typeface="Courier New" panose="02070309020205020404" pitchFamily="49" charset="0"/>
+              </a:rPr>
+              <a:t>Operation minus(</a:t>
+            </a:r>
+            <a:r>
+              <a:rPr lang="de-DE" dirty="0" smtClean="0">
                 <a:solidFill>
                   <a:srgbClr val="FF0000"/>
                 </a:solidFill>
                 <a:latin typeface="Courier" pitchFamily="49" charset="0"/>
                 <a:cs typeface="Courier New" panose="02070309020205020404" pitchFamily="49" charset="0"/>
               </a:rPr>
-              <a:t> End</a:t>
+              <a:t>T</a:t>
             </a:r>
             <a:r>
               <a:rPr lang="de-DE" dirty="0" smtClean="0">
                 <a:latin typeface="Courier" pitchFamily="49" charset="0"/>
                 <a:cs typeface="Courier New" panose="02070309020205020404" pitchFamily="49" charset="0"/>
               </a:rPr>
-              <a:t>{</a:t>
+              <a:t>);</a:t>
             </a:r>
           </a:p>
           <a:p>
@@ -4993,13 +5195,27 @@
                 <a:latin typeface="Courier" pitchFamily="49" charset="0"/>
                 <a:cs typeface="Courier New" panose="02070309020205020404" pitchFamily="49" charset="0"/>
               </a:rPr>
-              <a:t>Operation plus(</a:t>
+              <a:t>Operation </a:t>
             </a:r>
             <a:r>
               <a:rPr lang="de-DE" dirty="0" err="1" smtClean="0">
                 <a:latin typeface="Courier" pitchFamily="49" charset="0"/>
                 <a:cs typeface="Courier New" panose="02070309020205020404" pitchFamily="49" charset="0"/>
               </a:rPr>
+              <a:t>times</a:t>
+            </a:r>
+            <a:r>
+              <a:rPr lang="de-DE" dirty="0" smtClean="0">
+                <a:latin typeface="Courier" pitchFamily="49" charset="0"/>
+                <a:cs typeface="Courier New" panose="02070309020205020404" pitchFamily="49" charset="0"/>
+              </a:rPr>
+              <a:t>(</a:t>
+            </a:r>
+            <a:r>
+              <a:rPr lang="de-DE" dirty="0" err="1" smtClean="0">
+                <a:latin typeface="Courier" pitchFamily="49" charset="0"/>
+                <a:cs typeface="Courier New" panose="02070309020205020404" pitchFamily="49" charset="0"/>
+              </a:rPr>
               <a:t>int</a:t>
             </a:r>
             <a:r>
@@ -5017,7 +5233,38 @@
                 <a:latin typeface="Courier" pitchFamily="49" charset="0"/>
                 <a:cs typeface="Courier New" panose="02070309020205020404" pitchFamily="49" charset="0"/>
               </a:rPr>
-              <a:t>Operation plus(Expression);</a:t>
+              <a:t>Operation </a:t>
+            </a:r>
+            <a:r>
+              <a:rPr lang="de-DE" dirty="0" err="1" smtClean="0">
+                <a:latin typeface="Courier" pitchFamily="49" charset="0"/>
+                <a:cs typeface="Courier New" panose="02070309020205020404" pitchFamily="49" charset="0"/>
+              </a:rPr>
+              <a:t>times</a:t>
+            </a:r>
+            <a:r>
+              <a:rPr lang="de-DE" dirty="0" smtClean="0">
+                <a:latin typeface="Courier" pitchFamily="49" charset="0"/>
+                <a:cs typeface="Courier New" panose="02070309020205020404" pitchFamily="49" charset="0"/>
+              </a:rPr>
+              <a:t>(</a:t>
+            </a:r>
+            <a:r>
+              <a:rPr lang="de-DE" dirty="0" smtClean="0">
+                <a:solidFill>
+                  <a:srgbClr val="FF0000"/>
+                </a:solidFill>
+                <a:latin typeface="Courier" pitchFamily="49" charset="0"/>
+                <a:cs typeface="Courier New" panose="02070309020205020404" pitchFamily="49" charset="0"/>
+              </a:rPr>
+              <a:t>T</a:t>
+            </a:r>
+            <a:r>
+              <a:rPr lang="de-DE" dirty="0" smtClean="0">
+                <a:latin typeface="Courier" pitchFamily="49" charset="0"/>
+                <a:cs typeface="Courier New" panose="02070309020205020404" pitchFamily="49" charset="0"/>
+              </a:rPr>
+              <a:t>);</a:t>
             </a:r>
           </a:p>
           <a:p>
@@ -5030,11 +5277,18 @@
               <a:t>Operation </a:t>
             </a:r>
             <a:r>
+              <a:rPr lang="de-DE" dirty="0" err="1" smtClean="0">
+                <a:latin typeface="Courier" pitchFamily="49" charset="0"/>
+                <a:cs typeface="Courier New" panose="02070309020205020404" pitchFamily="49" charset="0"/>
+              </a:rPr>
+              <a:t>divided</a:t>
+            </a:r>
+            <a:r>
               <a:rPr lang="de-DE" dirty="0" smtClean="0">
                 <a:latin typeface="Courier" pitchFamily="49" charset="0"/>
                 <a:cs typeface="Courier New" panose="02070309020205020404" pitchFamily="49" charset="0"/>
               </a:rPr>
-              <a:t>minus(</a:t>
+              <a:t>(</a:t>
             </a:r>
             <a:r>
               <a:rPr lang="de-DE" dirty="0" err="1" smtClean="0">
@@ -5058,38 +5312,31 @@
                 <a:latin typeface="Courier" pitchFamily="49" charset="0"/>
                 <a:cs typeface="Courier New" panose="02070309020205020404" pitchFamily="49" charset="0"/>
               </a:rPr>
-              <a:t>Operation minus(Expression);</a:t>
-            </a:r>
-          </a:p>
-          <a:p>
-            <a:pPr lvl="1"/>
+              <a:t>Operation </a:t>
+            </a:r>
+            <a:r>
+              <a:rPr lang="de-DE" dirty="0" err="1" smtClean="0">
+                <a:latin typeface="Courier" pitchFamily="49" charset="0"/>
+                <a:cs typeface="Courier New" panose="02070309020205020404" pitchFamily="49" charset="0"/>
+              </a:rPr>
+              <a:t>divided</a:t>
+            </a:r>
             <a:r>
               <a:rPr lang="de-DE" dirty="0" smtClean="0">
                 <a:latin typeface="Courier" pitchFamily="49" charset="0"/>
                 <a:cs typeface="Courier New" panose="02070309020205020404" pitchFamily="49" charset="0"/>
               </a:rPr>
-              <a:t>Operation </a:t>
-            </a:r>
-            <a:r>
-              <a:rPr lang="de-DE" dirty="0" err="1" smtClean="0">
-                <a:latin typeface="Courier" pitchFamily="49" charset="0"/>
-                <a:cs typeface="Courier New" panose="02070309020205020404" pitchFamily="49" charset="0"/>
-              </a:rPr>
-              <a:t>times</a:t>
+              <a:t>(</a:t>
             </a:r>
             <a:r>
               <a:rPr lang="de-DE" dirty="0" smtClean="0">
-                <a:latin typeface="Courier" pitchFamily="49" charset="0"/>
-                <a:cs typeface="Courier New" panose="02070309020205020404" pitchFamily="49" charset="0"/>
-              </a:rPr>
-              <a:t>(</a:t>
-            </a:r>
-            <a:r>
-              <a:rPr lang="de-DE" dirty="0" err="1" smtClean="0">
-                <a:latin typeface="Courier" pitchFamily="49" charset="0"/>
-                <a:cs typeface="Courier New" panose="02070309020205020404" pitchFamily="49" charset="0"/>
-              </a:rPr>
-              <a:t>int</a:t>
+                <a:solidFill>
+                  <a:srgbClr val="FF0000"/>
+                </a:solidFill>
+                <a:latin typeface="Courier" pitchFamily="49" charset="0"/>
+                <a:cs typeface="Courier New" panose="02070309020205020404" pitchFamily="49" charset="0"/>
+              </a:rPr>
+              <a:t>T</a:t>
             </a:r>
             <a:r>
               <a:rPr lang="de-DE" dirty="0" smtClean="0">
@@ -5100,112 +5347,187 @@
             </a:r>
           </a:p>
           <a:p>
-            <a:pPr lvl="1"/>
             <a:r>
               <a:rPr lang="de-DE" dirty="0" smtClean="0">
                 <a:latin typeface="Courier" pitchFamily="49" charset="0"/>
                 <a:cs typeface="Courier New" panose="02070309020205020404" pitchFamily="49" charset="0"/>
               </a:rPr>
-              <a:t>Operation </a:t>
-            </a:r>
-            <a:r>
-              <a:rPr lang="de-DE" dirty="0" err="1" smtClean="0">
-                <a:latin typeface="Courier" pitchFamily="49" charset="0"/>
-                <a:cs typeface="Courier New" panose="02070309020205020404" pitchFamily="49" charset="0"/>
-              </a:rPr>
-              <a:t>times</a:t>
-            </a:r>
-            <a:r>
-              <a:rPr lang="de-DE" dirty="0" smtClean="0">
-                <a:latin typeface="Courier" pitchFamily="49" charset="0"/>
-                <a:cs typeface="Courier New" panose="02070309020205020404" pitchFamily="49" charset="0"/>
-              </a:rPr>
-              <a:t>(Expression);</a:t>
-            </a:r>
-          </a:p>
-          <a:p>
-            <a:pPr lvl="1"/>
-            <a:r>
-              <a:rPr lang="de-DE" dirty="0" smtClean="0">
-                <a:latin typeface="Courier" pitchFamily="49" charset="0"/>
-                <a:cs typeface="Courier New" panose="02070309020205020404" pitchFamily="49" charset="0"/>
-              </a:rPr>
-              <a:t>Operation </a:t>
-            </a:r>
-            <a:r>
-              <a:rPr lang="de-DE" dirty="0" err="1" smtClean="0">
-                <a:latin typeface="Courier" pitchFamily="49" charset="0"/>
-                <a:cs typeface="Courier New" panose="02070309020205020404" pitchFamily="49" charset="0"/>
-              </a:rPr>
-              <a:t>divided</a:t>
-            </a:r>
-            <a:r>
-              <a:rPr lang="de-DE" dirty="0" smtClean="0">
-                <a:latin typeface="Courier" pitchFamily="49" charset="0"/>
-                <a:cs typeface="Courier New" panose="02070309020205020404" pitchFamily="49" charset="0"/>
-              </a:rPr>
-              <a:t>(</a:t>
-            </a:r>
-            <a:r>
-              <a:rPr lang="de-DE" dirty="0" err="1" smtClean="0">
-                <a:latin typeface="Courier" pitchFamily="49" charset="0"/>
-                <a:cs typeface="Courier New" panose="02070309020205020404" pitchFamily="49" charset="0"/>
-              </a:rPr>
-              <a:t>int</a:t>
-            </a:r>
-            <a:r>
-              <a:rPr lang="de-DE" dirty="0" smtClean="0">
-                <a:latin typeface="Courier" pitchFamily="49" charset="0"/>
-                <a:cs typeface="Courier New" panose="02070309020205020404" pitchFamily="49" charset="0"/>
-              </a:rPr>
-              <a:t>);</a:t>
-            </a:r>
-          </a:p>
-          <a:p>
-            <a:pPr lvl="1"/>
-            <a:r>
-              <a:rPr lang="de-DE" dirty="0" smtClean="0">
-                <a:latin typeface="Courier" pitchFamily="49" charset="0"/>
-                <a:cs typeface="Courier New" panose="02070309020205020404" pitchFamily="49" charset="0"/>
-              </a:rPr>
-              <a:t>Operation </a:t>
-            </a:r>
-            <a:r>
-              <a:rPr lang="de-DE" dirty="0" err="1" smtClean="0">
-                <a:latin typeface="Courier" pitchFamily="49" charset="0"/>
-                <a:cs typeface="Courier New" panose="02070309020205020404" pitchFamily="49" charset="0"/>
-              </a:rPr>
-              <a:t>divided</a:t>
-            </a:r>
-            <a:r>
-              <a:rPr lang="de-DE" dirty="0" smtClean="0">
-                <a:latin typeface="Courier" pitchFamily="49" charset="0"/>
-                <a:cs typeface="Courier New" panose="02070309020205020404" pitchFamily="49" charset="0"/>
-              </a:rPr>
-              <a:t>(Expression);</a:t>
-            </a:r>
-          </a:p>
-          <a:p>
-            <a:r>
-              <a:rPr lang="de-DE" dirty="0" smtClean="0">
-                <a:latin typeface="Courier" pitchFamily="49" charset="0"/>
-                <a:cs typeface="Courier New" panose="02070309020205020404" pitchFamily="49" charset="0"/>
-              </a:rPr>
               <a:t>}</a:t>
             </a:r>
           </a:p>
         </p:txBody>
       </p:sp>
-      <p:sp>
-        <p:nvSpPr>
-          <p:cNvPr id="10" name="Rechteck 9"/>
+    </p:spTree>
+    <p:extLst>
+      <p:ext uri="{BB962C8B-B14F-4D97-AF65-F5344CB8AC3E}">
+        <p14:creationId xmlns:p14="http://schemas.microsoft.com/office/powerpoint/2010/main" val="363694148"/>
+      </p:ext>
+    </p:extLst>
+  </p:cSld>
+  <p:clrMapOvr>
+    <a:masterClrMapping/>
+  </p:clrMapOvr>
+  <p:timing>
+    <p:tnLst>
+      <p:par>
+        <p:cTn id="1" dur="indefinite" restart="never" nodeType="tmRoot"/>
+      </p:par>
+    </p:tnLst>
+  </p:timing>
+</p:sld>
+</file>
+
+<file path=ppt/slides/slide12.xml><?xml version="1.0" encoding="utf-8"?>
+<p:sld xmlns:a="http://schemas.openxmlformats.org/drawingml/2006/main" xmlns:r="http://schemas.openxmlformats.org/officeDocument/2006/relationships" xmlns:p="http://schemas.openxmlformats.org/presentationml/2006/main">
+  <p:cSld>
+    <p:spTree>
+      <p:nvGrpSpPr>
+        <p:cNvPr id="1" name=""/>
+        <p:cNvGrpSpPr/>
+        <p:nvPr/>
+      </p:nvGrpSpPr>
+      <p:grpSpPr>
+        <a:xfrm>
+          <a:off x="0" y="0"/>
+          <a:ext cx="0" cy="0"/>
+          <a:chOff x="0" y="0"/>
+          <a:chExt cx="0" cy="0"/>
+        </a:xfrm>
+      </p:grpSpPr>
+      <p:sp>
+        <p:nvSpPr>
+          <p:cNvPr id="2" name="Datumsplatzhalter 1"/>
+          <p:cNvSpPr>
+            <a:spLocks noGrp="1"/>
+          </p:cNvSpPr>
+          <p:nvPr>
+            <p:ph type="dt" sz="half" idx="10"/>
+          </p:nvPr>
+        </p:nvSpPr>
+        <p:spPr/>
+        <p:txBody>
+          <a:bodyPr/>
+          <a:lstStyle/>
+          <a:p>
+            <a:r>
+              <a:rPr lang="de-DE" smtClean="0"/>
+              <a:t>31.05.2016</a:t>
+            </a:r>
+            <a:endParaRPr lang="de-DE"/>
+          </a:p>
+        </p:txBody>
+      </p:sp>
+      <p:sp>
+        <p:nvSpPr>
+          <p:cNvPr id="3" name="Fußzeilenplatzhalter 2"/>
+          <p:cNvSpPr>
+            <a:spLocks noGrp="1"/>
+          </p:cNvSpPr>
+          <p:nvPr>
+            <p:ph type="ftr" sz="quarter" idx="11"/>
+          </p:nvPr>
+        </p:nvSpPr>
+        <p:spPr/>
+        <p:txBody>
+          <a:bodyPr/>
+          <a:lstStyle/>
+          <a:p>
+            <a:r>
+              <a:rPr lang="de-DE" smtClean="0"/>
+              <a:t>Daniel Fritz, HTWG Konstanz</a:t>
+            </a:r>
+            <a:endParaRPr lang="de-DE"/>
+          </a:p>
+        </p:txBody>
+      </p:sp>
+      <p:sp>
+        <p:nvSpPr>
+          <p:cNvPr id="4" name="Foliennummernplatzhalter 3"/>
+          <p:cNvSpPr>
+            <a:spLocks noGrp="1"/>
+          </p:cNvSpPr>
+          <p:nvPr>
+            <p:ph type="sldNum" sz="quarter" idx="12"/>
+          </p:nvPr>
+        </p:nvSpPr>
+        <p:spPr/>
+        <p:txBody>
+          <a:bodyPr/>
+          <a:lstStyle/>
+          <a:p>
+            <a:fld id="{4358C9F7-5955-4422-87CA-C4EB28FDAF6D}" type="slidenum">
+              <a:rPr lang="de-DE" smtClean="0"/>
+              <a:t>12</a:t>
+            </a:fld>
+            <a:endParaRPr lang="de-DE"/>
+          </a:p>
+        </p:txBody>
+      </p:sp>
+      <p:sp>
+        <p:nvSpPr>
+          <p:cNvPr id="6" name="Textplatzhalter 5"/>
+          <p:cNvSpPr>
+            <a:spLocks noGrp="1"/>
+          </p:cNvSpPr>
+          <p:nvPr>
+            <p:ph type="body" sz="quarter" idx="14"/>
+          </p:nvPr>
+        </p:nvSpPr>
+        <p:spPr/>
+        <p:txBody>
+          <a:bodyPr>
+            <a:normAutofit lnSpcReduction="10000"/>
+          </a:bodyPr>
+          <a:lstStyle/>
+          <a:p>
+            <a:r>
+              <a:rPr lang="de-DE" dirty="0" smtClean="0"/>
+              <a:t>2. Implementierungstechniken</a:t>
+            </a:r>
+            <a:endParaRPr lang="de-DE" dirty="0"/>
+          </a:p>
+        </p:txBody>
+      </p:sp>
+      <p:pic>
+        <p:nvPicPr>
+          <p:cNvPr id="7" name="Grafik 6"/>
+          <p:cNvPicPr>
+            <a:picLocks noChangeAspect="1"/>
+          </p:cNvPicPr>
+          <p:nvPr/>
+        </p:nvPicPr>
+        <p:blipFill>
+          <a:blip r:embed="rId3">
+            <a:extLst>
+              <a:ext uri="{28A0092B-C50C-407E-A947-70E740481C1C}">
+                <a14:useLocalDpi xmlns:a14="http://schemas.microsoft.com/office/drawing/2010/main" val="0"/>
+              </a:ext>
+            </a:extLst>
+          </a:blip>
+          <a:stretch>
+            <a:fillRect/>
+          </a:stretch>
+        </p:blipFill>
+        <p:spPr>
+          <a:xfrm>
+            <a:off x="280771" y="2420888"/>
+            <a:ext cx="8582458" cy="3559770"/>
+          </a:xfrm>
+          <a:prstGeom prst="rect">
+            <a:avLst/>
+          </a:prstGeom>
+        </p:spPr>
+      </p:pic>
+      <p:sp>
+        <p:nvSpPr>
+          <p:cNvPr id="5" name="Rechteck 4"/>
           <p:cNvSpPr/>
           <p:nvPr/>
         </p:nvSpPr>
         <p:spPr>
           <a:xfrm>
-            <a:off x="4898735" y="980728"/>
-            <a:ext cx="504056" cy="3384376"/>
+            <a:off x="2339752" y="2256557"/>
+            <a:ext cx="2088232" cy="1224136"/>
           </a:xfrm>
           <a:prstGeom prst="rect">
             <a:avLst/>
@@ -5242,10 +5564,67 @@
           </a:p>
         </p:txBody>
       </p:sp>
+      <p:sp>
+        <p:nvSpPr>
+          <p:cNvPr id="9" name="Textfeld 8"/>
+          <p:cNvSpPr txBox="1"/>
+          <p:nvPr/>
+        </p:nvSpPr>
+        <p:spPr>
+          <a:xfrm>
+            <a:off x="395536" y="836712"/>
+            <a:ext cx="8467693" cy="1323439"/>
+          </a:xfrm>
+          <a:prstGeom prst="rect">
+            <a:avLst/>
+          </a:prstGeom>
+          <a:noFill/>
+        </p:spPr>
+        <p:txBody>
+          <a:bodyPr wrap="square" rtlCol="0">
+            <a:spAutoFit/>
+          </a:bodyPr>
+          <a:lstStyle/>
+          <a:p>
+            <a:r>
+              <a:rPr lang="de-DE" sz="3200" dirty="0" smtClean="0"/>
+              <a:t>Datenstrukturen:</a:t>
+            </a:r>
+          </a:p>
+          <a:p>
+            <a:pPr marL="457200" indent="-457200">
+              <a:buFont typeface="Arial" panose="020B0604020202020204" pitchFamily="34" charset="0"/>
+              <a:buChar char="•"/>
+            </a:pPr>
+            <a:r>
+              <a:rPr lang="de-DE" sz="2400" dirty="0" smtClean="0"/>
+              <a:t>Zerlegung eines Ausdrucks</a:t>
+            </a:r>
+          </a:p>
+          <a:p>
+            <a:pPr marL="457200" indent="-457200">
+              <a:buFont typeface="Arial" panose="020B0604020202020204" pitchFamily="34" charset="0"/>
+              <a:buChar char="•"/>
+            </a:pPr>
+            <a:r>
+              <a:rPr lang="de-DE" sz="2400" dirty="0" smtClean="0"/>
+              <a:t>Speichern von Reihenfolgen und </a:t>
+            </a:r>
+            <a:r>
+              <a:rPr lang="de-DE" sz="2400" dirty="0"/>
+              <a:t>B</a:t>
+            </a:r>
+            <a:r>
+              <a:rPr lang="de-DE" sz="2400" dirty="0" smtClean="0"/>
+              <a:t>eziehungen</a:t>
+            </a:r>
+          </a:p>
+        </p:txBody>
+      </p:sp>
     </p:spTree>
     <p:extLst>
       <p:ext uri="{BB962C8B-B14F-4D97-AF65-F5344CB8AC3E}">
-        <p14:creationId xmlns:p14="http://schemas.microsoft.com/office/powerpoint/2010/main" val="2565030200"/>
+        <p14:creationId xmlns:p14="http://schemas.microsoft.com/office/powerpoint/2010/main" val="3899509453"/>
       </p:ext>
     </p:extLst>
   </p:cSld>
@@ -5286,7 +5665,11 @@
                                           </p:stCondLst>
                                         </p:cTn>
                                         <p:tgtEl>
-                                          <p:spTgt spid="10"/>
+                                          <p:spTgt spid="9">
+                                            <p:txEl>
+                                              <p:pRg st="0" end="0"/>
+                                            </p:txEl>
+                                          </p:spTgt>
                                         </p:tgtEl>
                                         <p:attrNameLst>
                                           <p:attrName>style.visibility</p:attrName>
@@ -5331,7 +5714,11 @@
                                           </p:stCondLst>
                                         </p:cTn>
                                         <p:tgtEl>
-                                          <p:spTgt spid="8"/>
+                                          <p:spTgt spid="9">
+                                            <p:txEl>
+                                              <p:pRg st="1" end="1"/>
+                                            </p:txEl>
+                                          </p:spTgt>
                                         </p:tgtEl>
                                         <p:attrNameLst>
                                           <p:attrName>style.visibility</p:attrName>
@@ -5344,15 +5731,127 @@
                                   </p:childTnLst>
                                 </p:cTn>
                               </p:par>
+                            </p:childTnLst>
+                          </p:cTn>
+                        </p:par>
+                      </p:childTnLst>
+                    </p:cTn>
+                  </p:par>
+                  <p:par>
+                    <p:cTn id="11" fill="hold">
+                      <p:stCondLst>
+                        <p:cond delay="indefinite"/>
+                      </p:stCondLst>
+                      <p:childTnLst>
+                        <p:par>
+                          <p:cTn id="12" fill="hold">
+                            <p:stCondLst>
+                              <p:cond delay="0"/>
+                            </p:stCondLst>
+                            <p:childTnLst>
                               <p:par>
-                                <p:cTn id="11" presetID="1" presetClass="entr" presetSubtype="0" fill="hold" grpId="0" nodeType="withEffect">
+                                <p:cTn id="13" presetID="1" presetClass="entr" presetSubtype="0" fill="hold" grpId="0" nodeType="clickEffect">
                                   <p:stCondLst>
                                     <p:cond delay="0"/>
                                   </p:stCondLst>
                                   <p:childTnLst>
                                     <p:set>
                                       <p:cBhvr>
-                                        <p:cTn id="12" dur="1" fill="hold">
+                                        <p:cTn id="14" dur="1" fill="hold">
+                                          <p:stCondLst>
+                                            <p:cond delay="0"/>
+                                          </p:stCondLst>
+                                        </p:cTn>
+                                        <p:tgtEl>
+                                          <p:spTgt spid="9">
+                                            <p:txEl>
+                                              <p:pRg st="2" end="2"/>
+                                            </p:txEl>
+                                          </p:spTgt>
+                                        </p:tgtEl>
+                                        <p:attrNameLst>
+                                          <p:attrName>style.visibility</p:attrName>
+                                        </p:attrNameLst>
+                                      </p:cBhvr>
+                                      <p:to>
+                                        <p:strVal val="visible"/>
+                                      </p:to>
+                                    </p:set>
+                                  </p:childTnLst>
+                                </p:cTn>
+                              </p:par>
+                            </p:childTnLst>
+                          </p:cTn>
+                        </p:par>
+                      </p:childTnLst>
+                    </p:cTn>
+                  </p:par>
+                  <p:par>
+                    <p:cTn id="15" fill="hold">
+                      <p:stCondLst>
+                        <p:cond delay="indefinite"/>
+                      </p:stCondLst>
+                      <p:childTnLst>
+                        <p:par>
+                          <p:cTn id="16" fill="hold">
+                            <p:stCondLst>
+                              <p:cond delay="0"/>
+                            </p:stCondLst>
+                            <p:childTnLst>
+                              <p:par>
+                                <p:cTn id="17" presetID="1" presetClass="entr" presetSubtype="0" fill="hold" nodeType="clickEffect">
+                                  <p:stCondLst>
+                                    <p:cond delay="0"/>
+                                  </p:stCondLst>
+                                  <p:childTnLst>
+                                    <p:set>
+                                      <p:cBhvr>
+                                        <p:cTn id="18" dur="1" fill="hold">
+                                          <p:stCondLst>
+                                            <p:cond delay="0"/>
+                                          </p:stCondLst>
+                                        </p:cTn>
+                                        <p:tgtEl>
+                                          <p:spTgt spid="7"/>
+                                        </p:tgtEl>
+                                        <p:attrNameLst>
+                                          <p:attrName>style.visibility</p:attrName>
+                                        </p:attrNameLst>
+                                      </p:cBhvr>
+                                      <p:to>
+                                        <p:strVal val="visible"/>
+                                      </p:to>
+                                    </p:set>
+                                  </p:childTnLst>
+                                </p:cTn>
+                              </p:par>
+                            </p:childTnLst>
+                          </p:cTn>
+                        </p:par>
+                      </p:childTnLst>
+                    </p:cTn>
+                  </p:par>
+                  <p:par>
+                    <p:cTn id="19" fill="hold">
+                      <p:stCondLst>
+                        <p:cond delay="indefinite"/>
+                      </p:stCondLst>
+                      <p:childTnLst>
+                        <p:par>
+                          <p:cTn id="20" fill="hold">
+                            <p:stCondLst>
+                              <p:cond delay="0"/>
+                            </p:stCondLst>
+                            <p:childTnLst>
+                              <p:par>
+                                <p:cTn id="21" presetID="1" presetClass="entr" presetSubtype="0" fill="hold" grpId="0" nodeType="clickEffect">
+                                  <p:stCondLst>
+                                    <p:cond delay="0"/>
+                                  </p:stCondLst>
+                                  <p:childTnLst>
+                                    <p:set>
+                                      <p:cBhvr>
+                                        <p:cTn id="22" dur="1" fill="hold">
                                           <p:stCondLst>
                                             <p:cond delay="0"/>
                                           </p:stCondLst>
@@ -5399,743 +5898,9 @@
       </p:par>
     </p:tnLst>
     <p:bldLst>
-      <p:bldP spid="5" grpId="0"/>
-      <p:bldP spid="8" grpId="0"/>
-      <p:bldP spid="10" grpId="0" animBg="1"/>
+      <p:bldP spid="5" grpId="0" animBg="1"/>
+      <p:bldP spid="9" grpId="0" uiExpand="1" build="p"/>
     </p:bldLst>
-  </p:timing>
-</p:sld>
-</file>
-
-<file path=ppt/slides/slide12.xml><?xml version="1.0" encoding="utf-8"?>
-<p:sld xmlns:a="http://schemas.openxmlformats.org/drawingml/2006/main" xmlns:r="http://schemas.openxmlformats.org/officeDocument/2006/relationships" xmlns:p="http://schemas.openxmlformats.org/presentationml/2006/main">
-  <p:cSld>
-    <p:spTree>
-      <p:nvGrpSpPr>
-        <p:cNvPr id="1" name=""/>
-        <p:cNvGrpSpPr/>
-        <p:nvPr/>
-      </p:nvGrpSpPr>
-      <p:grpSpPr>
-        <a:xfrm>
-          <a:off x="0" y="0"/>
-          <a:ext cx="0" cy="0"/>
-          <a:chOff x="0" y="0"/>
-          <a:chExt cx="0" cy="0"/>
-        </a:xfrm>
-      </p:grpSpPr>
-      <p:sp>
-        <p:nvSpPr>
-          <p:cNvPr id="2" name="Datumsplatzhalter 1"/>
-          <p:cNvSpPr>
-            <a:spLocks noGrp="1"/>
-          </p:cNvSpPr>
-          <p:nvPr>
-            <p:ph type="dt" sz="half" idx="10"/>
-          </p:nvPr>
-        </p:nvSpPr>
-        <p:spPr/>
-        <p:txBody>
-          <a:bodyPr/>
-          <a:lstStyle/>
-          <a:p>
-            <a:r>
-              <a:rPr lang="de-DE" smtClean="0"/>
-              <a:t>31.05.2016</a:t>
-            </a:r>
-            <a:endParaRPr lang="de-DE"/>
-          </a:p>
-        </p:txBody>
-      </p:sp>
-      <p:sp>
-        <p:nvSpPr>
-          <p:cNvPr id="3" name="Fußzeilenplatzhalter 2"/>
-          <p:cNvSpPr>
-            <a:spLocks noGrp="1"/>
-          </p:cNvSpPr>
-          <p:nvPr>
-            <p:ph type="ftr" sz="quarter" idx="11"/>
-          </p:nvPr>
-        </p:nvSpPr>
-        <p:spPr/>
-        <p:txBody>
-          <a:bodyPr/>
-          <a:lstStyle/>
-          <a:p>
-            <a:r>
-              <a:rPr lang="de-DE" smtClean="0"/>
-              <a:t>Daniel Fritz, HTWG Konstanz</a:t>
-            </a:r>
-            <a:endParaRPr lang="de-DE"/>
-          </a:p>
-        </p:txBody>
-      </p:sp>
-      <p:sp>
-        <p:nvSpPr>
-          <p:cNvPr id="4" name="Foliennummernplatzhalter 3"/>
-          <p:cNvSpPr>
-            <a:spLocks noGrp="1"/>
-          </p:cNvSpPr>
-          <p:nvPr>
-            <p:ph type="sldNum" sz="quarter" idx="12"/>
-          </p:nvPr>
-        </p:nvSpPr>
-        <p:spPr/>
-        <p:txBody>
-          <a:bodyPr/>
-          <a:lstStyle/>
-          <a:p>
-            <a:fld id="{4358C9F7-5955-4422-87CA-C4EB28FDAF6D}" type="slidenum">
-              <a:rPr lang="de-DE" smtClean="0"/>
-              <a:t>12</a:t>
-            </a:fld>
-            <a:endParaRPr lang="de-DE"/>
-          </a:p>
-        </p:txBody>
-      </p:sp>
-      <p:sp>
-        <p:nvSpPr>
-          <p:cNvPr id="6" name="Textplatzhalter 5"/>
-          <p:cNvSpPr>
-            <a:spLocks noGrp="1"/>
-          </p:cNvSpPr>
-          <p:nvPr>
-            <p:ph type="body" sz="quarter" idx="14"/>
-          </p:nvPr>
-        </p:nvSpPr>
-        <p:spPr/>
-        <p:txBody>
-          <a:bodyPr>
-            <a:normAutofit lnSpcReduction="10000"/>
-          </a:bodyPr>
-          <a:lstStyle/>
-          <a:p>
-            <a:r>
-              <a:rPr lang="de-DE" dirty="0" smtClean="0"/>
-              <a:t>2. Implementierungstechniken – Definition der Sprache</a:t>
-            </a:r>
-            <a:endParaRPr lang="de-DE" dirty="0"/>
-          </a:p>
-        </p:txBody>
-      </p:sp>
-      <p:sp>
-        <p:nvSpPr>
-          <p:cNvPr id="5" name="Textfeld 4"/>
-          <p:cNvSpPr txBox="1"/>
-          <p:nvPr/>
-        </p:nvSpPr>
-        <p:spPr>
-          <a:xfrm>
-            <a:off x="5220072" y="4435088"/>
-            <a:ext cx="3672408" cy="1200329"/>
-          </a:xfrm>
-          <a:prstGeom prst="rect">
-            <a:avLst/>
-          </a:prstGeom>
-          <a:noFill/>
-        </p:spPr>
-        <p:txBody>
-          <a:bodyPr wrap="square" rtlCol="0">
-            <a:spAutoFit/>
-          </a:bodyPr>
-          <a:lstStyle/>
-          <a:p>
-            <a:endParaRPr lang="de-DE" dirty="0">
-              <a:solidFill>
-                <a:srgbClr val="FF0000"/>
-              </a:solidFill>
-              <a:latin typeface="Courier" pitchFamily="49" charset="0"/>
-            </a:endParaRPr>
-          </a:p>
-          <a:p>
-            <a:r>
-              <a:rPr lang="de-DE" dirty="0" smtClean="0">
-                <a:latin typeface="Courier" pitchFamily="49" charset="0"/>
-              </a:rPr>
-              <a:t>Interface End</a:t>
-            </a:r>
-            <a:r>
-              <a:rPr lang="de-DE" dirty="0" smtClean="0">
-                <a:solidFill>
-                  <a:srgbClr val="FF0000"/>
-                </a:solidFill>
-                <a:latin typeface="Courier" pitchFamily="49" charset="0"/>
-                <a:cs typeface="Courier New" panose="02070309020205020404" pitchFamily="49" charset="0"/>
-              </a:rPr>
-              <a:t>&lt;T&gt;</a:t>
-            </a:r>
-            <a:r>
-              <a:rPr lang="de-DE" dirty="0" smtClean="0">
-                <a:latin typeface="Courier" pitchFamily="49" charset="0"/>
-              </a:rPr>
-              <a:t> {</a:t>
-            </a:r>
-          </a:p>
-          <a:p>
-            <a:pPr lvl="1"/>
-            <a:r>
-              <a:rPr lang="de-DE" dirty="0" smtClean="0">
-                <a:solidFill>
-                  <a:srgbClr val="FF0000"/>
-                </a:solidFill>
-                <a:latin typeface="Courier" pitchFamily="49" charset="0"/>
-                <a:cs typeface="Courier New" panose="02070309020205020404" pitchFamily="49" charset="0"/>
-              </a:rPr>
-              <a:t>T </a:t>
-            </a:r>
-            <a:r>
-              <a:rPr lang="de-DE" dirty="0" smtClean="0">
-                <a:latin typeface="Courier" pitchFamily="49" charset="0"/>
-                <a:cs typeface="Courier New" panose="02070309020205020404" pitchFamily="49" charset="0"/>
-              </a:rPr>
-              <a:t>end();</a:t>
-            </a:r>
-            <a:r>
-              <a:rPr lang="de-DE" dirty="0" smtClean="0">
-                <a:latin typeface="Courier" pitchFamily="49" charset="0"/>
-              </a:rPr>
-              <a:t> </a:t>
-            </a:r>
-          </a:p>
-          <a:p>
-            <a:r>
-              <a:rPr lang="de-DE" dirty="0" smtClean="0">
-                <a:latin typeface="Courier" pitchFamily="49" charset="0"/>
-              </a:rPr>
-              <a:t>}</a:t>
-            </a:r>
-            <a:endParaRPr lang="de-DE" dirty="0" smtClean="0">
-              <a:latin typeface="Courier" pitchFamily="49" charset="0"/>
-              <a:cs typeface="Courier New" panose="02070309020205020404" pitchFamily="49" charset="0"/>
-            </a:endParaRPr>
-          </a:p>
-        </p:txBody>
-      </p:sp>
-      <p:pic>
-        <p:nvPicPr>
-          <p:cNvPr id="9" name="Grafik 8"/>
-          <p:cNvPicPr>
-            <a:picLocks noChangeAspect="1"/>
-          </p:cNvPicPr>
-          <p:nvPr/>
-        </p:nvPicPr>
-        <p:blipFill>
-          <a:blip r:embed="rId3">
-            <a:extLst>
-              <a:ext uri="{28A0092B-C50C-407E-A947-70E740481C1C}">
-                <a14:useLocalDpi xmlns:a14="http://schemas.microsoft.com/office/drawing/2010/main" val="0"/>
-              </a:ext>
-            </a:extLst>
-          </a:blip>
-          <a:stretch>
-            <a:fillRect/>
-          </a:stretch>
-        </p:blipFill>
-        <p:spPr>
-          <a:xfrm>
-            <a:off x="2609660" y="1057662"/>
-            <a:ext cx="6437366" cy="3163426"/>
-          </a:xfrm>
-          <a:prstGeom prst="rect">
-            <a:avLst/>
-          </a:prstGeom>
-        </p:spPr>
-      </p:pic>
-      <p:sp>
-        <p:nvSpPr>
-          <p:cNvPr id="8" name="Textfeld 7"/>
-          <p:cNvSpPr txBox="1"/>
-          <p:nvPr/>
-        </p:nvSpPr>
-        <p:spPr>
-          <a:xfrm>
-            <a:off x="107504" y="1942097"/>
-            <a:ext cx="5184575" cy="4247317"/>
-          </a:xfrm>
-          <a:prstGeom prst="rect">
-            <a:avLst/>
-          </a:prstGeom>
-          <a:noFill/>
-        </p:spPr>
-        <p:txBody>
-          <a:bodyPr wrap="square" rtlCol="0">
-            <a:spAutoFit/>
-          </a:bodyPr>
-          <a:lstStyle/>
-          <a:p>
-            <a:r>
-              <a:rPr lang="de-DE" dirty="0" smtClean="0">
-                <a:latin typeface="Courier" pitchFamily="49" charset="0"/>
-                <a:cs typeface="Courier New" panose="02070309020205020404" pitchFamily="49" charset="0"/>
-              </a:rPr>
-              <a:t>Interface </a:t>
-            </a:r>
-            <a:r>
-              <a:rPr lang="de-DE" dirty="0" err="1" smtClean="0">
-                <a:latin typeface="Courier" pitchFamily="49" charset="0"/>
-                <a:cs typeface="Courier New" panose="02070309020205020404" pitchFamily="49" charset="0"/>
-              </a:rPr>
-              <a:t>Expr</a:t>
-            </a:r>
-            <a:r>
-              <a:rPr lang="de-DE" dirty="0" smtClean="0">
-                <a:solidFill>
-                  <a:srgbClr val="FF0000"/>
-                </a:solidFill>
-                <a:latin typeface="Courier" pitchFamily="49" charset="0"/>
-                <a:cs typeface="Courier New" panose="02070309020205020404" pitchFamily="49" charset="0"/>
-              </a:rPr>
-              <a:t>&lt;T&gt;</a:t>
-            </a:r>
-            <a:r>
-              <a:rPr lang="de-DE" dirty="0" smtClean="0">
-                <a:latin typeface="Courier" pitchFamily="49" charset="0"/>
-                <a:cs typeface="Courier New" panose="02070309020205020404" pitchFamily="49" charset="0"/>
-              </a:rPr>
-              <a:t> {</a:t>
-            </a:r>
-          </a:p>
-          <a:p>
-            <a:pPr lvl="1"/>
-            <a:r>
-              <a:rPr lang="de-DE" dirty="0" smtClean="0">
-                <a:latin typeface="Courier" pitchFamily="49" charset="0"/>
-                <a:cs typeface="Courier New" panose="02070309020205020404" pitchFamily="49" charset="0"/>
-              </a:rPr>
-              <a:t>Operation </a:t>
-            </a:r>
-            <a:r>
-              <a:rPr lang="de-DE" dirty="0" err="1" smtClean="0">
-                <a:latin typeface="Courier" pitchFamily="49" charset="0"/>
-                <a:cs typeface="Courier New" panose="02070309020205020404" pitchFamily="49" charset="0"/>
-              </a:rPr>
-              <a:t>expr</a:t>
-            </a:r>
-            <a:r>
-              <a:rPr lang="de-DE" dirty="0" smtClean="0">
-                <a:latin typeface="Courier" pitchFamily="49" charset="0"/>
-                <a:cs typeface="Courier New" panose="02070309020205020404" pitchFamily="49" charset="0"/>
-              </a:rPr>
-              <a:t>(</a:t>
-            </a:r>
-            <a:r>
-              <a:rPr lang="de-DE" dirty="0" err="1" smtClean="0">
-                <a:latin typeface="Courier" pitchFamily="49" charset="0"/>
-                <a:cs typeface="Courier New" panose="02070309020205020404" pitchFamily="49" charset="0"/>
-              </a:rPr>
-              <a:t>int</a:t>
-            </a:r>
-            <a:r>
-              <a:rPr lang="de-DE" dirty="0" smtClean="0">
-                <a:latin typeface="Courier" pitchFamily="49" charset="0"/>
-                <a:cs typeface="Courier New" panose="02070309020205020404" pitchFamily="49" charset="0"/>
-              </a:rPr>
-              <a:t>);</a:t>
-            </a:r>
-          </a:p>
-          <a:p>
-            <a:pPr lvl="1"/>
-            <a:r>
-              <a:rPr lang="de-DE" dirty="0" smtClean="0">
-                <a:latin typeface="Courier" pitchFamily="49" charset="0"/>
-                <a:cs typeface="Courier New" panose="02070309020205020404" pitchFamily="49" charset="0"/>
-              </a:rPr>
-              <a:t>Operation </a:t>
-            </a:r>
-            <a:r>
-              <a:rPr lang="de-DE" dirty="0" err="1" smtClean="0">
-                <a:latin typeface="Courier" pitchFamily="49" charset="0"/>
-                <a:cs typeface="Courier New" panose="02070309020205020404" pitchFamily="49" charset="0"/>
-              </a:rPr>
-              <a:t>expr</a:t>
-            </a:r>
-            <a:r>
-              <a:rPr lang="de-DE" dirty="0" smtClean="0">
-                <a:latin typeface="Courier" pitchFamily="49" charset="0"/>
-                <a:cs typeface="Courier New" panose="02070309020205020404" pitchFamily="49" charset="0"/>
-              </a:rPr>
-              <a:t>(</a:t>
-            </a:r>
-            <a:r>
-              <a:rPr lang="de-DE" dirty="0" smtClean="0">
-                <a:solidFill>
-                  <a:srgbClr val="FF0000"/>
-                </a:solidFill>
-                <a:latin typeface="Courier" pitchFamily="49" charset="0"/>
-                <a:cs typeface="Courier New" panose="02070309020205020404" pitchFamily="49" charset="0"/>
-              </a:rPr>
-              <a:t>T</a:t>
-            </a:r>
-            <a:r>
-              <a:rPr lang="de-DE" dirty="0" smtClean="0">
-                <a:latin typeface="Courier" pitchFamily="49" charset="0"/>
-                <a:cs typeface="Courier New" panose="02070309020205020404" pitchFamily="49" charset="0"/>
-              </a:rPr>
-              <a:t>);</a:t>
-            </a:r>
-          </a:p>
-          <a:p>
-            <a:r>
-              <a:rPr lang="de-DE" dirty="0" smtClean="0">
-                <a:latin typeface="Courier" pitchFamily="49" charset="0"/>
-                <a:cs typeface="Courier New" panose="02070309020205020404" pitchFamily="49" charset="0"/>
-              </a:rPr>
-              <a:t>}</a:t>
-            </a:r>
-          </a:p>
-          <a:p>
-            <a:endParaRPr lang="de-DE" dirty="0" smtClean="0">
-              <a:solidFill>
-                <a:srgbClr val="FF0000"/>
-              </a:solidFill>
-              <a:latin typeface="Courier" pitchFamily="49" charset="0"/>
-              <a:cs typeface="Courier New" panose="02070309020205020404" pitchFamily="49" charset="0"/>
-            </a:endParaRPr>
-          </a:p>
-          <a:p>
-            <a:r>
-              <a:rPr lang="de-DE" dirty="0" smtClean="0">
-                <a:latin typeface="Courier" pitchFamily="49" charset="0"/>
-                <a:cs typeface="Courier New" panose="02070309020205020404" pitchFamily="49" charset="0"/>
-              </a:rPr>
-              <a:t>Interface</a:t>
-            </a:r>
-            <a:r>
-              <a:rPr lang="de-DE" dirty="0" smtClean="0">
-                <a:solidFill>
-                  <a:srgbClr val="FF0000"/>
-                </a:solidFill>
-                <a:latin typeface="Courier" pitchFamily="49" charset="0"/>
-                <a:cs typeface="Courier New" panose="02070309020205020404" pitchFamily="49" charset="0"/>
-              </a:rPr>
-              <a:t> </a:t>
-            </a:r>
-            <a:r>
-              <a:rPr lang="de-DE" dirty="0" smtClean="0">
-                <a:latin typeface="Courier" pitchFamily="49" charset="0"/>
-                <a:cs typeface="Courier New" panose="02070309020205020404" pitchFamily="49" charset="0"/>
-              </a:rPr>
-              <a:t>Operation</a:t>
-            </a:r>
-            <a:r>
-              <a:rPr lang="de-DE" dirty="0" smtClean="0">
-                <a:solidFill>
-                  <a:srgbClr val="FF0000"/>
-                </a:solidFill>
-                <a:latin typeface="Courier" pitchFamily="49" charset="0"/>
-                <a:cs typeface="Courier New" panose="02070309020205020404" pitchFamily="49" charset="0"/>
-              </a:rPr>
-              <a:t>&lt;T&gt; </a:t>
-            </a:r>
-            <a:r>
-              <a:rPr lang="de-DE" dirty="0" err="1" smtClean="0">
-                <a:latin typeface="Courier" pitchFamily="49" charset="0"/>
-                <a:cs typeface="Courier New" panose="02070309020205020404" pitchFamily="49" charset="0"/>
-              </a:rPr>
-              <a:t>extends</a:t>
-            </a:r>
-            <a:r>
-              <a:rPr lang="de-DE" dirty="0" smtClean="0">
-                <a:latin typeface="Courier" pitchFamily="49" charset="0"/>
-                <a:cs typeface="Courier New" panose="02070309020205020404" pitchFamily="49" charset="0"/>
-              </a:rPr>
-              <a:t> End{</a:t>
-            </a:r>
-          </a:p>
-          <a:p>
-            <a:pPr lvl="1"/>
-            <a:r>
-              <a:rPr lang="de-DE" dirty="0" smtClean="0">
-                <a:latin typeface="Courier" pitchFamily="49" charset="0"/>
-                <a:cs typeface="Courier New" panose="02070309020205020404" pitchFamily="49" charset="0"/>
-              </a:rPr>
-              <a:t>Operation plus(</a:t>
-            </a:r>
-            <a:r>
-              <a:rPr lang="de-DE" dirty="0" err="1" smtClean="0">
-                <a:latin typeface="Courier" pitchFamily="49" charset="0"/>
-                <a:cs typeface="Courier New" panose="02070309020205020404" pitchFamily="49" charset="0"/>
-              </a:rPr>
-              <a:t>int</a:t>
-            </a:r>
-            <a:r>
-              <a:rPr lang="de-DE" dirty="0" smtClean="0">
-                <a:latin typeface="Courier" pitchFamily="49" charset="0"/>
-                <a:cs typeface="Courier New" panose="02070309020205020404" pitchFamily="49" charset="0"/>
-              </a:rPr>
-              <a:t>);</a:t>
-            </a:r>
-          </a:p>
-          <a:p>
-            <a:pPr lvl="1"/>
-            <a:r>
-              <a:rPr lang="de-DE" dirty="0" smtClean="0">
-                <a:latin typeface="Courier" pitchFamily="49" charset="0"/>
-                <a:cs typeface="Courier New" panose="02070309020205020404" pitchFamily="49" charset="0"/>
-              </a:rPr>
-              <a:t>Operation plus(</a:t>
-            </a:r>
-            <a:r>
-              <a:rPr lang="de-DE" dirty="0" smtClean="0">
-                <a:solidFill>
-                  <a:srgbClr val="FF0000"/>
-                </a:solidFill>
-                <a:latin typeface="Courier" pitchFamily="49" charset="0"/>
-                <a:cs typeface="Courier New" panose="02070309020205020404" pitchFamily="49" charset="0"/>
-              </a:rPr>
-              <a:t>T</a:t>
-            </a:r>
-            <a:r>
-              <a:rPr lang="de-DE" dirty="0" smtClean="0">
-                <a:latin typeface="Courier" pitchFamily="49" charset="0"/>
-                <a:cs typeface="Courier New" panose="02070309020205020404" pitchFamily="49" charset="0"/>
-              </a:rPr>
-              <a:t>);</a:t>
-            </a:r>
-          </a:p>
-          <a:p>
-            <a:pPr lvl="1"/>
-            <a:r>
-              <a:rPr lang="de-DE" dirty="0" smtClean="0">
-                <a:latin typeface="Courier" pitchFamily="49" charset="0"/>
-                <a:cs typeface="Courier New" panose="02070309020205020404" pitchFamily="49" charset="0"/>
-              </a:rPr>
-              <a:t>Operation </a:t>
-            </a:r>
-            <a:r>
-              <a:rPr lang="de-DE" dirty="0" smtClean="0">
-                <a:latin typeface="Courier" pitchFamily="49" charset="0"/>
-                <a:cs typeface="Courier New" panose="02070309020205020404" pitchFamily="49" charset="0"/>
-              </a:rPr>
-              <a:t>minus(</a:t>
-            </a:r>
-            <a:r>
-              <a:rPr lang="de-DE" dirty="0" err="1" smtClean="0">
-                <a:latin typeface="Courier" pitchFamily="49" charset="0"/>
-                <a:cs typeface="Courier New" panose="02070309020205020404" pitchFamily="49" charset="0"/>
-              </a:rPr>
-              <a:t>int</a:t>
-            </a:r>
-            <a:r>
-              <a:rPr lang="de-DE" dirty="0" smtClean="0">
-                <a:latin typeface="Courier" pitchFamily="49" charset="0"/>
-                <a:cs typeface="Courier New" panose="02070309020205020404" pitchFamily="49" charset="0"/>
-              </a:rPr>
-              <a:t>);</a:t>
-            </a:r>
-          </a:p>
-          <a:p>
-            <a:pPr lvl="1"/>
-            <a:r>
-              <a:rPr lang="de-DE" dirty="0" smtClean="0">
-                <a:latin typeface="Courier" pitchFamily="49" charset="0"/>
-                <a:cs typeface="Courier New" panose="02070309020205020404" pitchFamily="49" charset="0"/>
-              </a:rPr>
-              <a:t>Operation minus(</a:t>
-            </a:r>
-            <a:r>
-              <a:rPr lang="de-DE" dirty="0" smtClean="0">
-                <a:solidFill>
-                  <a:srgbClr val="FF0000"/>
-                </a:solidFill>
-                <a:latin typeface="Courier" pitchFamily="49" charset="0"/>
-                <a:cs typeface="Courier New" panose="02070309020205020404" pitchFamily="49" charset="0"/>
-              </a:rPr>
-              <a:t>T</a:t>
-            </a:r>
-            <a:r>
-              <a:rPr lang="de-DE" dirty="0" smtClean="0">
-                <a:latin typeface="Courier" pitchFamily="49" charset="0"/>
-                <a:cs typeface="Courier New" panose="02070309020205020404" pitchFamily="49" charset="0"/>
-              </a:rPr>
-              <a:t>);</a:t>
-            </a:r>
-          </a:p>
-          <a:p>
-            <a:pPr lvl="1"/>
-            <a:r>
-              <a:rPr lang="de-DE" dirty="0" smtClean="0">
-                <a:latin typeface="Courier" pitchFamily="49" charset="0"/>
-                <a:cs typeface="Courier New" panose="02070309020205020404" pitchFamily="49" charset="0"/>
-              </a:rPr>
-              <a:t>Operation </a:t>
-            </a:r>
-            <a:r>
-              <a:rPr lang="de-DE" dirty="0" err="1" smtClean="0">
-                <a:latin typeface="Courier" pitchFamily="49" charset="0"/>
-                <a:cs typeface="Courier New" panose="02070309020205020404" pitchFamily="49" charset="0"/>
-              </a:rPr>
-              <a:t>times</a:t>
-            </a:r>
-            <a:r>
-              <a:rPr lang="de-DE" dirty="0" smtClean="0">
-                <a:latin typeface="Courier" pitchFamily="49" charset="0"/>
-                <a:cs typeface="Courier New" panose="02070309020205020404" pitchFamily="49" charset="0"/>
-              </a:rPr>
-              <a:t>(</a:t>
-            </a:r>
-            <a:r>
-              <a:rPr lang="de-DE" dirty="0" err="1" smtClean="0">
-                <a:latin typeface="Courier" pitchFamily="49" charset="0"/>
-                <a:cs typeface="Courier New" panose="02070309020205020404" pitchFamily="49" charset="0"/>
-              </a:rPr>
-              <a:t>int</a:t>
-            </a:r>
-            <a:r>
-              <a:rPr lang="de-DE" dirty="0" smtClean="0">
-                <a:latin typeface="Courier" pitchFamily="49" charset="0"/>
-                <a:cs typeface="Courier New" panose="02070309020205020404" pitchFamily="49" charset="0"/>
-              </a:rPr>
-              <a:t>);</a:t>
-            </a:r>
-          </a:p>
-          <a:p>
-            <a:pPr lvl="1"/>
-            <a:r>
-              <a:rPr lang="de-DE" dirty="0" smtClean="0">
-                <a:latin typeface="Courier" pitchFamily="49" charset="0"/>
-                <a:cs typeface="Courier New" panose="02070309020205020404" pitchFamily="49" charset="0"/>
-              </a:rPr>
-              <a:t>Operation </a:t>
-            </a:r>
-            <a:r>
-              <a:rPr lang="de-DE" dirty="0" err="1" smtClean="0">
-                <a:latin typeface="Courier" pitchFamily="49" charset="0"/>
-                <a:cs typeface="Courier New" panose="02070309020205020404" pitchFamily="49" charset="0"/>
-              </a:rPr>
-              <a:t>times</a:t>
-            </a:r>
-            <a:r>
-              <a:rPr lang="de-DE" dirty="0" smtClean="0">
-                <a:latin typeface="Courier" pitchFamily="49" charset="0"/>
-                <a:cs typeface="Courier New" panose="02070309020205020404" pitchFamily="49" charset="0"/>
-              </a:rPr>
-              <a:t>(</a:t>
-            </a:r>
-            <a:r>
-              <a:rPr lang="de-DE" dirty="0" smtClean="0">
-                <a:solidFill>
-                  <a:srgbClr val="FF0000"/>
-                </a:solidFill>
-                <a:latin typeface="Courier" pitchFamily="49" charset="0"/>
-                <a:cs typeface="Courier New" panose="02070309020205020404" pitchFamily="49" charset="0"/>
-              </a:rPr>
-              <a:t>T</a:t>
-            </a:r>
-            <a:r>
-              <a:rPr lang="de-DE" dirty="0" smtClean="0">
-                <a:latin typeface="Courier" pitchFamily="49" charset="0"/>
-                <a:cs typeface="Courier New" panose="02070309020205020404" pitchFamily="49" charset="0"/>
-              </a:rPr>
-              <a:t>);</a:t>
-            </a:r>
-          </a:p>
-          <a:p>
-            <a:pPr lvl="1"/>
-            <a:r>
-              <a:rPr lang="de-DE" dirty="0" smtClean="0">
-                <a:latin typeface="Courier" pitchFamily="49" charset="0"/>
-                <a:cs typeface="Courier New" panose="02070309020205020404" pitchFamily="49" charset="0"/>
-              </a:rPr>
-              <a:t>Operation </a:t>
-            </a:r>
-            <a:r>
-              <a:rPr lang="de-DE" dirty="0" err="1" smtClean="0">
-                <a:latin typeface="Courier" pitchFamily="49" charset="0"/>
-                <a:cs typeface="Courier New" panose="02070309020205020404" pitchFamily="49" charset="0"/>
-              </a:rPr>
-              <a:t>divided</a:t>
-            </a:r>
-            <a:r>
-              <a:rPr lang="de-DE" dirty="0" smtClean="0">
-                <a:latin typeface="Courier" pitchFamily="49" charset="0"/>
-                <a:cs typeface="Courier New" panose="02070309020205020404" pitchFamily="49" charset="0"/>
-              </a:rPr>
-              <a:t>(</a:t>
-            </a:r>
-            <a:r>
-              <a:rPr lang="de-DE" dirty="0" err="1" smtClean="0">
-                <a:latin typeface="Courier" pitchFamily="49" charset="0"/>
-                <a:cs typeface="Courier New" panose="02070309020205020404" pitchFamily="49" charset="0"/>
-              </a:rPr>
-              <a:t>int</a:t>
-            </a:r>
-            <a:r>
-              <a:rPr lang="de-DE" dirty="0" smtClean="0">
-                <a:latin typeface="Courier" pitchFamily="49" charset="0"/>
-                <a:cs typeface="Courier New" panose="02070309020205020404" pitchFamily="49" charset="0"/>
-              </a:rPr>
-              <a:t>);</a:t>
-            </a:r>
-          </a:p>
-          <a:p>
-            <a:pPr lvl="1"/>
-            <a:r>
-              <a:rPr lang="de-DE" dirty="0" smtClean="0">
-                <a:latin typeface="Courier" pitchFamily="49" charset="0"/>
-                <a:cs typeface="Courier New" panose="02070309020205020404" pitchFamily="49" charset="0"/>
-              </a:rPr>
-              <a:t>Operation </a:t>
-            </a:r>
-            <a:r>
-              <a:rPr lang="de-DE" dirty="0" err="1" smtClean="0">
-                <a:latin typeface="Courier" pitchFamily="49" charset="0"/>
-                <a:cs typeface="Courier New" panose="02070309020205020404" pitchFamily="49" charset="0"/>
-              </a:rPr>
-              <a:t>divided</a:t>
-            </a:r>
-            <a:r>
-              <a:rPr lang="de-DE" dirty="0" smtClean="0">
-                <a:latin typeface="Courier" pitchFamily="49" charset="0"/>
-                <a:cs typeface="Courier New" panose="02070309020205020404" pitchFamily="49" charset="0"/>
-              </a:rPr>
-              <a:t>(</a:t>
-            </a:r>
-            <a:r>
-              <a:rPr lang="de-DE" dirty="0" smtClean="0">
-                <a:solidFill>
-                  <a:srgbClr val="FF0000"/>
-                </a:solidFill>
-                <a:latin typeface="Courier" pitchFamily="49" charset="0"/>
-                <a:cs typeface="Courier New" panose="02070309020205020404" pitchFamily="49" charset="0"/>
-              </a:rPr>
-              <a:t>T</a:t>
-            </a:r>
-            <a:r>
-              <a:rPr lang="de-DE" dirty="0" smtClean="0">
-                <a:latin typeface="Courier" pitchFamily="49" charset="0"/>
-                <a:cs typeface="Courier New" panose="02070309020205020404" pitchFamily="49" charset="0"/>
-              </a:rPr>
-              <a:t>);</a:t>
-            </a:r>
-          </a:p>
-          <a:p>
-            <a:r>
-              <a:rPr lang="de-DE" dirty="0" smtClean="0">
-                <a:latin typeface="Courier" pitchFamily="49" charset="0"/>
-                <a:cs typeface="Courier New" panose="02070309020205020404" pitchFamily="49" charset="0"/>
-              </a:rPr>
-              <a:t>}</a:t>
-            </a:r>
-          </a:p>
-        </p:txBody>
-      </p:sp>
-    </p:spTree>
-    <p:extLst>
-      <p:ext uri="{BB962C8B-B14F-4D97-AF65-F5344CB8AC3E}">
-        <p14:creationId xmlns:p14="http://schemas.microsoft.com/office/powerpoint/2010/main" val="363694148"/>
-      </p:ext>
-    </p:extLst>
-  </p:cSld>
-  <p:clrMapOvr>
-    <a:masterClrMapping/>
-  </p:clrMapOvr>
-  <p:timing>
-    <p:tnLst>
-      <p:par>
-        <p:cTn id="1" dur="indefinite" restart="never" nodeType="tmRoot"/>
-      </p:par>
-    </p:tnLst>
   </p:timing>
 </p:sld>
 </file>
@@ -6284,7 +6049,6 @@
               <a:rPr lang="de-DE" dirty="0" smtClean="0"/>
               <a:t> nie Rückgabetyp</a:t>
             </a:r>
-            <a:endParaRPr lang="de-DE" dirty="0" smtClean="0"/>
           </a:p>
           <a:p>
             <a:pPr lvl="2"/>
@@ -6762,14 +6526,7 @@
                 <a:latin typeface="Courier" pitchFamily="49" charset="0"/>
                 <a:cs typeface="Courier New" panose="02070309020205020404" pitchFamily="49" charset="0"/>
               </a:rPr>
-              <a:t>Operation </a:t>
-            </a:r>
-            <a:r>
-              <a:rPr lang="de-DE" dirty="0" smtClean="0">
-                <a:latin typeface="Courier" pitchFamily="49" charset="0"/>
-                <a:cs typeface="Courier New" panose="02070309020205020404" pitchFamily="49" charset="0"/>
-              </a:rPr>
-              <a:t>minus(</a:t>
+              <a:t>Operation minus(</a:t>
             </a:r>
             <a:r>
               <a:rPr lang="de-DE" dirty="0" err="1" smtClean="0">
@@ -9779,10 +9536,6 @@
               </a:rPr>
               <a:t>}</a:t>
             </a:r>
-            <a:endParaRPr lang="de-DE" sz="1800" dirty="0" smtClean="0">
-              <a:latin typeface="Courier New" panose="02070309020205020404" pitchFamily="49" charset="0"/>
-              <a:cs typeface="Courier New" panose="02070309020205020404" pitchFamily="49" charset="0"/>
-            </a:endParaRPr>
           </a:p>
         </p:txBody>
       </p:sp>
@@ -10674,10 +10427,6 @@
               </a:rPr>
               <a:t>}</a:t>
             </a:r>
-            <a:endParaRPr lang="de-DE" sz="1800" dirty="0" smtClean="0">
-              <a:latin typeface="Courier New" panose="02070309020205020404" pitchFamily="49" charset="0"/>
-              <a:cs typeface="Courier New" panose="02070309020205020404" pitchFamily="49" charset="0"/>
-            </a:endParaRPr>
           </a:p>
         </p:txBody>
       </p:sp>
@@ -20342,6 +20091,187 @@
 </p:sld>
 </file>
 
+<file path=ppt/slides/slide33.xml><?xml version="1.0" encoding="utf-8"?>
+<p:sld xmlns:a="http://schemas.openxmlformats.org/drawingml/2006/main" xmlns:r="http://schemas.openxmlformats.org/officeDocument/2006/relationships" xmlns:p="http://schemas.openxmlformats.org/presentationml/2006/main">
+  <p:cSld>
+    <p:spTree>
+      <p:nvGrpSpPr>
+        <p:cNvPr id="1" name=""/>
+        <p:cNvGrpSpPr/>
+        <p:nvPr/>
+      </p:nvGrpSpPr>
+      <p:grpSpPr>
+        <a:xfrm>
+          <a:off x="0" y="0"/>
+          <a:ext cx="0" cy="0"/>
+          <a:chOff x="0" y="0"/>
+          <a:chExt cx="0" cy="0"/>
+        </a:xfrm>
+      </p:grpSpPr>
+      <p:sp>
+        <p:nvSpPr>
+          <p:cNvPr id="2" name="Datumsplatzhalter 1"/>
+          <p:cNvSpPr>
+            <a:spLocks noGrp="1"/>
+          </p:cNvSpPr>
+          <p:nvPr>
+            <p:ph type="dt" sz="half" idx="10"/>
+          </p:nvPr>
+        </p:nvSpPr>
+        <p:spPr/>
+        <p:txBody>
+          <a:bodyPr/>
+          <a:lstStyle/>
+          <a:p>
+            <a:r>
+              <a:rPr lang="de-DE" smtClean="0"/>
+              <a:t>31.05.2016</a:t>
+            </a:r>
+            <a:endParaRPr lang="de-DE"/>
+          </a:p>
+        </p:txBody>
+      </p:sp>
+      <p:sp>
+        <p:nvSpPr>
+          <p:cNvPr id="3" name="Fußzeilenplatzhalter 2"/>
+          <p:cNvSpPr>
+            <a:spLocks noGrp="1"/>
+          </p:cNvSpPr>
+          <p:nvPr>
+            <p:ph type="ftr" sz="quarter" idx="11"/>
+          </p:nvPr>
+        </p:nvSpPr>
+        <p:spPr/>
+        <p:txBody>
+          <a:bodyPr/>
+          <a:lstStyle/>
+          <a:p>
+            <a:r>
+              <a:rPr lang="de-DE" smtClean="0"/>
+              <a:t>Daniel Fritz, HTWG Konstanz</a:t>
+            </a:r>
+            <a:endParaRPr lang="de-DE"/>
+          </a:p>
+        </p:txBody>
+      </p:sp>
+      <p:sp>
+        <p:nvSpPr>
+          <p:cNvPr id="4" name="Foliennummernplatzhalter 3"/>
+          <p:cNvSpPr>
+            <a:spLocks noGrp="1"/>
+          </p:cNvSpPr>
+          <p:nvPr>
+            <p:ph type="sldNum" sz="quarter" idx="12"/>
+          </p:nvPr>
+        </p:nvSpPr>
+        <p:spPr/>
+        <p:txBody>
+          <a:bodyPr/>
+          <a:lstStyle/>
+          <a:p>
+            <a:fld id="{4358C9F7-5955-4422-87CA-C4EB28FDAF6D}" type="slidenum">
+              <a:rPr lang="de-DE" smtClean="0"/>
+              <a:t>33</a:t>
+            </a:fld>
+            <a:endParaRPr lang="de-DE"/>
+          </a:p>
+        </p:txBody>
+      </p:sp>
+      <p:sp>
+        <p:nvSpPr>
+          <p:cNvPr id="5" name="Textplatzhalter 4"/>
+          <p:cNvSpPr>
+            <a:spLocks noGrp="1"/>
+          </p:cNvSpPr>
+          <p:nvPr>
+            <p:ph type="body" sz="quarter" idx="13"/>
+          </p:nvPr>
+        </p:nvSpPr>
+        <p:spPr/>
+        <p:txBody>
+          <a:bodyPr/>
+          <a:lstStyle/>
+          <a:p>
+            <a:r>
+              <a:rPr lang="de-DE" dirty="0" err="1" smtClean="0"/>
+              <a:t>Visitor</a:t>
+            </a:r>
+            <a:endParaRPr lang="de-DE" dirty="0" smtClean="0"/>
+          </a:p>
+          <a:p>
+            <a:pPr lvl="2"/>
+            <a:endParaRPr lang="de-DE" dirty="0" smtClean="0"/>
+          </a:p>
+          <a:p>
+            <a:pPr lvl="2"/>
+            <a:r>
+              <a:rPr lang="de-DE" dirty="0" err="1" smtClean="0"/>
+              <a:t>Visitor</a:t>
+            </a:r>
+            <a:r>
+              <a:rPr lang="de-DE" dirty="0" smtClean="0"/>
+              <a:t>-Pattern: Operationen in eine Objektstruktur integrieren ohne diese immer ändern zu müssen</a:t>
+            </a:r>
+          </a:p>
+          <a:p>
+            <a:pPr lvl="2"/>
+            <a:endParaRPr lang="de-DE" dirty="0"/>
+          </a:p>
+        </p:txBody>
+      </p:sp>
+      <p:sp>
+        <p:nvSpPr>
+          <p:cNvPr id="6" name="Textplatzhalter 5"/>
+          <p:cNvSpPr>
+            <a:spLocks noGrp="1"/>
+          </p:cNvSpPr>
+          <p:nvPr>
+            <p:ph type="body" sz="quarter" idx="14"/>
+          </p:nvPr>
+        </p:nvSpPr>
+        <p:spPr/>
+        <p:txBody>
+          <a:bodyPr>
+            <a:normAutofit lnSpcReduction="10000"/>
+          </a:bodyPr>
+          <a:lstStyle/>
+          <a:p>
+            <a:r>
+              <a:rPr lang="de-DE" dirty="0" smtClean="0"/>
+              <a:t>2. Implementierungstechniken – </a:t>
+            </a:r>
+            <a:r>
+              <a:rPr lang="de-DE" dirty="0" err="1" smtClean="0"/>
+              <a:t>Visitor</a:t>
+            </a:r>
+            <a:r>
+              <a:rPr lang="de-DE" dirty="0" smtClean="0"/>
+              <a:t> </a:t>
+            </a:r>
+            <a:endParaRPr lang="de-DE" dirty="0"/>
+          </a:p>
+        </p:txBody>
+      </p:sp>
+    </p:spTree>
+    <p:extLst>
+      <p:ext uri="{BB962C8B-B14F-4D97-AF65-F5344CB8AC3E}">
+        <p14:creationId xmlns:p14="http://schemas.microsoft.com/office/powerpoint/2010/main" val="1117629032"/>
+      </p:ext>
+    </p:extLst>
+  </p:cSld>
+  <p:clrMapOvr>
+    <a:masterClrMapping/>
+  </p:clrMapOvr>
+  <p:timing>
+    <p:tnLst>
+      <p:par>
+        <p:cTn id="1" dur="indefinite" restart="never" nodeType="tmRoot"/>
+      </p:par>
+    </p:tnLst>
+  </p:timing>
+</p:sld>
+</file>
+
 <file path=ppt/slides/slide4.xml><?xml version="1.0" encoding="utf-8"?>
 <p:sld xmlns:a="http://schemas.openxmlformats.org/drawingml/2006/main" xmlns:r="http://schemas.openxmlformats.org/officeDocument/2006/relationships" xmlns:p="http://schemas.openxmlformats.org/presentationml/2006/main">
   <p:cSld>
@@ -20828,6 +20758,47 @@
       </p:sp>
       <p:sp>
         <p:nvSpPr>
+          <p:cNvPr id="5" name="Textplatzhalter 4"/>
+          <p:cNvSpPr>
+            <a:spLocks noGrp="1"/>
+          </p:cNvSpPr>
+          <p:nvPr>
+            <p:ph type="body" sz="quarter" idx="13"/>
+          </p:nvPr>
+        </p:nvSpPr>
+        <p:spPr/>
+        <p:txBody>
+          <a:bodyPr/>
+          <a:lstStyle/>
+          <a:p>
+            <a:r>
+              <a:rPr lang="de-DE" dirty="0" smtClean="0"/>
+              <a:t>Definition der Sprache durch Interfaces</a:t>
+            </a:r>
+          </a:p>
+          <a:p>
+            <a:pPr lvl="1">
+              <a:buFont typeface="Wingdings"/>
+              <a:buChar char="à"/>
+            </a:pPr>
+            <a:r>
+              <a:rPr lang="de-DE" dirty="0" smtClean="0">
+                <a:sym typeface="Wingdings" panose="05000000000000000000" pitchFamily="2" charset="2"/>
+              </a:rPr>
+              <a:t>Trennung von Definition und Implementierung</a:t>
+            </a:r>
+          </a:p>
+          <a:p>
+            <a:r>
+              <a:rPr lang="de-DE" dirty="0" smtClean="0"/>
+              <a:t>…</a:t>
+            </a:r>
+            <a:endParaRPr lang="de-DE" dirty="0"/>
+          </a:p>
+        </p:txBody>
+      </p:sp>
+      <p:sp>
+        <p:nvSpPr>
           <p:cNvPr id="6" name="Textplatzhalter 5"/>
           <p:cNvSpPr>
             <a:spLocks noGrp="1"/>
@@ -20845,46 +20816,16 @@
           <a:p>
             <a:r>
               <a:rPr lang="de-DE" dirty="0" smtClean="0"/>
-              <a:t>2. Implementierungstechniken</a:t>
+              <a:t>2. Implementierungstechniken – Definition der Sprache</a:t>
             </a:r>
             <a:endParaRPr lang="de-DE" dirty="0"/>
           </a:p>
         </p:txBody>
       </p:sp>
-      <p:pic>
-        <p:nvPicPr>
-          <p:cNvPr id="7" name="Grafik 6"/>
-          <p:cNvPicPr>
-            <a:picLocks noChangeAspect="1"/>
-          </p:cNvPicPr>
-          <p:nvPr/>
-        </p:nvPicPr>
-        <p:blipFill>
-          <a:blip r:embed="rId2">
-            <a:extLst>
-              <a:ext uri="{28A0092B-C50C-407E-A947-70E740481C1C}">
-                <a14:useLocalDpi xmlns:a14="http://schemas.microsoft.com/office/drawing/2010/main" val="0"/>
-              </a:ext>
-            </a:extLst>
-          </a:blip>
-          <a:stretch>
-            <a:fillRect/>
-          </a:stretch>
-        </p:blipFill>
-        <p:spPr>
-          <a:xfrm>
-            <a:off x="280771" y="1649115"/>
-            <a:ext cx="8582458" cy="3559770"/>
-          </a:xfrm>
-          <a:prstGeom prst="rect">
-            <a:avLst/>
-          </a:prstGeom>
-        </p:spPr>
-      </p:pic>
     </p:spTree>
     <p:extLst>
       <p:ext uri="{BB962C8B-B14F-4D97-AF65-F5344CB8AC3E}">
-        <p14:creationId xmlns:p14="http://schemas.microsoft.com/office/powerpoint/2010/main" val="2824790380"/>
+        <p14:creationId xmlns:p14="http://schemas.microsoft.com/office/powerpoint/2010/main" val="3973977576"/>
       </p:ext>
     </p:extLst>
   </p:cSld>
@@ -20989,47 +20930,6 @@
       </p:sp>
       <p:sp>
         <p:nvSpPr>
-          <p:cNvPr id="5" name="Textplatzhalter 4"/>
-          <p:cNvSpPr>
-            <a:spLocks noGrp="1"/>
-          </p:cNvSpPr>
-          <p:nvPr>
-            <p:ph type="body" sz="quarter" idx="13"/>
-          </p:nvPr>
-        </p:nvSpPr>
-        <p:spPr/>
-        <p:txBody>
-          <a:bodyPr/>
-          <a:lstStyle/>
-          <a:p>
-            <a:r>
-              <a:rPr lang="de-DE" dirty="0" smtClean="0"/>
-              <a:t>Definition der Sprache durch Interfaces</a:t>
-            </a:r>
-          </a:p>
-          <a:p>
-            <a:pPr lvl="1">
-              <a:buFont typeface="Wingdings"/>
-              <a:buChar char="à"/>
-            </a:pPr>
-            <a:r>
-              <a:rPr lang="de-DE" dirty="0" smtClean="0">
-                <a:sym typeface="Wingdings" panose="05000000000000000000" pitchFamily="2" charset="2"/>
-              </a:rPr>
-              <a:t>Trennung von Definition und Implementierung</a:t>
-            </a:r>
-          </a:p>
-          <a:p>
-            <a:r>
-              <a:rPr lang="de-DE" dirty="0" smtClean="0"/>
-              <a:t>…</a:t>
-            </a:r>
-            <a:endParaRPr lang="de-DE" dirty="0"/>
-          </a:p>
-        </p:txBody>
-      </p:sp>
-      <p:sp>
-        <p:nvSpPr>
           <p:cNvPr id="6" name="Textplatzhalter 5"/>
           <p:cNvSpPr>
             <a:spLocks noGrp="1"/>
@@ -21053,10 +20953,232 @@
           </a:p>
         </p:txBody>
       </p:sp>
+      <p:pic>
+        <p:nvPicPr>
+          <p:cNvPr id="7" name="Grafik 6"/>
+          <p:cNvPicPr>
+            <a:picLocks noChangeAspect="1"/>
+          </p:cNvPicPr>
+          <p:nvPr/>
+        </p:nvPicPr>
+        <p:blipFill>
+          <a:blip r:embed="rId2">
+            <a:extLst>
+              <a:ext uri="{28A0092B-C50C-407E-A947-70E740481C1C}">
+                <a14:useLocalDpi xmlns:a14="http://schemas.microsoft.com/office/drawing/2010/main" val="0"/>
+              </a:ext>
+            </a:extLst>
+          </a:blip>
+          <a:stretch>
+            <a:fillRect/>
+          </a:stretch>
+        </p:blipFill>
+        <p:spPr>
+          <a:xfrm>
+            <a:off x="2609660" y="1057662"/>
+            <a:ext cx="6437366" cy="3163426"/>
+          </a:xfrm>
+          <a:prstGeom prst="rect">
+            <a:avLst/>
+          </a:prstGeom>
+        </p:spPr>
+      </p:pic>
+      <p:sp>
+        <p:nvSpPr>
+          <p:cNvPr id="8" name="Textfeld 7"/>
+          <p:cNvSpPr txBox="1"/>
+          <p:nvPr/>
+        </p:nvSpPr>
+        <p:spPr>
+          <a:xfrm>
+            <a:off x="395536" y="1733901"/>
+            <a:ext cx="4752528" cy="2585323"/>
+          </a:xfrm>
+          <a:prstGeom prst="rect">
+            <a:avLst/>
+          </a:prstGeom>
+          <a:noFill/>
+        </p:spPr>
+        <p:txBody>
+          <a:bodyPr wrap="square" rtlCol="0">
+            <a:spAutoFit/>
+          </a:bodyPr>
+          <a:lstStyle/>
+          <a:p>
+            <a:r>
+              <a:rPr lang="de-DE" dirty="0" err="1" smtClean="0">
+                <a:latin typeface="Courier" pitchFamily="49" charset="0"/>
+                <a:cs typeface="Courier New" panose="02070309020205020404" pitchFamily="49" charset="0"/>
+              </a:rPr>
+              <a:t>expr</a:t>
+            </a:r>
+            <a:r>
+              <a:rPr lang="de-DE" dirty="0" smtClean="0">
+                <a:latin typeface="Courier" pitchFamily="49" charset="0"/>
+                <a:cs typeface="Courier New" panose="02070309020205020404" pitchFamily="49" charset="0"/>
+              </a:rPr>
+              <a:t>(</a:t>
+            </a:r>
+            <a:r>
+              <a:rPr lang="de-DE" dirty="0" err="1" smtClean="0">
+                <a:latin typeface="Courier" pitchFamily="49" charset="0"/>
+                <a:cs typeface="Courier New" panose="02070309020205020404" pitchFamily="49" charset="0"/>
+              </a:rPr>
+              <a:t>int</a:t>
+            </a:r>
+            <a:r>
+              <a:rPr lang="de-DE" dirty="0" smtClean="0">
+                <a:latin typeface="Courier" pitchFamily="49" charset="0"/>
+                <a:cs typeface="Courier New" panose="02070309020205020404" pitchFamily="49" charset="0"/>
+              </a:rPr>
+              <a:t>)</a:t>
+            </a:r>
+          </a:p>
+          <a:p>
+            <a:r>
+              <a:rPr lang="de-DE" dirty="0" err="1" smtClean="0">
+                <a:latin typeface="Courier" pitchFamily="49" charset="0"/>
+                <a:cs typeface="Courier New" panose="02070309020205020404" pitchFamily="49" charset="0"/>
+              </a:rPr>
+              <a:t>expr</a:t>
+            </a:r>
+            <a:r>
+              <a:rPr lang="de-DE" dirty="0" smtClean="0">
+                <a:latin typeface="Courier" pitchFamily="49" charset="0"/>
+                <a:cs typeface="Courier New" panose="02070309020205020404" pitchFamily="49" charset="0"/>
+              </a:rPr>
+              <a:t>(Expression)</a:t>
+            </a:r>
+          </a:p>
+          <a:p>
+            <a:r>
+              <a:rPr lang="de-DE" dirty="0" smtClean="0">
+                <a:latin typeface="Courier" pitchFamily="49" charset="0"/>
+                <a:cs typeface="Courier New" panose="02070309020205020404" pitchFamily="49" charset="0"/>
+              </a:rPr>
+              <a:t>plus(</a:t>
+            </a:r>
+            <a:r>
+              <a:rPr lang="de-DE" dirty="0" err="1" smtClean="0">
+                <a:latin typeface="Courier" pitchFamily="49" charset="0"/>
+                <a:cs typeface="Courier New" panose="02070309020205020404" pitchFamily="49" charset="0"/>
+              </a:rPr>
+              <a:t>int</a:t>
+            </a:r>
+            <a:r>
+              <a:rPr lang="de-DE" dirty="0" smtClean="0">
+                <a:latin typeface="Courier" pitchFamily="49" charset="0"/>
+                <a:cs typeface="Courier New" panose="02070309020205020404" pitchFamily="49" charset="0"/>
+              </a:rPr>
+              <a:t>)</a:t>
+            </a:r>
+          </a:p>
+          <a:p>
+            <a:r>
+              <a:rPr lang="de-DE" dirty="0" smtClean="0">
+                <a:latin typeface="Courier" pitchFamily="49" charset="0"/>
+                <a:cs typeface="Courier New" panose="02070309020205020404" pitchFamily="49" charset="0"/>
+              </a:rPr>
+              <a:t>plus(Expression)</a:t>
+            </a:r>
+          </a:p>
+          <a:p>
+            <a:r>
+              <a:rPr lang="de-DE" dirty="0" smtClean="0">
+                <a:latin typeface="Courier" pitchFamily="49" charset="0"/>
+                <a:cs typeface="Courier New" panose="02070309020205020404" pitchFamily="49" charset="0"/>
+              </a:rPr>
+              <a:t>minus(</a:t>
+            </a:r>
+            <a:r>
+              <a:rPr lang="de-DE" dirty="0" err="1" smtClean="0">
+                <a:latin typeface="Courier" pitchFamily="49" charset="0"/>
+                <a:cs typeface="Courier New" panose="02070309020205020404" pitchFamily="49" charset="0"/>
+              </a:rPr>
+              <a:t>int</a:t>
+            </a:r>
+            <a:r>
+              <a:rPr lang="de-DE" dirty="0" smtClean="0">
+                <a:latin typeface="Courier" pitchFamily="49" charset="0"/>
+                <a:cs typeface="Courier New" panose="02070309020205020404" pitchFamily="49" charset="0"/>
+              </a:rPr>
+              <a:t>)</a:t>
+            </a:r>
+          </a:p>
+          <a:p>
+            <a:r>
+              <a:rPr lang="de-DE" dirty="0" smtClean="0">
+                <a:latin typeface="Courier" pitchFamily="49" charset="0"/>
+                <a:cs typeface="Courier New" panose="02070309020205020404" pitchFamily="49" charset="0"/>
+              </a:rPr>
+              <a:t>minus(Expression)</a:t>
+            </a:r>
+          </a:p>
+          <a:p>
+            <a:r>
+              <a:rPr lang="de-DE" dirty="0" err="1" smtClean="0">
+                <a:latin typeface="Courier" pitchFamily="49" charset="0"/>
+                <a:cs typeface="Courier New" panose="02070309020205020404" pitchFamily="49" charset="0"/>
+              </a:rPr>
+              <a:t>times</a:t>
+            </a:r>
+            <a:r>
+              <a:rPr lang="de-DE" dirty="0" smtClean="0">
+                <a:latin typeface="Courier" pitchFamily="49" charset="0"/>
+                <a:cs typeface="Courier New" panose="02070309020205020404" pitchFamily="49" charset="0"/>
+              </a:rPr>
+              <a:t>(</a:t>
+            </a:r>
+            <a:r>
+              <a:rPr lang="de-DE" dirty="0" err="1" smtClean="0">
+                <a:latin typeface="Courier" pitchFamily="49" charset="0"/>
+                <a:cs typeface="Courier New" panose="02070309020205020404" pitchFamily="49" charset="0"/>
+              </a:rPr>
+              <a:t>int</a:t>
+            </a:r>
+            <a:r>
+              <a:rPr lang="de-DE" dirty="0" smtClean="0">
+                <a:latin typeface="Courier" pitchFamily="49" charset="0"/>
+                <a:cs typeface="Courier New" panose="02070309020205020404" pitchFamily="49" charset="0"/>
+              </a:rPr>
+              <a:t>)</a:t>
+            </a:r>
+          </a:p>
+          <a:p>
+            <a:r>
+              <a:rPr lang="de-DE" dirty="0" err="1" smtClean="0">
+                <a:latin typeface="Courier" pitchFamily="49" charset="0"/>
+                <a:cs typeface="Courier New" panose="02070309020205020404" pitchFamily="49" charset="0"/>
+              </a:rPr>
+              <a:t>times</a:t>
+            </a:r>
+            <a:r>
+              <a:rPr lang="de-DE" dirty="0" smtClean="0">
+                <a:latin typeface="Courier" pitchFamily="49" charset="0"/>
+                <a:cs typeface="Courier New" panose="02070309020205020404" pitchFamily="49" charset="0"/>
+              </a:rPr>
+              <a:t>(Expression)</a:t>
+            </a:r>
+          </a:p>
+          <a:p>
+            <a:r>
+              <a:rPr lang="de-DE" dirty="0" smtClean="0">
+                <a:latin typeface="Courier" pitchFamily="49" charset="0"/>
+                <a:cs typeface="Courier New" panose="02070309020205020404" pitchFamily="49" charset="0"/>
+              </a:rPr>
+              <a:t>end()</a:t>
+            </a:r>
+            <a:endParaRPr lang="de-DE" dirty="0">
+              <a:latin typeface="Courier" pitchFamily="49" charset="0"/>
+              <a:cs typeface="Courier New" panose="02070309020205020404" pitchFamily="49" charset="0"/>
+            </a:endParaRPr>
+          </a:p>
+        </p:txBody>
+      </p:sp>
     </p:spTree>
     <p:extLst>
       <p:ext uri="{BB962C8B-B14F-4D97-AF65-F5344CB8AC3E}">
-        <p14:creationId xmlns:p14="http://schemas.microsoft.com/office/powerpoint/2010/main" val="3973977576"/>
+        <p14:creationId xmlns:p14="http://schemas.microsoft.com/office/powerpoint/2010/main" val="2683857844"/>
       </p:ext>
     </p:extLst>
   </p:cSld>
@@ -21184,9 +21306,179 @@
           </a:p>
         </p:txBody>
       </p:sp>
+      <p:sp>
+        <p:nvSpPr>
+          <p:cNvPr id="5" name="Textfeld 4"/>
+          <p:cNvSpPr txBox="1"/>
+          <p:nvPr/>
+        </p:nvSpPr>
+        <p:spPr>
+          <a:xfrm>
+            <a:off x="5220072" y="4435088"/>
+            <a:ext cx="3672408" cy="1754326"/>
+          </a:xfrm>
+          <a:prstGeom prst="rect">
+            <a:avLst/>
+          </a:prstGeom>
+          <a:noFill/>
+        </p:spPr>
+        <p:txBody>
+          <a:bodyPr wrap="square" rtlCol="0">
+            <a:spAutoFit/>
+          </a:bodyPr>
+          <a:lstStyle/>
+          <a:p>
+            <a:r>
+              <a:rPr lang="de-DE" dirty="0" smtClean="0">
+                <a:solidFill>
+                  <a:srgbClr val="FF0000"/>
+                </a:solidFill>
+                <a:latin typeface="Courier" pitchFamily="49" charset="0"/>
+                <a:cs typeface="Courier New" panose="02070309020205020404" pitchFamily="49" charset="0"/>
+              </a:rPr>
+              <a:t>Interface </a:t>
+            </a:r>
+            <a:r>
+              <a:rPr lang="de-DE" dirty="0" err="1" smtClean="0">
+                <a:solidFill>
+                  <a:srgbClr val="FF0000"/>
+                </a:solidFill>
+                <a:latin typeface="Courier" pitchFamily="49" charset="0"/>
+                <a:cs typeface="Courier New" panose="02070309020205020404" pitchFamily="49" charset="0"/>
+              </a:rPr>
+              <a:t>Divided</a:t>
+            </a:r>
+            <a:r>
+              <a:rPr lang="de-DE" dirty="0" smtClean="0">
+                <a:solidFill>
+                  <a:srgbClr val="FF0000"/>
+                </a:solidFill>
+                <a:latin typeface="Courier" pitchFamily="49" charset="0"/>
+                <a:cs typeface="Courier New" panose="02070309020205020404" pitchFamily="49" charset="0"/>
+              </a:rPr>
+              <a:t> {</a:t>
+            </a:r>
+          </a:p>
+          <a:p>
+            <a:pPr lvl="1"/>
+            <a:r>
+              <a:rPr lang="de-DE" dirty="0" err="1" smtClean="0">
+                <a:latin typeface="Courier" pitchFamily="49" charset="0"/>
+                <a:cs typeface="Courier New" panose="02070309020205020404" pitchFamily="49" charset="0"/>
+              </a:rPr>
+              <a:t>divided</a:t>
+            </a:r>
+            <a:r>
+              <a:rPr lang="de-DE" dirty="0" smtClean="0">
+                <a:latin typeface="Courier" pitchFamily="49" charset="0"/>
+                <a:cs typeface="Courier New" panose="02070309020205020404" pitchFamily="49" charset="0"/>
+              </a:rPr>
+              <a:t>(</a:t>
+            </a:r>
+            <a:r>
+              <a:rPr lang="de-DE" dirty="0" err="1" smtClean="0">
+                <a:latin typeface="Courier" pitchFamily="49" charset="0"/>
+                <a:cs typeface="Courier New" panose="02070309020205020404" pitchFamily="49" charset="0"/>
+              </a:rPr>
+              <a:t>int</a:t>
+            </a:r>
+            <a:r>
+              <a:rPr lang="de-DE" dirty="0" smtClean="0">
+                <a:latin typeface="Courier" pitchFamily="49" charset="0"/>
+                <a:cs typeface="Courier New" panose="02070309020205020404" pitchFamily="49" charset="0"/>
+              </a:rPr>
+              <a:t>)</a:t>
+            </a:r>
+          </a:p>
+          <a:p>
+            <a:pPr lvl="1"/>
+            <a:r>
+              <a:rPr lang="de-DE" dirty="0" err="1" smtClean="0">
+                <a:latin typeface="Courier" pitchFamily="49" charset="0"/>
+                <a:cs typeface="Courier New" panose="02070309020205020404" pitchFamily="49" charset="0"/>
+              </a:rPr>
+              <a:t>divided</a:t>
+            </a:r>
+            <a:r>
+              <a:rPr lang="de-DE" dirty="0" smtClean="0">
+                <a:latin typeface="Courier" pitchFamily="49" charset="0"/>
+                <a:cs typeface="Courier New" panose="02070309020205020404" pitchFamily="49" charset="0"/>
+              </a:rPr>
+              <a:t>(Expression) </a:t>
+            </a:r>
+            <a:r>
+              <a:rPr lang="de-DE" dirty="0" smtClean="0">
+                <a:solidFill>
+                  <a:srgbClr val="FF0000"/>
+                </a:solidFill>
+                <a:latin typeface="Courier" pitchFamily="49" charset="0"/>
+                <a:cs typeface="Courier New" panose="02070309020205020404" pitchFamily="49" charset="0"/>
+              </a:rPr>
+              <a:t>}</a:t>
+            </a:r>
+            <a:endParaRPr lang="de-DE" dirty="0" smtClean="0">
+              <a:solidFill>
+                <a:srgbClr val="FF0000"/>
+              </a:solidFill>
+              <a:latin typeface="Courier" pitchFamily="49" charset="0"/>
+            </a:endParaRPr>
+          </a:p>
+          <a:p>
+            <a:endParaRPr lang="de-DE" dirty="0">
+              <a:solidFill>
+                <a:srgbClr val="FF0000"/>
+              </a:solidFill>
+              <a:latin typeface="Courier" pitchFamily="49" charset="0"/>
+            </a:endParaRPr>
+          </a:p>
+          <a:p>
+            <a:r>
+              <a:rPr lang="de-DE" dirty="0" smtClean="0">
+                <a:solidFill>
+                  <a:srgbClr val="FF0000"/>
+                </a:solidFill>
+                <a:latin typeface="Courier" pitchFamily="49" charset="0"/>
+              </a:rPr>
+              <a:t>Interface End {</a:t>
+            </a:r>
+          </a:p>
+          <a:p>
+            <a:pPr lvl="1"/>
+            <a:r>
+              <a:rPr lang="de-DE" dirty="0" smtClean="0">
+                <a:latin typeface="Courier" pitchFamily="49" charset="0"/>
+                <a:cs typeface="Courier New" panose="02070309020205020404" pitchFamily="49" charset="0"/>
+              </a:rPr>
+              <a:t>end()</a:t>
+            </a:r>
+            <a:r>
+              <a:rPr lang="de-DE" dirty="0" smtClean="0">
+                <a:latin typeface="Courier" pitchFamily="49" charset="0"/>
+              </a:rPr>
+              <a:t> </a:t>
+            </a:r>
+            <a:r>
+              <a:rPr lang="de-DE" dirty="0" smtClean="0">
+                <a:solidFill>
+                  <a:srgbClr val="FF0000"/>
+                </a:solidFill>
+                <a:latin typeface="Courier" pitchFamily="49" charset="0"/>
+              </a:rPr>
+              <a:t>}</a:t>
+            </a:r>
+            <a:endParaRPr lang="de-DE" dirty="0" smtClean="0">
+              <a:solidFill>
+                <a:srgbClr val="FF0000"/>
+              </a:solidFill>
+              <a:latin typeface="Courier" pitchFamily="49" charset="0"/>
+              <a:cs typeface="Courier New" panose="02070309020205020404" pitchFamily="49" charset="0"/>
+            </a:endParaRPr>
+          </a:p>
+        </p:txBody>
+      </p:sp>
       <p:pic>
         <p:nvPicPr>
-          <p:cNvPr id="7" name="Grafik 6"/>
+          <p:cNvPr id="9" name="Grafik 8"/>
           <p:cNvPicPr>
             <a:picLocks noChangeAspect="1"/>
           </p:cNvPicPr>
@@ -21222,8 +21514,8 @@
         </p:nvSpPr>
         <p:spPr>
           <a:xfrm>
-            <a:off x="395536" y="1733901"/>
-            <a:ext cx="4752528" cy="2585323"/>
+            <a:off x="398235" y="1942097"/>
+            <a:ext cx="4752528" cy="4247317"/>
           </a:xfrm>
           <a:prstGeom prst="rect">
             <a:avLst/>
@@ -21237,7 +21529,40 @@
           <a:lstStyle/>
           <a:p>
             <a:r>
+              <a:rPr lang="de-DE" dirty="0" smtClean="0">
+                <a:solidFill>
+                  <a:srgbClr val="FF0000"/>
+                </a:solidFill>
+                <a:latin typeface="Courier" pitchFamily="49" charset="0"/>
+                <a:cs typeface="Courier New" panose="02070309020205020404" pitchFamily="49" charset="0"/>
+              </a:rPr>
+              <a:t>Interface </a:t>
+            </a:r>
+            <a:r>
               <a:rPr lang="de-DE" dirty="0" err="1" smtClean="0">
+                <a:solidFill>
+                  <a:srgbClr val="FF0000"/>
+                </a:solidFill>
+                <a:latin typeface="Courier" pitchFamily="49" charset="0"/>
+                <a:cs typeface="Courier New" panose="02070309020205020404" pitchFamily="49" charset="0"/>
+              </a:rPr>
+              <a:t>Expr</a:t>
+            </a:r>
+            <a:r>
+              <a:rPr lang="de-DE" dirty="0" smtClean="0">
+                <a:solidFill>
+                  <a:srgbClr val="FF0000"/>
+                </a:solidFill>
+                <a:latin typeface="Courier" pitchFamily="49" charset="0"/>
+                <a:cs typeface="Courier New" panose="02070309020205020404" pitchFamily="49" charset="0"/>
+              </a:rPr>
+              <a:t> {</a:t>
+            </a:r>
+          </a:p>
+          <a:p>
+            <a:pPr lvl="1"/>
+            <a:r>
+              <a:rPr lang="de-DE" dirty="0" err="1" smtClean="0">
                 <a:latin typeface="Courier" pitchFamily="49" charset="0"/>
                 <a:cs typeface="Courier New" panose="02070309020205020404" pitchFamily="49" charset="0"/>
               </a:rPr>
@@ -21266,6 +21591,7 @@
             </a:r>
           </a:p>
           <a:p>
+            <a:pPr lvl="1"/>
             <a:r>
               <a:rPr lang="de-DE" dirty="0" err="1" smtClean="0">
                 <a:latin typeface="Courier" pitchFamily="49" charset="0"/>
@@ -21278,9 +21604,24 @@
                 <a:latin typeface="Courier" pitchFamily="49" charset="0"/>
                 <a:cs typeface="Courier New" panose="02070309020205020404" pitchFamily="49" charset="0"/>
               </a:rPr>
-              <a:t>(Expression)</a:t>
-            </a:r>
+              <a:t>(Expression) </a:t>
+            </a:r>
+            <a:r>
+              <a:rPr lang="de-DE" dirty="0" smtClean="0">
+                <a:solidFill>
+                  <a:srgbClr val="FF0000"/>
+                </a:solidFill>
+                <a:latin typeface="Courier" pitchFamily="49" charset="0"/>
+                <a:cs typeface="Courier New" panose="02070309020205020404" pitchFamily="49" charset="0"/>
+              </a:rPr>
+              <a:t>}</a:t>
+            </a:r>
+          </a:p>
+          <a:p>
             <a:endParaRPr lang="de-DE" dirty="0" smtClean="0">
+              <a:solidFill>
+                <a:srgbClr val="FF0000"/>
+              </a:solidFill>
               <a:latin typeface="Courier" pitchFamily="49" charset="0"/>
               <a:cs typeface="Courier New" panose="02070309020205020404" pitchFamily="49" charset="0"/>
             </a:endParaRPr>
@@ -21288,6 +21629,19 @@
           <a:p>
             <a:r>
               <a:rPr lang="de-DE" dirty="0" smtClean="0">
+                <a:solidFill>
+                  <a:srgbClr val="FF0000"/>
+                </a:solidFill>
+                <a:latin typeface="Courier" pitchFamily="49" charset="0"/>
+                <a:cs typeface="Courier New" panose="02070309020205020404" pitchFamily="49" charset="0"/>
+              </a:rPr>
+              <a:t>Interface Plus {</a:t>
+            </a:r>
+          </a:p>
+          <a:p>
+            <a:pPr lvl="1"/>
+            <a:r>
+              <a:rPr lang="de-DE" dirty="0" smtClean="0">
                 <a:latin typeface="Courier" pitchFamily="49" charset="0"/>
                 <a:cs typeface="Courier New" panose="02070309020205020404" pitchFamily="49" charset="0"/>
               </a:rPr>
@@ -21309,14 +21663,30 @@
             </a:r>
           </a:p>
           <a:p>
+            <a:pPr lvl="1"/>
             <a:r>
               <a:rPr lang="de-DE" dirty="0" smtClean="0">
                 <a:latin typeface="Courier" pitchFamily="49" charset="0"/>
                 <a:cs typeface="Courier New" panose="02070309020205020404" pitchFamily="49" charset="0"/>
               </a:rPr>
-              <a:t>plus(Expression)</a:t>
-            </a:r>
+              <a:t>plus(Expression) </a:t>
+            </a:r>
+            <a:r>
+              <a:rPr lang="de-DE" dirty="0" smtClean="0">
+                <a:solidFill>
+                  <a:srgbClr val="FF0000"/>
+                </a:solidFill>
+                <a:latin typeface="Courier" pitchFamily="49" charset="0"/>
+                <a:cs typeface="Courier New" panose="02070309020205020404" pitchFamily="49" charset="0"/>
+              </a:rPr>
+              <a:t>}</a:t>
+            </a:r>
+          </a:p>
+          <a:p>
             <a:endParaRPr lang="de-DE" dirty="0" smtClean="0">
+              <a:solidFill>
+                <a:srgbClr val="FF0000"/>
+              </a:solidFill>
               <a:latin typeface="Courier" pitchFamily="49" charset="0"/>
               <a:cs typeface="Courier New" panose="02070309020205020404" pitchFamily="49" charset="0"/>
             </a:endParaRPr>
@@ -21324,6 +21694,19 @@
           <a:p>
             <a:r>
               <a:rPr lang="de-DE" dirty="0" smtClean="0">
+                <a:solidFill>
+                  <a:srgbClr val="FF0000"/>
+                </a:solidFill>
+                <a:latin typeface="Courier" pitchFamily="49" charset="0"/>
+                <a:cs typeface="Courier New" panose="02070309020205020404" pitchFamily="49" charset="0"/>
+              </a:rPr>
+              <a:t>Interface Minus {</a:t>
+            </a:r>
+          </a:p>
+          <a:p>
+            <a:pPr lvl="1"/>
+            <a:r>
+              <a:rPr lang="de-DE" dirty="0" smtClean="0">
                 <a:latin typeface="Courier" pitchFamily="49" charset="0"/>
                 <a:cs typeface="Courier New" panose="02070309020205020404" pitchFamily="49" charset="0"/>
               </a:rPr>
@@ -21345,20 +21728,49 @@
             </a:r>
           </a:p>
           <a:p>
+            <a:pPr lvl="1"/>
             <a:r>
               <a:rPr lang="de-DE" dirty="0" smtClean="0">
                 <a:latin typeface="Courier" pitchFamily="49" charset="0"/>
                 <a:cs typeface="Courier New" panose="02070309020205020404" pitchFamily="49" charset="0"/>
               </a:rPr>
-              <a:t>minus(Expression)</a:t>
-            </a:r>
+              <a:t>minus(Expression) </a:t>
+            </a:r>
+            <a:r>
+              <a:rPr lang="de-DE" dirty="0" smtClean="0">
+                <a:solidFill>
+                  <a:srgbClr val="FF0000"/>
+                </a:solidFill>
+                <a:latin typeface="Courier" pitchFamily="49" charset="0"/>
+                <a:cs typeface="Courier New" panose="02070309020205020404" pitchFamily="49" charset="0"/>
+              </a:rPr>
+              <a:t>}</a:t>
+            </a:r>
+          </a:p>
+          <a:p>
             <a:endParaRPr lang="de-DE" dirty="0" smtClean="0">
+              <a:solidFill>
+                <a:srgbClr val="FF0000"/>
+              </a:solidFill>
               <a:latin typeface="Courier" pitchFamily="49" charset="0"/>
               <a:cs typeface="Courier New" panose="02070309020205020404" pitchFamily="49" charset="0"/>
             </a:endParaRPr>
           </a:p>
           <a:p>
             <a:r>
+              <a:rPr lang="de-DE" dirty="0" smtClean="0">
+                <a:solidFill>
+                  <a:srgbClr val="FF0000"/>
+                </a:solidFill>
+                <a:latin typeface="Courier" pitchFamily="49" charset="0"/>
+                <a:cs typeface="Courier New" panose="02070309020205020404" pitchFamily="49" charset="0"/>
+              </a:rPr>
+              <a:t>Interface Times {</a:t>
+            </a:r>
+          </a:p>
+          <a:p>
+            <a:pPr lvl="1"/>
+            <a:r>
               <a:rPr lang="de-DE" dirty="0" err="1" smtClean="0">
                 <a:latin typeface="Courier" pitchFamily="49" charset="0"/>
                 <a:cs typeface="Courier New" panose="02070309020205020404" pitchFamily="49" charset="0"/>
@@ -21388,6 +21800,7 @@
             </a:r>
           </a:p>
           <a:p>
+            <a:pPr lvl="1"/>
             <a:r>
               <a:rPr lang="de-DE" dirty="0" err="1" smtClean="0">
                 <a:latin typeface="Courier" pitchFamily="49" charset="0"/>
@@ -21400,28 +21813,25 @@
                 <a:latin typeface="Courier" pitchFamily="49" charset="0"/>
                 <a:cs typeface="Courier New" panose="02070309020205020404" pitchFamily="49" charset="0"/>
               </a:rPr>
-              <a:t>(Expression)</a:t>
-            </a:r>
-          </a:p>
-          <a:p>
+              <a:t>(Expression) </a:t>
+            </a:r>
             <a:r>
               <a:rPr lang="de-DE" dirty="0" smtClean="0">
-                <a:latin typeface="Courier" pitchFamily="49" charset="0"/>
-                <a:cs typeface="Courier New" panose="02070309020205020404" pitchFamily="49" charset="0"/>
-              </a:rPr>
-              <a:t>end()</a:t>
-            </a:r>
-            <a:endParaRPr lang="de-DE" dirty="0">
-              <a:latin typeface="Courier" pitchFamily="49" charset="0"/>
-              <a:cs typeface="Courier New" panose="02070309020205020404" pitchFamily="49" charset="0"/>
-            </a:endParaRPr>
+                <a:solidFill>
+                  <a:srgbClr val="FF0000"/>
+                </a:solidFill>
+                <a:latin typeface="Courier" pitchFamily="49" charset="0"/>
+                <a:cs typeface="Courier New" panose="02070309020205020404" pitchFamily="49" charset="0"/>
+              </a:rPr>
+              <a:t>}</a:t>
+            </a:r>
           </a:p>
         </p:txBody>
       </p:sp>
     </p:spTree>
     <p:extLst>
       <p:ext uri="{BB962C8B-B14F-4D97-AF65-F5344CB8AC3E}">
-        <p14:creationId xmlns:p14="http://schemas.microsoft.com/office/powerpoint/2010/main" val="2683857844"/>
+        <p14:creationId xmlns:p14="http://schemas.microsoft.com/office/powerpoint/2010/main" val="3548404267"/>
       </p:ext>
     </p:extLst>
   </p:cSld>
@@ -21558,659 +21968,6 @@
         <p:spPr>
           <a:xfrm>
             <a:off x="5220072" y="4435088"/>
-            <a:ext cx="3672408" cy="1754326"/>
-          </a:xfrm>
-          <a:prstGeom prst="rect">
-            <a:avLst/>
-          </a:prstGeom>
-          <a:noFill/>
-        </p:spPr>
-        <p:txBody>
-          <a:bodyPr wrap="square" rtlCol="0">
-            <a:spAutoFit/>
-          </a:bodyPr>
-          <a:lstStyle/>
-          <a:p>
-            <a:r>
-              <a:rPr lang="de-DE" dirty="0" smtClean="0">
-                <a:solidFill>
-                  <a:srgbClr val="FF0000"/>
-                </a:solidFill>
-                <a:latin typeface="Courier" pitchFamily="49" charset="0"/>
-                <a:cs typeface="Courier New" panose="02070309020205020404" pitchFamily="49" charset="0"/>
-              </a:rPr>
-              <a:t>Interface </a:t>
-            </a:r>
-            <a:r>
-              <a:rPr lang="de-DE" dirty="0" err="1" smtClean="0">
-                <a:solidFill>
-                  <a:srgbClr val="FF0000"/>
-                </a:solidFill>
-                <a:latin typeface="Courier" pitchFamily="49" charset="0"/>
-                <a:cs typeface="Courier New" panose="02070309020205020404" pitchFamily="49" charset="0"/>
-              </a:rPr>
-              <a:t>Divided</a:t>
-            </a:r>
-            <a:r>
-              <a:rPr lang="de-DE" dirty="0" smtClean="0">
-                <a:solidFill>
-                  <a:srgbClr val="FF0000"/>
-                </a:solidFill>
-                <a:latin typeface="Courier" pitchFamily="49" charset="0"/>
-                <a:cs typeface="Courier New" panose="02070309020205020404" pitchFamily="49" charset="0"/>
-              </a:rPr>
-              <a:t> {</a:t>
-            </a:r>
-          </a:p>
-          <a:p>
-            <a:pPr lvl="1"/>
-            <a:r>
-              <a:rPr lang="de-DE" dirty="0" err="1" smtClean="0">
-                <a:latin typeface="Courier" pitchFamily="49" charset="0"/>
-                <a:cs typeface="Courier New" panose="02070309020205020404" pitchFamily="49" charset="0"/>
-              </a:rPr>
-              <a:t>divided</a:t>
-            </a:r>
-            <a:r>
-              <a:rPr lang="de-DE" dirty="0" smtClean="0">
-                <a:latin typeface="Courier" pitchFamily="49" charset="0"/>
-                <a:cs typeface="Courier New" panose="02070309020205020404" pitchFamily="49" charset="0"/>
-              </a:rPr>
-              <a:t>(</a:t>
-            </a:r>
-            <a:r>
-              <a:rPr lang="de-DE" dirty="0" err="1" smtClean="0">
-                <a:latin typeface="Courier" pitchFamily="49" charset="0"/>
-                <a:cs typeface="Courier New" panose="02070309020205020404" pitchFamily="49" charset="0"/>
-              </a:rPr>
-              <a:t>int</a:t>
-            </a:r>
-            <a:r>
-              <a:rPr lang="de-DE" dirty="0" smtClean="0">
-                <a:latin typeface="Courier" pitchFamily="49" charset="0"/>
-                <a:cs typeface="Courier New" panose="02070309020205020404" pitchFamily="49" charset="0"/>
-              </a:rPr>
-              <a:t>)</a:t>
-            </a:r>
-          </a:p>
-          <a:p>
-            <a:pPr lvl="1"/>
-            <a:r>
-              <a:rPr lang="de-DE" dirty="0" err="1" smtClean="0">
-                <a:latin typeface="Courier" pitchFamily="49" charset="0"/>
-                <a:cs typeface="Courier New" panose="02070309020205020404" pitchFamily="49" charset="0"/>
-              </a:rPr>
-              <a:t>divided</a:t>
-            </a:r>
-            <a:r>
-              <a:rPr lang="de-DE" dirty="0" smtClean="0">
-                <a:latin typeface="Courier" pitchFamily="49" charset="0"/>
-                <a:cs typeface="Courier New" panose="02070309020205020404" pitchFamily="49" charset="0"/>
-              </a:rPr>
-              <a:t>(Expression) </a:t>
-            </a:r>
-            <a:r>
-              <a:rPr lang="de-DE" dirty="0" smtClean="0">
-                <a:solidFill>
-                  <a:srgbClr val="FF0000"/>
-                </a:solidFill>
-                <a:latin typeface="Courier" pitchFamily="49" charset="0"/>
-                <a:cs typeface="Courier New" panose="02070309020205020404" pitchFamily="49" charset="0"/>
-              </a:rPr>
-              <a:t>}</a:t>
-            </a:r>
-            <a:endParaRPr lang="de-DE" dirty="0" smtClean="0">
-              <a:solidFill>
-                <a:srgbClr val="FF0000"/>
-              </a:solidFill>
-              <a:latin typeface="Courier" pitchFamily="49" charset="0"/>
-            </a:endParaRPr>
-          </a:p>
-          <a:p>
-            <a:endParaRPr lang="de-DE" dirty="0">
-              <a:solidFill>
-                <a:srgbClr val="FF0000"/>
-              </a:solidFill>
-              <a:latin typeface="Courier" pitchFamily="49" charset="0"/>
-            </a:endParaRPr>
-          </a:p>
-          <a:p>
-            <a:r>
-              <a:rPr lang="de-DE" dirty="0" smtClean="0">
-                <a:solidFill>
-                  <a:srgbClr val="FF0000"/>
-                </a:solidFill>
-                <a:latin typeface="Courier" pitchFamily="49" charset="0"/>
-              </a:rPr>
-              <a:t>Interface End {</a:t>
-            </a:r>
-          </a:p>
-          <a:p>
-            <a:pPr lvl="1"/>
-            <a:r>
-              <a:rPr lang="de-DE" dirty="0" smtClean="0">
-                <a:latin typeface="Courier" pitchFamily="49" charset="0"/>
-                <a:cs typeface="Courier New" panose="02070309020205020404" pitchFamily="49" charset="0"/>
-              </a:rPr>
-              <a:t>end()</a:t>
-            </a:r>
-            <a:r>
-              <a:rPr lang="de-DE" dirty="0" smtClean="0">
-                <a:latin typeface="Courier" pitchFamily="49" charset="0"/>
-              </a:rPr>
-              <a:t> </a:t>
-            </a:r>
-            <a:r>
-              <a:rPr lang="de-DE" dirty="0" smtClean="0">
-                <a:solidFill>
-                  <a:srgbClr val="FF0000"/>
-                </a:solidFill>
-                <a:latin typeface="Courier" pitchFamily="49" charset="0"/>
-              </a:rPr>
-              <a:t>}</a:t>
-            </a:r>
-            <a:endParaRPr lang="de-DE" dirty="0" smtClean="0">
-              <a:solidFill>
-                <a:srgbClr val="FF0000"/>
-              </a:solidFill>
-              <a:latin typeface="Courier" pitchFamily="49" charset="0"/>
-              <a:cs typeface="Courier New" panose="02070309020205020404" pitchFamily="49" charset="0"/>
-            </a:endParaRPr>
-          </a:p>
-        </p:txBody>
-      </p:sp>
-      <p:pic>
-        <p:nvPicPr>
-          <p:cNvPr id="9" name="Grafik 8"/>
-          <p:cNvPicPr>
-            <a:picLocks noChangeAspect="1"/>
-          </p:cNvPicPr>
-          <p:nvPr/>
-        </p:nvPicPr>
-        <p:blipFill>
-          <a:blip r:embed="rId2">
-            <a:extLst>
-              <a:ext uri="{28A0092B-C50C-407E-A947-70E740481C1C}">
-                <a14:useLocalDpi xmlns:a14="http://schemas.microsoft.com/office/drawing/2010/main" val="0"/>
-              </a:ext>
-            </a:extLst>
-          </a:blip>
-          <a:stretch>
-            <a:fillRect/>
-          </a:stretch>
-        </p:blipFill>
-        <p:spPr>
-          <a:xfrm>
-            <a:off x="2609660" y="1057662"/>
-            <a:ext cx="6437366" cy="3163426"/>
-          </a:xfrm>
-          <a:prstGeom prst="rect">
-            <a:avLst/>
-          </a:prstGeom>
-        </p:spPr>
-      </p:pic>
-      <p:sp>
-        <p:nvSpPr>
-          <p:cNvPr id="8" name="Textfeld 7"/>
-          <p:cNvSpPr txBox="1"/>
-          <p:nvPr/>
-        </p:nvSpPr>
-        <p:spPr>
-          <a:xfrm>
-            <a:off x="398235" y="1942097"/>
-            <a:ext cx="4752528" cy="4247317"/>
-          </a:xfrm>
-          <a:prstGeom prst="rect">
-            <a:avLst/>
-          </a:prstGeom>
-          <a:noFill/>
-        </p:spPr>
-        <p:txBody>
-          <a:bodyPr wrap="square" rtlCol="0">
-            <a:spAutoFit/>
-          </a:bodyPr>
-          <a:lstStyle/>
-          <a:p>
-            <a:r>
-              <a:rPr lang="de-DE" dirty="0" smtClean="0">
-                <a:solidFill>
-                  <a:srgbClr val="FF0000"/>
-                </a:solidFill>
-                <a:latin typeface="Courier" pitchFamily="49" charset="0"/>
-                <a:cs typeface="Courier New" panose="02070309020205020404" pitchFamily="49" charset="0"/>
-              </a:rPr>
-              <a:t>Interface </a:t>
-            </a:r>
-            <a:r>
-              <a:rPr lang="de-DE" dirty="0" err="1" smtClean="0">
-                <a:solidFill>
-                  <a:srgbClr val="FF0000"/>
-                </a:solidFill>
-                <a:latin typeface="Courier" pitchFamily="49" charset="0"/>
-                <a:cs typeface="Courier New" panose="02070309020205020404" pitchFamily="49" charset="0"/>
-              </a:rPr>
-              <a:t>Expr</a:t>
-            </a:r>
-            <a:r>
-              <a:rPr lang="de-DE" dirty="0" smtClean="0">
-                <a:solidFill>
-                  <a:srgbClr val="FF0000"/>
-                </a:solidFill>
-                <a:latin typeface="Courier" pitchFamily="49" charset="0"/>
-                <a:cs typeface="Courier New" panose="02070309020205020404" pitchFamily="49" charset="0"/>
-              </a:rPr>
-              <a:t> {</a:t>
-            </a:r>
-          </a:p>
-          <a:p>
-            <a:pPr lvl="1"/>
-            <a:r>
-              <a:rPr lang="de-DE" dirty="0" err="1" smtClean="0">
-                <a:latin typeface="Courier" pitchFamily="49" charset="0"/>
-                <a:cs typeface="Courier New" panose="02070309020205020404" pitchFamily="49" charset="0"/>
-              </a:rPr>
-              <a:t>expr</a:t>
-            </a:r>
-            <a:r>
-              <a:rPr lang="de-DE" dirty="0" smtClean="0">
-                <a:latin typeface="Courier" pitchFamily="49" charset="0"/>
-                <a:cs typeface="Courier New" panose="02070309020205020404" pitchFamily="49" charset="0"/>
-              </a:rPr>
-              <a:t>(</a:t>
-            </a:r>
-            <a:r>
-              <a:rPr lang="de-DE" dirty="0" err="1" smtClean="0">
-                <a:latin typeface="Courier" pitchFamily="49" charset="0"/>
-                <a:cs typeface="Courier New" panose="02070309020205020404" pitchFamily="49" charset="0"/>
-              </a:rPr>
-              <a:t>int</a:t>
-            </a:r>
-            <a:r>
-              <a:rPr lang="de-DE" dirty="0" smtClean="0">
-                <a:latin typeface="Courier" pitchFamily="49" charset="0"/>
-                <a:cs typeface="Courier New" panose="02070309020205020404" pitchFamily="49" charset="0"/>
-              </a:rPr>
-              <a:t>)</a:t>
-            </a:r>
-          </a:p>
-          <a:p>
-            <a:pPr lvl="1"/>
-            <a:r>
-              <a:rPr lang="de-DE" dirty="0" err="1" smtClean="0">
-                <a:latin typeface="Courier" pitchFamily="49" charset="0"/>
-                <a:cs typeface="Courier New" panose="02070309020205020404" pitchFamily="49" charset="0"/>
-              </a:rPr>
-              <a:t>expr</a:t>
-            </a:r>
-            <a:r>
-              <a:rPr lang="de-DE" dirty="0" smtClean="0">
-                <a:latin typeface="Courier" pitchFamily="49" charset="0"/>
-                <a:cs typeface="Courier New" panose="02070309020205020404" pitchFamily="49" charset="0"/>
-              </a:rPr>
-              <a:t>(Expression) </a:t>
-            </a:r>
-            <a:r>
-              <a:rPr lang="de-DE" dirty="0" smtClean="0">
-                <a:solidFill>
-                  <a:srgbClr val="FF0000"/>
-                </a:solidFill>
-                <a:latin typeface="Courier" pitchFamily="49" charset="0"/>
-                <a:cs typeface="Courier New" panose="02070309020205020404" pitchFamily="49" charset="0"/>
-              </a:rPr>
-              <a:t>}</a:t>
-            </a:r>
-          </a:p>
-          <a:p>
-            <a:endParaRPr lang="de-DE" dirty="0" smtClean="0">
-              <a:solidFill>
-                <a:srgbClr val="FF0000"/>
-              </a:solidFill>
-              <a:latin typeface="Courier" pitchFamily="49" charset="0"/>
-              <a:cs typeface="Courier New" panose="02070309020205020404" pitchFamily="49" charset="0"/>
-            </a:endParaRPr>
-          </a:p>
-          <a:p>
-            <a:r>
-              <a:rPr lang="de-DE" dirty="0" smtClean="0">
-                <a:solidFill>
-                  <a:srgbClr val="FF0000"/>
-                </a:solidFill>
-                <a:latin typeface="Courier" pitchFamily="49" charset="0"/>
-                <a:cs typeface="Courier New" panose="02070309020205020404" pitchFamily="49" charset="0"/>
-              </a:rPr>
-              <a:t>Interface Plus {</a:t>
-            </a:r>
-          </a:p>
-          <a:p>
-            <a:pPr lvl="1"/>
-            <a:r>
-              <a:rPr lang="de-DE" dirty="0" smtClean="0">
-                <a:latin typeface="Courier" pitchFamily="49" charset="0"/>
-                <a:cs typeface="Courier New" panose="02070309020205020404" pitchFamily="49" charset="0"/>
-              </a:rPr>
-              <a:t>plus(</a:t>
-            </a:r>
-            <a:r>
-              <a:rPr lang="de-DE" dirty="0" err="1" smtClean="0">
-                <a:latin typeface="Courier" pitchFamily="49" charset="0"/>
-                <a:cs typeface="Courier New" panose="02070309020205020404" pitchFamily="49" charset="0"/>
-              </a:rPr>
-              <a:t>int</a:t>
-            </a:r>
-            <a:r>
-              <a:rPr lang="de-DE" dirty="0" smtClean="0">
-                <a:latin typeface="Courier" pitchFamily="49" charset="0"/>
-                <a:cs typeface="Courier New" panose="02070309020205020404" pitchFamily="49" charset="0"/>
-              </a:rPr>
-              <a:t>)</a:t>
-            </a:r>
-          </a:p>
-          <a:p>
-            <a:pPr lvl="1"/>
-            <a:r>
-              <a:rPr lang="de-DE" dirty="0" smtClean="0">
-                <a:latin typeface="Courier" pitchFamily="49" charset="0"/>
-                <a:cs typeface="Courier New" panose="02070309020205020404" pitchFamily="49" charset="0"/>
-              </a:rPr>
-              <a:t>plus(Expression) </a:t>
-            </a:r>
-            <a:r>
-              <a:rPr lang="de-DE" dirty="0" smtClean="0">
-                <a:solidFill>
-                  <a:srgbClr val="FF0000"/>
-                </a:solidFill>
-                <a:latin typeface="Courier" pitchFamily="49" charset="0"/>
-                <a:cs typeface="Courier New" panose="02070309020205020404" pitchFamily="49" charset="0"/>
-              </a:rPr>
-              <a:t>}</a:t>
-            </a:r>
-          </a:p>
-          <a:p>
-            <a:endParaRPr lang="de-DE" dirty="0" smtClean="0">
-              <a:solidFill>
-                <a:srgbClr val="FF0000"/>
-              </a:solidFill>
-              <a:latin typeface="Courier" pitchFamily="49" charset="0"/>
-              <a:cs typeface="Courier New" panose="02070309020205020404" pitchFamily="49" charset="0"/>
-            </a:endParaRPr>
-          </a:p>
-          <a:p>
-            <a:r>
-              <a:rPr lang="de-DE" dirty="0" smtClean="0">
-                <a:solidFill>
-                  <a:srgbClr val="FF0000"/>
-                </a:solidFill>
-                <a:latin typeface="Courier" pitchFamily="49" charset="0"/>
-                <a:cs typeface="Courier New" panose="02070309020205020404" pitchFamily="49" charset="0"/>
-              </a:rPr>
-              <a:t>Interface Minus {</a:t>
-            </a:r>
-          </a:p>
-          <a:p>
-            <a:pPr lvl="1"/>
-            <a:r>
-              <a:rPr lang="de-DE" dirty="0" smtClean="0">
-                <a:latin typeface="Courier" pitchFamily="49" charset="0"/>
-                <a:cs typeface="Courier New" panose="02070309020205020404" pitchFamily="49" charset="0"/>
-              </a:rPr>
-              <a:t>minus(</a:t>
-            </a:r>
-            <a:r>
-              <a:rPr lang="de-DE" dirty="0" err="1" smtClean="0">
-                <a:latin typeface="Courier" pitchFamily="49" charset="0"/>
-                <a:cs typeface="Courier New" panose="02070309020205020404" pitchFamily="49" charset="0"/>
-              </a:rPr>
-              <a:t>int</a:t>
-            </a:r>
-            <a:r>
-              <a:rPr lang="de-DE" dirty="0" smtClean="0">
-                <a:latin typeface="Courier" pitchFamily="49" charset="0"/>
-                <a:cs typeface="Courier New" panose="02070309020205020404" pitchFamily="49" charset="0"/>
-              </a:rPr>
-              <a:t>)</a:t>
-            </a:r>
-          </a:p>
-          <a:p>
-            <a:pPr lvl="1"/>
-            <a:r>
-              <a:rPr lang="de-DE" dirty="0" smtClean="0">
-                <a:latin typeface="Courier" pitchFamily="49" charset="0"/>
-                <a:cs typeface="Courier New" panose="02070309020205020404" pitchFamily="49" charset="0"/>
-              </a:rPr>
-              <a:t>minus(Expression) </a:t>
-            </a:r>
-            <a:r>
-              <a:rPr lang="de-DE" dirty="0" smtClean="0">
-                <a:solidFill>
-                  <a:srgbClr val="FF0000"/>
-                </a:solidFill>
-                <a:latin typeface="Courier" pitchFamily="49" charset="0"/>
-                <a:cs typeface="Courier New" panose="02070309020205020404" pitchFamily="49" charset="0"/>
-              </a:rPr>
-              <a:t>}</a:t>
-            </a:r>
-          </a:p>
-          <a:p>
-            <a:endParaRPr lang="de-DE" dirty="0" smtClean="0">
-              <a:solidFill>
-                <a:srgbClr val="FF0000"/>
-              </a:solidFill>
-              <a:latin typeface="Courier" pitchFamily="49" charset="0"/>
-              <a:cs typeface="Courier New" panose="02070309020205020404" pitchFamily="49" charset="0"/>
-            </a:endParaRPr>
-          </a:p>
-          <a:p>
-            <a:r>
-              <a:rPr lang="de-DE" dirty="0" smtClean="0">
-                <a:solidFill>
-                  <a:srgbClr val="FF0000"/>
-                </a:solidFill>
-                <a:latin typeface="Courier" pitchFamily="49" charset="0"/>
-                <a:cs typeface="Courier New" panose="02070309020205020404" pitchFamily="49" charset="0"/>
-              </a:rPr>
-              <a:t>Interface Times {</a:t>
-            </a:r>
-          </a:p>
-          <a:p>
-            <a:pPr lvl="1"/>
-            <a:r>
-              <a:rPr lang="de-DE" dirty="0" err="1" smtClean="0">
-                <a:latin typeface="Courier" pitchFamily="49" charset="0"/>
-                <a:cs typeface="Courier New" panose="02070309020205020404" pitchFamily="49" charset="0"/>
-              </a:rPr>
-              <a:t>times</a:t>
-            </a:r>
-            <a:r>
-              <a:rPr lang="de-DE" dirty="0" smtClean="0">
-                <a:latin typeface="Courier" pitchFamily="49" charset="0"/>
-                <a:cs typeface="Courier New" panose="02070309020205020404" pitchFamily="49" charset="0"/>
-              </a:rPr>
-              <a:t>(</a:t>
-            </a:r>
-            <a:r>
-              <a:rPr lang="de-DE" dirty="0" err="1" smtClean="0">
-                <a:latin typeface="Courier" pitchFamily="49" charset="0"/>
-                <a:cs typeface="Courier New" panose="02070309020205020404" pitchFamily="49" charset="0"/>
-              </a:rPr>
-              <a:t>int</a:t>
-            </a:r>
-            <a:r>
-              <a:rPr lang="de-DE" dirty="0" smtClean="0">
-                <a:latin typeface="Courier" pitchFamily="49" charset="0"/>
-                <a:cs typeface="Courier New" panose="02070309020205020404" pitchFamily="49" charset="0"/>
-              </a:rPr>
-              <a:t>)</a:t>
-            </a:r>
-          </a:p>
-          <a:p>
-            <a:pPr lvl="1"/>
-            <a:r>
-              <a:rPr lang="de-DE" dirty="0" err="1" smtClean="0">
-                <a:latin typeface="Courier" pitchFamily="49" charset="0"/>
-                <a:cs typeface="Courier New" panose="02070309020205020404" pitchFamily="49" charset="0"/>
-              </a:rPr>
-              <a:t>times</a:t>
-            </a:r>
-            <a:r>
-              <a:rPr lang="de-DE" dirty="0" smtClean="0">
-                <a:latin typeface="Courier" pitchFamily="49" charset="0"/>
-                <a:cs typeface="Courier New" panose="02070309020205020404" pitchFamily="49" charset="0"/>
-              </a:rPr>
-              <a:t>(Expression) </a:t>
-            </a:r>
-            <a:r>
-              <a:rPr lang="de-DE" dirty="0" smtClean="0">
-                <a:solidFill>
-                  <a:srgbClr val="FF0000"/>
-                </a:solidFill>
-                <a:latin typeface="Courier" pitchFamily="49" charset="0"/>
-                <a:cs typeface="Courier New" panose="02070309020205020404" pitchFamily="49" charset="0"/>
-              </a:rPr>
-              <a:t>}</a:t>
-            </a:r>
-          </a:p>
-        </p:txBody>
-      </p:sp>
-    </p:spTree>
-    <p:extLst>
-      <p:ext uri="{BB962C8B-B14F-4D97-AF65-F5344CB8AC3E}">
-        <p14:creationId xmlns:p14="http://schemas.microsoft.com/office/powerpoint/2010/main" val="3548404267"/>
-      </p:ext>
-    </p:extLst>
-  </p:cSld>
-  <p:clrMapOvr>
-    <a:masterClrMapping/>
-  </p:clrMapOvr>
-  <p:timing>
-    <p:tnLst>
-      <p:par>
-        <p:cTn id="1" dur="indefinite" restart="never" nodeType="tmRoot"/>
-      </p:par>
-    </p:tnLst>
-  </p:timing>
-</p:sld>
-</file>
-
-<file path=ppt/slides/slide9.xml><?xml version="1.0" encoding="utf-8"?>
-<p:sld xmlns:a="http://schemas.openxmlformats.org/drawingml/2006/main" xmlns:r="http://schemas.openxmlformats.org/officeDocument/2006/relationships" xmlns:p="http://schemas.openxmlformats.org/presentationml/2006/main">
-  <p:cSld>
-    <p:spTree>
-      <p:nvGrpSpPr>
-        <p:cNvPr id="1" name=""/>
-        <p:cNvGrpSpPr/>
-        <p:nvPr/>
-      </p:nvGrpSpPr>
-      <p:grpSpPr>
-        <a:xfrm>
-          <a:off x="0" y="0"/>
-          <a:ext cx="0" cy="0"/>
-          <a:chOff x="0" y="0"/>
-          <a:chExt cx="0" cy="0"/>
-        </a:xfrm>
-      </p:grpSpPr>
-      <p:sp>
-        <p:nvSpPr>
-          <p:cNvPr id="2" name="Datumsplatzhalter 1"/>
-          <p:cNvSpPr>
-            <a:spLocks noGrp="1"/>
-          </p:cNvSpPr>
-          <p:nvPr>
-            <p:ph type="dt" sz="half" idx="10"/>
-          </p:nvPr>
-        </p:nvSpPr>
-        <p:spPr/>
-        <p:txBody>
-          <a:bodyPr/>
-          <a:lstStyle/>
-          <a:p>
-            <a:r>
-              <a:rPr lang="de-DE" smtClean="0"/>
-              <a:t>31.05.2016</a:t>
-            </a:r>
-            <a:endParaRPr lang="de-DE"/>
-          </a:p>
-        </p:txBody>
-      </p:sp>
-      <p:sp>
-        <p:nvSpPr>
-          <p:cNvPr id="3" name="Fußzeilenplatzhalter 2"/>
-          <p:cNvSpPr>
-            <a:spLocks noGrp="1"/>
-          </p:cNvSpPr>
-          <p:nvPr>
-            <p:ph type="ftr" sz="quarter" idx="11"/>
-          </p:nvPr>
-        </p:nvSpPr>
-        <p:spPr/>
-        <p:txBody>
-          <a:bodyPr/>
-          <a:lstStyle/>
-          <a:p>
-            <a:r>
-              <a:rPr lang="de-DE" smtClean="0"/>
-              <a:t>Daniel Fritz, HTWG Konstanz</a:t>
-            </a:r>
-            <a:endParaRPr lang="de-DE"/>
-          </a:p>
-        </p:txBody>
-      </p:sp>
-      <p:sp>
-        <p:nvSpPr>
-          <p:cNvPr id="4" name="Foliennummernplatzhalter 3"/>
-          <p:cNvSpPr>
-            <a:spLocks noGrp="1"/>
-          </p:cNvSpPr>
-          <p:nvPr>
-            <p:ph type="sldNum" sz="quarter" idx="12"/>
-          </p:nvPr>
-        </p:nvSpPr>
-        <p:spPr/>
-        <p:txBody>
-          <a:bodyPr/>
-          <a:lstStyle/>
-          <a:p>
-            <a:fld id="{4358C9F7-5955-4422-87CA-C4EB28FDAF6D}" type="slidenum">
-              <a:rPr lang="de-DE" smtClean="0"/>
-              <a:t>9</a:t>
-            </a:fld>
-            <a:endParaRPr lang="de-DE"/>
-          </a:p>
-        </p:txBody>
-      </p:sp>
-      <p:sp>
-        <p:nvSpPr>
-          <p:cNvPr id="6" name="Textplatzhalter 5"/>
-          <p:cNvSpPr>
-            <a:spLocks noGrp="1"/>
-          </p:cNvSpPr>
-          <p:nvPr>
-            <p:ph type="body" sz="quarter" idx="14"/>
-          </p:nvPr>
-        </p:nvSpPr>
-        <p:spPr/>
-        <p:txBody>
-          <a:bodyPr>
-            <a:normAutofit lnSpcReduction="10000"/>
-          </a:bodyPr>
-          <a:lstStyle/>
-          <a:p>
-            <a:r>
-              <a:rPr lang="de-DE" dirty="0" smtClean="0"/>
-              <a:t>2. Implementierungstechniken – Definition der Sprache</a:t>
-            </a:r>
-            <a:endParaRPr lang="de-DE" dirty="0"/>
-          </a:p>
-        </p:txBody>
-      </p:sp>
-      <p:sp>
-        <p:nvSpPr>
-          <p:cNvPr id="5" name="Textfeld 4"/>
-          <p:cNvSpPr txBox="1"/>
-          <p:nvPr/>
-        </p:nvSpPr>
-        <p:spPr>
-          <a:xfrm>
-            <a:off x="5220072" y="4435088"/>
             <a:ext cx="3672408" cy="1200329"/>
           </a:xfrm>
           <a:prstGeom prst="rect">
@@ -22667,6 +22424,882 @@
     <p:extLst>
       <p:ext uri="{BB962C8B-B14F-4D97-AF65-F5344CB8AC3E}">
         <p14:creationId xmlns:p14="http://schemas.microsoft.com/office/powerpoint/2010/main" val="2219264295"/>
+      </p:ext>
+    </p:extLst>
+  </p:cSld>
+  <p:clrMapOvr>
+    <a:masterClrMapping/>
+  </p:clrMapOvr>
+  <p:timing>
+    <p:tnLst>
+      <p:par>
+        <p:cTn id="1" dur="indefinite" restart="never" nodeType="tmRoot">
+          <p:childTnLst>
+            <p:seq concurrent="1" nextAc="seek">
+              <p:cTn id="2" dur="indefinite" nodeType="mainSeq">
+                <p:childTnLst>
+                  <p:par>
+                    <p:cTn id="3" fill="hold">
+                      <p:stCondLst>
+                        <p:cond delay="indefinite"/>
+                      </p:stCondLst>
+                      <p:childTnLst>
+                        <p:par>
+                          <p:cTn id="4" fill="hold">
+                            <p:stCondLst>
+                              <p:cond delay="0"/>
+                            </p:stCondLst>
+                            <p:childTnLst>
+                              <p:par>
+                                <p:cTn id="5" presetID="1" presetClass="entr" presetSubtype="0" fill="hold" grpId="0" nodeType="clickEffect">
+                                  <p:stCondLst>
+                                    <p:cond delay="0"/>
+                                  </p:stCondLst>
+                                  <p:childTnLst>
+                                    <p:set>
+                                      <p:cBhvr>
+                                        <p:cTn id="6" dur="1" fill="hold">
+                                          <p:stCondLst>
+                                            <p:cond delay="0"/>
+                                          </p:stCondLst>
+                                        </p:cTn>
+                                        <p:tgtEl>
+                                          <p:spTgt spid="10"/>
+                                        </p:tgtEl>
+                                        <p:attrNameLst>
+                                          <p:attrName>style.visibility</p:attrName>
+                                        </p:attrNameLst>
+                                      </p:cBhvr>
+                                      <p:to>
+                                        <p:strVal val="visible"/>
+                                      </p:to>
+                                    </p:set>
+                                  </p:childTnLst>
+                                </p:cTn>
+                              </p:par>
+                            </p:childTnLst>
+                          </p:cTn>
+                        </p:par>
+                      </p:childTnLst>
+                    </p:cTn>
+                  </p:par>
+                  <p:par>
+                    <p:cTn id="7" fill="hold">
+                      <p:stCondLst>
+                        <p:cond delay="indefinite"/>
+                      </p:stCondLst>
+                      <p:childTnLst>
+                        <p:par>
+                          <p:cTn id="8" fill="hold">
+                            <p:stCondLst>
+                              <p:cond delay="0"/>
+                            </p:stCondLst>
+                            <p:childTnLst>
+                              <p:par>
+                                <p:cTn id="9" presetID="1" presetClass="entr" presetSubtype="0" fill="hold" grpId="0" nodeType="clickEffect">
+                                  <p:stCondLst>
+                                    <p:cond delay="0"/>
+                                  </p:stCondLst>
+                                  <p:childTnLst>
+                                    <p:set>
+                                      <p:cBhvr>
+                                        <p:cTn id="10" dur="1" fill="hold">
+                                          <p:stCondLst>
+                                            <p:cond delay="0"/>
+                                          </p:stCondLst>
+                                        </p:cTn>
+                                        <p:tgtEl>
+                                          <p:spTgt spid="8"/>
+                                        </p:tgtEl>
+                                        <p:attrNameLst>
+                                          <p:attrName>style.visibility</p:attrName>
+                                        </p:attrNameLst>
+                                      </p:cBhvr>
+                                      <p:to>
+                                        <p:strVal val="visible"/>
+                                      </p:to>
+                                    </p:set>
+                                  </p:childTnLst>
+                                </p:cTn>
+                              </p:par>
+                              <p:par>
+                                <p:cTn id="11" presetID="1" presetClass="entr" presetSubtype="0" fill="hold" grpId="0" nodeType="withEffect">
+                                  <p:stCondLst>
+                                    <p:cond delay="0"/>
+                                  </p:stCondLst>
+                                  <p:childTnLst>
+                                    <p:set>
+                                      <p:cBhvr>
+                                        <p:cTn id="12" dur="1" fill="hold">
+                                          <p:stCondLst>
+                                            <p:cond delay="0"/>
+                                          </p:stCondLst>
+                                        </p:cTn>
+                                        <p:tgtEl>
+                                          <p:spTgt spid="5"/>
+                                        </p:tgtEl>
+                                        <p:attrNameLst>
+                                          <p:attrName>style.visibility</p:attrName>
+                                        </p:attrNameLst>
+                                      </p:cBhvr>
+                                      <p:to>
+                                        <p:strVal val="visible"/>
+                                      </p:to>
+                                    </p:set>
+                                  </p:childTnLst>
+                                </p:cTn>
+                              </p:par>
+                            </p:childTnLst>
+                          </p:cTn>
+                        </p:par>
+                      </p:childTnLst>
+                    </p:cTn>
+                  </p:par>
+                </p:childTnLst>
+              </p:cTn>
+              <p:prevCondLst>
+                <p:cond evt="onPrev" delay="0">
+                  <p:tgtEl>
+                    <p:sldTgt/>
+                  </p:tgtEl>
+                </p:cond>
+              </p:prevCondLst>
+              <p:nextCondLst>
+                <p:cond evt="onNext" delay="0">
+                  <p:tgtEl>
+                    <p:sldTgt/>
+                  </p:tgtEl>
+                </p:cond>
+              </p:nextCondLst>
+            </p:seq>
+          </p:childTnLst>
+        </p:cTn>
+      </p:par>
+    </p:tnLst>
+    <p:bldLst>
+      <p:bldP spid="5" grpId="0"/>
+      <p:bldP spid="8" grpId="0"/>
+      <p:bldP spid="10" grpId="0" animBg="1"/>
+    </p:bldLst>
+  </p:timing>
+</p:sld>
+</file>
+
+<file path=ppt/slides/slide9.xml><?xml version="1.0" encoding="utf-8"?>
+<p:sld xmlns:a="http://schemas.openxmlformats.org/drawingml/2006/main" xmlns:r="http://schemas.openxmlformats.org/officeDocument/2006/relationships" xmlns:p="http://schemas.openxmlformats.org/presentationml/2006/main">
+  <p:cSld>
+    <p:spTree>
+      <p:nvGrpSpPr>
+        <p:cNvPr id="1" name=""/>
+        <p:cNvGrpSpPr/>
+        <p:nvPr/>
+      </p:nvGrpSpPr>
+      <p:grpSpPr>
+        <a:xfrm>
+          <a:off x="0" y="0"/>
+          <a:ext cx="0" cy="0"/>
+          <a:chOff x="0" y="0"/>
+          <a:chExt cx="0" cy="0"/>
+        </a:xfrm>
+      </p:grpSpPr>
+      <p:sp>
+        <p:nvSpPr>
+          <p:cNvPr id="2" name="Datumsplatzhalter 1"/>
+          <p:cNvSpPr>
+            <a:spLocks noGrp="1"/>
+          </p:cNvSpPr>
+          <p:nvPr>
+            <p:ph type="dt" sz="half" idx="10"/>
+          </p:nvPr>
+        </p:nvSpPr>
+        <p:spPr/>
+        <p:txBody>
+          <a:bodyPr/>
+          <a:lstStyle/>
+          <a:p>
+            <a:r>
+              <a:rPr lang="de-DE" smtClean="0"/>
+              <a:t>31.05.2016</a:t>
+            </a:r>
+            <a:endParaRPr lang="de-DE"/>
+          </a:p>
+        </p:txBody>
+      </p:sp>
+      <p:sp>
+        <p:nvSpPr>
+          <p:cNvPr id="3" name="Fußzeilenplatzhalter 2"/>
+          <p:cNvSpPr>
+            <a:spLocks noGrp="1"/>
+          </p:cNvSpPr>
+          <p:nvPr>
+            <p:ph type="ftr" sz="quarter" idx="11"/>
+          </p:nvPr>
+        </p:nvSpPr>
+        <p:spPr/>
+        <p:txBody>
+          <a:bodyPr/>
+          <a:lstStyle/>
+          <a:p>
+            <a:r>
+              <a:rPr lang="de-DE" smtClean="0"/>
+              <a:t>Daniel Fritz, HTWG Konstanz</a:t>
+            </a:r>
+            <a:endParaRPr lang="de-DE"/>
+          </a:p>
+        </p:txBody>
+      </p:sp>
+      <p:sp>
+        <p:nvSpPr>
+          <p:cNvPr id="4" name="Foliennummernplatzhalter 3"/>
+          <p:cNvSpPr>
+            <a:spLocks noGrp="1"/>
+          </p:cNvSpPr>
+          <p:nvPr>
+            <p:ph type="sldNum" sz="quarter" idx="12"/>
+          </p:nvPr>
+        </p:nvSpPr>
+        <p:spPr/>
+        <p:txBody>
+          <a:bodyPr/>
+          <a:lstStyle/>
+          <a:p>
+            <a:fld id="{4358C9F7-5955-4422-87CA-C4EB28FDAF6D}" type="slidenum">
+              <a:rPr lang="de-DE" smtClean="0"/>
+              <a:t>9</a:t>
+            </a:fld>
+            <a:endParaRPr lang="de-DE" dirty="0"/>
+          </a:p>
+        </p:txBody>
+      </p:sp>
+      <p:sp>
+        <p:nvSpPr>
+          <p:cNvPr id="6" name="Textplatzhalter 5"/>
+          <p:cNvSpPr>
+            <a:spLocks noGrp="1"/>
+          </p:cNvSpPr>
+          <p:nvPr>
+            <p:ph type="body" sz="quarter" idx="14"/>
+          </p:nvPr>
+        </p:nvSpPr>
+        <p:spPr/>
+        <p:txBody>
+          <a:bodyPr>
+            <a:normAutofit lnSpcReduction="10000"/>
+          </a:bodyPr>
+          <a:lstStyle/>
+          <a:p>
+            <a:r>
+              <a:rPr lang="de-DE" dirty="0" smtClean="0"/>
+              <a:t>2. Implementierungstechniken – Definition der Sprache</a:t>
+            </a:r>
+            <a:endParaRPr lang="de-DE" dirty="0"/>
+          </a:p>
+        </p:txBody>
+      </p:sp>
+      <p:sp>
+        <p:nvSpPr>
+          <p:cNvPr id="5" name="Textfeld 4"/>
+          <p:cNvSpPr txBox="1"/>
+          <p:nvPr/>
+        </p:nvSpPr>
+        <p:spPr>
+          <a:xfrm>
+            <a:off x="5220072" y="4435088"/>
+            <a:ext cx="3672408" cy="1200329"/>
+          </a:xfrm>
+          <a:prstGeom prst="rect">
+            <a:avLst/>
+          </a:prstGeom>
+          <a:noFill/>
+        </p:spPr>
+        <p:txBody>
+          <a:bodyPr wrap="square" rtlCol="0">
+            <a:spAutoFit/>
+          </a:bodyPr>
+          <a:lstStyle/>
+          <a:p>
+            <a:endParaRPr lang="de-DE" dirty="0">
+              <a:solidFill>
+                <a:srgbClr val="FF0000"/>
+              </a:solidFill>
+              <a:latin typeface="Courier" pitchFamily="49" charset="0"/>
+            </a:endParaRPr>
+          </a:p>
+          <a:p>
+            <a:r>
+              <a:rPr lang="de-DE" dirty="0" smtClean="0">
+                <a:latin typeface="Courier" pitchFamily="49" charset="0"/>
+              </a:rPr>
+              <a:t>Interface End {</a:t>
+            </a:r>
+          </a:p>
+          <a:p>
+            <a:pPr lvl="1"/>
+            <a:r>
+              <a:rPr lang="de-DE" dirty="0" smtClean="0">
+                <a:latin typeface="Courier" pitchFamily="49" charset="0"/>
+                <a:cs typeface="Courier New" panose="02070309020205020404" pitchFamily="49" charset="0"/>
+              </a:rPr>
+              <a:t>Expression end();</a:t>
+            </a:r>
+            <a:r>
+              <a:rPr lang="de-DE" dirty="0" smtClean="0">
+                <a:latin typeface="Courier" pitchFamily="49" charset="0"/>
+              </a:rPr>
+              <a:t> </a:t>
+            </a:r>
+          </a:p>
+          <a:p>
+            <a:r>
+              <a:rPr lang="de-DE" dirty="0" smtClean="0">
+                <a:latin typeface="Courier" pitchFamily="49" charset="0"/>
+              </a:rPr>
+              <a:t>}</a:t>
+            </a:r>
+            <a:endParaRPr lang="de-DE" dirty="0" smtClean="0">
+              <a:latin typeface="Courier" pitchFamily="49" charset="0"/>
+              <a:cs typeface="Courier New" panose="02070309020205020404" pitchFamily="49" charset="0"/>
+            </a:endParaRPr>
+          </a:p>
+        </p:txBody>
+      </p:sp>
+      <p:pic>
+        <p:nvPicPr>
+          <p:cNvPr id="12" name="Grafik 11"/>
+          <p:cNvPicPr>
+            <a:picLocks noChangeAspect="1"/>
+          </p:cNvPicPr>
+          <p:nvPr/>
+        </p:nvPicPr>
+        <p:blipFill>
+          <a:blip r:embed="rId2">
+            <a:extLst>
+              <a:ext uri="{28A0092B-C50C-407E-A947-70E740481C1C}">
+                <a14:useLocalDpi xmlns:a14="http://schemas.microsoft.com/office/drawing/2010/main" val="0"/>
+              </a:ext>
+            </a:extLst>
+          </a:blip>
+          <a:stretch>
+            <a:fillRect/>
+          </a:stretch>
+        </p:blipFill>
+        <p:spPr>
+          <a:xfrm>
+            <a:off x="2609660" y="1057662"/>
+            <a:ext cx="6437366" cy="3163426"/>
+          </a:xfrm>
+          <a:prstGeom prst="rect">
+            <a:avLst/>
+          </a:prstGeom>
+        </p:spPr>
+      </p:pic>
+      <p:sp>
+        <p:nvSpPr>
+          <p:cNvPr id="8" name="Textfeld 7"/>
+          <p:cNvSpPr txBox="1"/>
+          <p:nvPr/>
+        </p:nvSpPr>
+        <p:spPr>
+          <a:xfrm>
+            <a:off x="398235" y="1942097"/>
+            <a:ext cx="4752528" cy="4247317"/>
+          </a:xfrm>
+          <a:prstGeom prst="rect">
+            <a:avLst/>
+          </a:prstGeom>
+          <a:noFill/>
+        </p:spPr>
+        <p:txBody>
+          <a:bodyPr wrap="square" rtlCol="0">
+            <a:spAutoFit/>
+          </a:bodyPr>
+          <a:lstStyle/>
+          <a:p>
+            <a:r>
+              <a:rPr lang="de-DE" dirty="0" smtClean="0">
+                <a:latin typeface="Courier" pitchFamily="49" charset="0"/>
+                <a:cs typeface="Courier New" panose="02070309020205020404" pitchFamily="49" charset="0"/>
+              </a:rPr>
+              <a:t>Interface </a:t>
+            </a:r>
+            <a:r>
+              <a:rPr lang="de-DE" dirty="0" err="1" smtClean="0">
+                <a:latin typeface="Courier" pitchFamily="49" charset="0"/>
+                <a:cs typeface="Courier New" panose="02070309020205020404" pitchFamily="49" charset="0"/>
+              </a:rPr>
+              <a:t>Expr</a:t>
+            </a:r>
+            <a:r>
+              <a:rPr lang="de-DE" dirty="0" smtClean="0">
+                <a:latin typeface="Courier" pitchFamily="49" charset="0"/>
+                <a:cs typeface="Courier New" panose="02070309020205020404" pitchFamily="49" charset="0"/>
+              </a:rPr>
+              <a:t> {</a:t>
+            </a:r>
+          </a:p>
+          <a:p>
+            <a:pPr lvl="1"/>
+            <a:r>
+              <a:rPr lang="de-DE" dirty="0" smtClean="0">
+                <a:latin typeface="Courier" pitchFamily="49" charset="0"/>
+                <a:cs typeface="Courier New" panose="02070309020205020404" pitchFamily="49" charset="0"/>
+              </a:rPr>
+              <a:t>Operation </a:t>
+            </a:r>
+            <a:r>
+              <a:rPr lang="de-DE" dirty="0" err="1" smtClean="0">
+                <a:latin typeface="Courier" pitchFamily="49" charset="0"/>
+                <a:cs typeface="Courier New" panose="02070309020205020404" pitchFamily="49" charset="0"/>
+              </a:rPr>
+              <a:t>expr</a:t>
+            </a:r>
+            <a:r>
+              <a:rPr lang="de-DE" dirty="0" smtClean="0">
+                <a:latin typeface="Courier" pitchFamily="49" charset="0"/>
+                <a:cs typeface="Courier New" panose="02070309020205020404" pitchFamily="49" charset="0"/>
+              </a:rPr>
+              <a:t>(</a:t>
+            </a:r>
+            <a:r>
+              <a:rPr lang="de-DE" dirty="0" err="1" smtClean="0">
+                <a:latin typeface="Courier" pitchFamily="49" charset="0"/>
+                <a:cs typeface="Courier New" panose="02070309020205020404" pitchFamily="49" charset="0"/>
+              </a:rPr>
+              <a:t>int</a:t>
+            </a:r>
+            <a:r>
+              <a:rPr lang="de-DE" dirty="0" smtClean="0">
+                <a:latin typeface="Courier" pitchFamily="49" charset="0"/>
+                <a:cs typeface="Courier New" panose="02070309020205020404" pitchFamily="49" charset="0"/>
+              </a:rPr>
+              <a:t>);</a:t>
+            </a:r>
+          </a:p>
+          <a:p>
+            <a:pPr lvl="1"/>
+            <a:r>
+              <a:rPr lang="de-DE" dirty="0" smtClean="0">
+                <a:latin typeface="Courier" pitchFamily="49" charset="0"/>
+                <a:cs typeface="Courier New" panose="02070309020205020404" pitchFamily="49" charset="0"/>
+              </a:rPr>
+              <a:t>Operation </a:t>
+            </a:r>
+            <a:r>
+              <a:rPr lang="de-DE" dirty="0" err="1" smtClean="0">
+                <a:latin typeface="Courier" pitchFamily="49" charset="0"/>
+                <a:cs typeface="Courier New" panose="02070309020205020404" pitchFamily="49" charset="0"/>
+              </a:rPr>
+              <a:t>expr</a:t>
+            </a:r>
+            <a:r>
+              <a:rPr lang="de-DE" dirty="0" smtClean="0">
+                <a:latin typeface="Courier" pitchFamily="49" charset="0"/>
+                <a:cs typeface="Courier New" panose="02070309020205020404" pitchFamily="49" charset="0"/>
+              </a:rPr>
+              <a:t>(Expression);</a:t>
+            </a:r>
+          </a:p>
+          <a:p>
+            <a:r>
+              <a:rPr lang="de-DE" dirty="0" smtClean="0">
+                <a:latin typeface="Courier" pitchFamily="49" charset="0"/>
+                <a:cs typeface="Courier New" panose="02070309020205020404" pitchFamily="49" charset="0"/>
+              </a:rPr>
+              <a:t>}</a:t>
+            </a:r>
+          </a:p>
+          <a:p>
+            <a:endParaRPr lang="de-DE" dirty="0" smtClean="0">
+              <a:solidFill>
+                <a:srgbClr val="FF0000"/>
+              </a:solidFill>
+              <a:latin typeface="Courier" pitchFamily="49" charset="0"/>
+              <a:cs typeface="Courier New" panose="02070309020205020404" pitchFamily="49" charset="0"/>
+            </a:endParaRPr>
+          </a:p>
+          <a:p>
+            <a:r>
+              <a:rPr lang="de-DE" dirty="0" smtClean="0">
+                <a:latin typeface="Courier" pitchFamily="49" charset="0"/>
+                <a:cs typeface="Courier New" panose="02070309020205020404" pitchFamily="49" charset="0"/>
+              </a:rPr>
+              <a:t>Interface</a:t>
+            </a:r>
+            <a:r>
+              <a:rPr lang="de-DE" dirty="0" smtClean="0">
+                <a:solidFill>
+                  <a:srgbClr val="FF0000"/>
+                </a:solidFill>
+                <a:latin typeface="Courier" pitchFamily="49" charset="0"/>
+                <a:cs typeface="Courier New" panose="02070309020205020404" pitchFamily="49" charset="0"/>
+              </a:rPr>
+              <a:t> </a:t>
+            </a:r>
+            <a:r>
+              <a:rPr lang="de-DE" dirty="0" smtClean="0">
+                <a:latin typeface="Courier" pitchFamily="49" charset="0"/>
+                <a:cs typeface="Courier New" panose="02070309020205020404" pitchFamily="49" charset="0"/>
+              </a:rPr>
+              <a:t>Operation</a:t>
+            </a:r>
+            <a:r>
+              <a:rPr lang="de-DE" dirty="0" smtClean="0">
+                <a:solidFill>
+                  <a:srgbClr val="FF0000"/>
+                </a:solidFill>
+                <a:latin typeface="Courier" pitchFamily="49" charset="0"/>
+                <a:cs typeface="Courier New" panose="02070309020205020404" pitchFamily="49" charset="0"/>
+              </a:rPr>
+              <a:t> </a:t>
+            </a:r>
+            <a:r>
+              <a:rPr lang="de-DE" dirty="0" smtClean="0">
+                <a:latin typeface="Courier" pitchFamily="49" charset="0"/>
+                <a:cs typeface="Courier New" panose="02070309020205020404" pitchFamily="49" charset="0"/>
+              </a:rPr>
+              <a:t>{</a:t>
+            </a:r>
+          </a:p>
+          <a:p>
+            <a:pPr lvl="1"/>
+            <a:r>
+              <a:rPr lang="de-DE" dirty="0" smtClean="0">
+                <a:solidFill>
+                  <a:srgbClr val="FF0000"/>
+                </a:solidFill>
+                <a:latin typeface="Courier" pitchFamily="49" charset="0"/>
+                <a:cs typeface="Courier New" panose="02070309020205020404" pitchFamily="49" charset="0"/>
+              </a:rPr>
+              <a:t>Operation</a:t>
+            </a:r>
+            <a:r>
+              <a:rPr lang="de-DE" dirty="0" smtClean="0">
+                <a:latin typeface="Courier" pitchFamily="49" charset="0"/>
+                <a:cs typeface="Courier New" panose="02070309020205020404" pitchFamily="49" charset="0"/>
+              </a:rPr>
+              <a:t> plus(</a:t>
+            </a:r>
+            <a:r>
+              <a:rPr lang="de-DE" dirty="0" err="1" smtClean="0">
+                <a:latin typeface="Courier" pitchFamily="49" charset="0"/>
+                <a:cs typeface="Courier New" panose="02070309020205020404" pitchFamily="49" charset="0"/>
+              </a:rPr>
+              <a:t>int</a:t>
+            </a:r>
+            <a:r>
+              <a:rPr lang="de-DE" dirty="0" smtClean="0">
+                <a:latin typeface="Courier" pitchFamily="49" charset="0"/>
+                <a:cs typeface="Courier New" panose="02070309020205020404" pitchFamily="49" charset="0"/>
+              </a:rPr>
+              <a:t>);</a:t>
+            </a:r>
+          </a:p>
+          <a:p>
+            <a:pPr lvl="1"/>
+            <a:r>
+              <a:rPr lang="de-DE" dirty="0" smtClean="0">
+                <a:solidFill>
+                  <a:srgbClr val="FF0000"/>
+                </a:solidFill>
+                <a:latin typeface="Courier" pitchFamily="49" charset="0"/>
+                <a:cs typeface="Courier New" panose="02070309020205020404" pitchFamily="49" charset="0"/>
+              </a:rPr>
+              <a:t>Operation</a:t>
+            </a:r>
+            <a:r>
+              <a:rPr lang="de-DE" dirty="0" smtClean="0">
+                <a:latin typeface="Courier" pitchFamily="49" charset="0"/>
+                <a:cs typeface="Courier New" panose="02070309020205020404" pitchFamily="49" charset="0"/>
+              </a:rPr>
+              <a:t> plus(Expression);</a:t>
+            </a:r>
+            <a:endParaRPr lang="de-DE" dirty="0" smtClean="0">
+              <a:solidFill>
+                <a:srgbClr val="FF0000"/>
+              </a:solidFill>
+              <a:latin typeface="Courier" pitchFamily="49" charset="0"/>
+              <a:cs typeface="Courier New" panose="02070309020205020404" pitchFamily="49" charset="0"/>
+            </a:endParaRPr>
+          </a:p>
+          <a:p>
+            <a:pPr lvl="1"/>
+            <a:r>
+              <a:rPr lang="de-DE" dirty="0" smtClean="0">
+                <a:solidFill>
+                  <a:srgbClr val="FF0000"/>
+                </a:solidFill>
+                <a:latin typeface="Courier" pitchFamily="49" charset="0"/>
+                <a:cs typeface="Courier New" panose="02070309020205020404" pitchFamily="49" charset="0"/>
+              </a:rPr>
+              <a:t>Operation</a:t>
+            </a:r>
+            <a:r>
+              <a:rPr lang="de-DE" dirty="0" smtClean="0">
+                <a:latin typeface="Courier" pitchFamily="49" charset="0"/>
+                <a:cs typeface="Courier New" panose="02070309020205020404" pitchFamily="49" charset="0"/>
+              </a:rPr>
+              <a:t> minus(</a:t>
+            </a:r>
+            <a:r>
+              <a:rPr lang="de-DE" dirty="0" err="1" smtClean="0">
+                <a:latin typeface="Courier" pitchFamily="49" charset="0"/>
+                <a:cs typeface="Courier New" panose="02070309020205020404" pitchFamily="49" charset="0"/>
+              </a:rPr>
+              <a:t>int</a:t>
+            </a:r>
+            <a:r>
+              <a:rPr lang="de-DE" dirty="0" smtClean="0">
+                <a:latin typeface="Courier" pitchFamily="49" charset="0"/>
+                <a:cs typeface="Courier New" panose="02070309020205020404" pitchFamily="49" charset="0"/>
+              </a:rPr>
+              <a:t>);</a:t>
+            </a:r>
+          </a:p>
+          <a:p>
+            <a:pPr lvl="1"/>
+            <a:r>
+              <a:rPr lang="de-DE" dirty="0" smtClean="0">
+                <a:solidFill>
+                  <a:srgbClr val="FF0000"/>
+                </a:solidFill>
+                <a:latin typeface="Courier" pitchFamily="49" charset="0"/>
+                <a:cs typeface="Courier New" panose="02070309020205020404" pitchFamily="49" charset="0"/>
+              </a:rPr>
+              <a:t>Operation</a:t>
+            </a:r>
+            <a:r>
+              <a:rPr lang="de-DE" dirty="0" smtClean="0">
+                <a:latin typeface="Courier" pitchFamily="49" charset="0"/>
+                <a:cs typeface="Courier New" panose="02070309020205020404" pitchFamily="49" charset="0"/>
+              </a:rPr>
+              <a:t> minus(Expression);</a:t>
+            </a:r>
+          </a:p>
+          <a:p>
+            <a:pPr lvl="1"/>
+            <a:r>
+              <a:rPr lang="de-DE" dirty="0" smtClean="0">
+                <a:solidFill>
+                  <a:srgbClr val="FF0000"/>
+                </a:solidFill>
+                <a:latin typeface="Courier" pitchFamily="49" charset="0"/>
+                <a:cs typeface="Courier New" panose="02070309020205020404" pitchFamily="49" charset="0"/>
+              </a:rPr>
+              <a:t>Operation</a:t>
+            </a:r>
+            <a:r>
+              <a:rPr lang="de-DE" dirty="0" smtClean="0">
+                <a:latin typeface="Courier" pitchFamily="49" charset="0"/>
+                <a:cs typeface="Courier New" panose="02070309020205020404" pitchFamily="49" charset="0"/>
+              </a:rPr>
+              <a:t> </a:t>
+            </a:r>
+            <a:r>
+              <a:rPr lang="de-DE" dirty="0" err="1" smtClean="0">
+                <a:latin typeface="Courier" pitchFamily="49" charset="0"/>
+                <a:cs typeface="Courier New" panose="02070309020205020404" pitchFamily="49" charset="0"/>
+              </a:rPr>
+              <a:t>times</a:t>
+            </a:r>
+            <a:r>
+              <a:rPr lang="de-DE" dirty="0" smtClean="0">
+                <a:latin typeface="Courier" pitchFamily="49" charset="0"/>
+                <a:cs typeface="Courier New" panose="02070309020205020404" pitchFamily="49" charset="0"/>
+              </a:rPr>
+              <a:t>(</a:t>
+            </a:r>
+            <a:r>
+              <a:rPr lang="de-DE" dirty="0" err="1" smtClean="0">
+                <a:latin typeface="Courier" pitchFamily="49" charset="0"/>
+                <a:cs typeface="Courier New" panose="02070309020205020404" pitchFamily="49" charset="0"/>
+              </a:rPr>
+              <a:t>int</a:t>
+            </a:r>
+            <a:r>
+              <a:rPr lang="de-DE" dirty="0" smtClean="0">
+                <a:latin typeface="Courier" pitchFamily="49" charset="0"/>
+                <a:cs typeface="Courier New" panose="02070309020205020404" pitchFamily="49" charset="0"/>
+              </a:rPr>
+              <a:t>);</a:t>
+            </a:r>
+          </a:p>
+          <a:p>
+            <a:pPr lvl="1"/>
+            <a:r>
+              <a:rPr lang="de-DE" dirty="0" smtClean="0">
+                <a:solidFill>
+                  <a:srgbClr val="FF0000"/>
+                </a:solidFill>
+                <a:latin typeface="Courier" pitchFamily="49" charset="0"/>
+                <a:cs typeface="Courier New" panose="02070309020205020404" pitchFamily="49" charset="0"/>
+              </a:rPr>
+              <a:t>Operation</a:t>
+            </a:r>
+            <a:r>
+              <a:rPr lang="de-DE" dirty="0" smtClean="0">
+                <a:latin typeface="Courier" pitchFamily="49" charset="0"/>
+                <a:cs typeface="Courier New" panose="02070309020205020404" pitchFamily="49" charset="0"/>
+              </a:rPr>
+              <a:t> </a:t>
+            </a:r>
+            <a:r>
+              <a:rPr lang="de-DE" dirty="0" err="1" smtClean="0">
+                <a:latin typeface="Courier" pitchFamily="49" charset="0"/>
+                <a:cs typeface="Courier New" panose="02070309020205020404" pitchFamily="49" charset="0"/>
+              </a:rPr>
+              <a:t>times</a:t>
+            </a:r>
+            <a:r>
+              <a:rPr lang="de-DE" dirty="0" smtClean="0">
+                <a:latin typeface="Courier" pitchFamily="49" charset="0"/>
+                <a:cs typeface="Courier New" panose="02070309020205020404" pitchFamily="49" charset="0"/>
+              </a:rPr>
+              <a:t>(Expression);</a:t>
+            </a:r>
+          </a:p>
+          <a:p>
+            <a:pPr lvl="1"/>
+            <a:r>
+              <a:rPr lang="de-DE" dirty="0" smtClean="0">
+                <a:solidFill>
+                  <a:srgbClr val="FF0000"/>
+                </a:solidFill>
+                <a:latin typeface="Courier" pitchFamily="49" charset="0"/>
+                <a:cs typeface="Courier New" panose="02070309020205020404" pitchFamily="49" charset="0"/>
+              </a:rPr>
+              <a:t>Operation</a:t>
+            </a:r>
+            <a:r>
+              <a:rPr lang="de-DE" dirty="0" smtClean="0">
+                <a:latin typeface="Courier" pitchFamily="49" charset="0"/>
+                <a:cs typeface="Courier New" panose="02070309020205020404" pitchFamily="49" charset="0"/>
+              </a:rPr>
+              <a:t> </a:t>
+            </a:r>
+            <a:r>
+              <a:rPr lang="de-DE" dirty="0" err="1" smtClean="0">
+                <a:latin typeface="Courier" pitchFamily="49" charset="0"/>
+                <a:cs typeface="Courier New" panose="02070309020205020404" pitchFamily="49" charset="0"/>
+              </a:rPr>
+              <a:t>divided</a:t>
+            </a:r>
+            <a:r>
+              <a:rPr lang="de-DE" dirty="0" smtClean="0">
+                <a:latin typeface="Courier" pitchFamily="49" charset="0"/>
+                <a:cs typeface="Courier New" panose="02070309020205020404" pitchFamily="49" charset="0"/>
+              </a:rPr>
+              <a:t>(</a:t>
+            </a:r>
+            <a:r>
+              <a:rPr lang="de-DE" dirty="0" err="1" smtClean="0">
+                <a:latin typeface="Courier" pitchFamily="49" charset="0"/>
+                <a:cs typeface="Courier New" panose="02070309020205020404" pitchFamily="49" charset="0"/>
+              </a:rPr>
+              <a:t>int</a:t>
+            </a:r>
+            <a:r>
+              <a:rPr lang="de-DE" dirty="0" smtClean="0">
+                <a:latin typeface="Courier" pitchFamily="49" charset="0"/>
+                <a:cs typeface="Courier New" panose="02070309020205020404" pitchFamily="49" charset="0"/>
+              </a:rPr>
+              <a:t>);</a:t>
+            </a:r>
+          </a:p>
+          <a:p>
+            <a:pPr lvl="1"/>
+            <a:r>
+              <a:rPr lang="de-DE" dirty="0" smtClean="0">
+                <a:solidFill>
+                  <a:srgbClr val="FF0000"/>
+                </a:solidFill>
+                <a:latin typeface="Courier" pitchFamily="49" charset="0"/>
+                <a:cs typeface="Courier New" panose="02070309020205020404" pitchFamily="49" charset="0"/>
+              </a:rPr>
+              <a:t>Operation</a:t>
+            </a:r>
+            <a:r>
+              <a:rPr lang="de-DE" dirty="0" smtClean="0">
+                <a:latin typeface="Courier" pitchFamily="49" charset="0"/>
+                <a:cs typeface="Courier New" panose="02070309020205020404" pitchFamily="49" charset="0"/>
+              </a:rPr>
+              <a:t> </a:t>
+            </a:r>
+            <a:r>
+              <a:rPr lang="de-DE" dirty="0" err="1" smtClean="0">
+                <a:latin typeface="Courier" pitchFamily="49" charset="0"/>
+                <a:cs typeface="Courier New" panose="02070309020205020404" pitchFamily="49" charset="0"/>
+              </a:rPr>
+              <a:t>divided</a:t>
+            </a:r>
+            <a:r>
+              <a:rPr lang="de-DE" dirty="0" smtClean="0">
+                <a:latin typeface="Courier" pitchFamily="49" charset="0"/>
+                <a:cs typeface="Courier New" panose="02070309020205020404" pitchFamily="49" charset="0"/>
+              </a:rPr>
+              <a:t>(Expression);</a:t>
+            </a:r>
+          </a:p>
+          <a:p>
+            <a:r>
+              <a:rPr lang="de-DE" dirty="0" smtClean="0">
+                <a:latin typeface="Courier" pitchFamily="49" charset="0"/>
+                <a:cs typeface="Courier New" panose="02070309020205020404" pitchFamily="49" charset="0"/>
+              </a:rPr>
+              <a:t>}</a:t>
+            </a:r>
+          </a:p>
+        </p:txBody>
+      </p:sp>
+      <p:sp>
+        <p:nvSpPr>
+          <p:cNvPr id="10" name="Rechteck 9"/>
+          <p:cNvSpPr/>
+          <p:nvPr/>
+        </p:nvSpPr>
+        <p:spPr>
+          <a:xfrm>
+            <a:off x="5076056" y="836712"/>
+            <a:ext cx="2952328" cy="360040"/>
+          </a:xfrm>
+          <a:prstGeom prst="rect">
+            <a:avLst/>
+          </a:prstGeom>
+          <a:noFill/>
+          <a:ln>
+            <a:solidFill>
+              <a:srgbClr val="FF0000"/>
+            </a:solidFill>
+          </a:ln>
+        </p:spPr>
+        <p:style>
+          <a:lnRef idx="2">
+            <a:schemeClr val="accent1">
+              <a:shade val="50000"/>
+            </a:schemeClr>
+          </a:lnRef>
+          <a:fillRef idx="1">
+            <a:schemeClr val="accent1"/>
+          </a:fillRef>
+          <a:effectRef idx="0">
+            <a:schemeClr val="accent1"/>
+          </a:effectRef>
+          <a:fontRef idx="minor">
+            <a:schemeClr val="lt1"/>
+          </a:fontRef>
+        </p:style>
+        <p:txBody>
+          <a:bodyPr rtlCol="0" anchor="ctr"/>
+          <a:lstStyle/>
+          <a:p>
+            <a:pPr algn="ctr"/>
+            <a:endParaRPr lang="de-DE"/>
+          </a:p>
+        </p:txBody>
+      </p:sp>
+    </p:spTree>
+    <p:extLst>
+      <p:ext uri="{BB962C8B-B14F-4D97-AF65-F5344CB8AC3E}">
+        <p14:creationId xmlns:p14="http://schemas.microsoft.com/office/powerpoint/2010/main" val="3078192101"/>
       </p:ext>
     </p:extLst>
   </p:cSld>

</xml_diff>